<commit_message>
Adding content to the intro section of the powerpoint
</commit_message>
<xml_diff>
--- a/Thesis Defense.pptx
+++ b/Thesis Defense.pptx
@@ -4,48 +4,53 @@
   <p:sldMasterIdLst>
     <p:sldMasterId id="2147483660" r:id="rId1"/>
   </p:sldMasterIdLst>
+  <p:notesMasterIdLst>
+    <p:notesMasterId r:id="rId43"/>
+  </p:notesMasterIdLst>
   <p:sldIdLst>
     <p:sldId id="256" r:id="rId2"/>
     <p:sldId id="257" r:id="rId3"/>
-    <p:sldId id="258" r:id="rId4"/>
-    <p:sldId id="259" r:id="rId5"/>
-    <p:sldId id="260" r:id="rId6"/>
-    <p:sldId id="261" r:id="rId7"/>
-    <p:sldId id="262" r:id="rId8"/>
-    <p:sldId id="263" r:id="rId9"/>
-    <p:sldId id="264" r:id="rId10"/>
-    <p:sldId id="265" r:id="rId11"/>
-    <p:sldId id="266" r:id="rId12"/>
-    <p:sldId id="267" r:id="rId13"/>
-    <p:sldId id="268" r:id="rId14"/>
-    <p:sldId id="269" r:id="rId15"/>
-    <p:sldId id="270" r:id="rId16"/>
-    <p:sldId id="271" r:id="rId17"/>
-    <p:sldId id="272" r:id="rId18"/>
-    <p:sldId id="273" r:id="rId19"/>
-    <p:sldId id="274" r:id="rId20"/>
-    <p:sldId id="275" r:id="rId21"/>
-    <p:sldId id="276" r:id="rId22"/>
-    <p:sldId id="277" r:id="rId23"/>
-    <p:sldId id="278" r:id="rId24"/>
-    <p:sldId id="279" r:id="rId25"/>
-    <p:sldId id="280" r:id="rId26"/>
-    <p:sldId id="281" r:id="rId27"/>
-    <p:sldId id="282" r:id="rId28"/>
-    <p:sldId id="283" r:id="rId29"/>
-    <p:sldId id="284" r:id="rId30"/>
-    <p:sldId id="285" r:id="rId31"/>
-    <p:sldId id="286" r:id="rId32"/>
-    <p:sldId id="287" r:id="rId33"/>
-    <p:sldId id="288" r:id="rId34"/>
-    <p:sldId id="289" r:id="rId35"/>
-    <p:sldId id="290" r:id="rId36"/>
-    <p:sldId id="291" r:id="rId37"/>
-    <p:sldId id="292" r:id="rId38"/>
-    <p:sldId id="293" r:id="rId39"/>
-    <p:sldId id="294" r:id="rId40"/>
+    <p:sldId id="296" r:id="rId4"/>
+    <p:sldId id="295" r:id="rId5"/>
+    <p:sldId id="258" r:id="rId6"/>
+    <p:sldId id="259" r:id="rId7"/>
+    <p:sldId id="260" r:id="rId8"/>
+    <p:sldId id="261" r:id="rId9"/>
+    <p:sldId id="262" r:id="rId10"/>
+    <p:sldId id="263" r:id="rId11"/>
+    <p:sldId id="264" r:id="rId12"/>
+    <p:sldId id="265" r:id="rId13"/>
+    <p:sldId id="266" r:id="rId14"/>
+    <p:sldId id="267" r:id="rId15"/>
+    <p:sldId id="268" r:id="rId16"/>
+    <p:sldId id="269" r:id="rId17"/>
+    <p:sldId id="270" r:id="rId18"/>
+    <p:sldId id="271" r:id="rId19"/>
+    <p:sldId id="272" r:id="rId20"/>
+    <p:sldId id="273" r:id="rId21"/>
+    <p:sldId id="274" r:id="rId22"/>
+    <p:sldId id="275" r:id="rId23"/>
+    <p:sldId id="276" r:id="rId24"/>
+    <p:sldId id="277" r:id="rId25"/>
+    <p:sldId id="278" r:id="rId26"/>
+    <p:sldId id="279" r:id="rId27"/>
+    <p:sldId id="280" r:id="rId28"/>
+    <p:sldId id="281" r:id="rId29"/>
+    <p:sldId id="282" r:id="rId30"/>
+    <p:sldId id="283" r:id="rId31"/>
+    <p:sldId id="284" r:id="rId32"/>
+    <p:sldId id="285" r:id="rId33"/>
+    <p:sldId id="286" r:id="rId34"/>
+    <p:sldId id="287" r:id="rId35"/>
+    <p:sldId id="288" r:id="rId36"/>
+    <p:sldId id="289" r:id="rId37"/>
+    <p:sldId id="290" r:id="rId38"/>
+    <p:sldId id="291" r:id="rId39"/>
+    <p:sldId id="292" r:id="rId40"/>
+    <p:sldId id="293" r:id="rId41"/>
+    <p:sldId id="294" r:id="rId42"/>
   </p:sldIdLst>
-  <p:sldSz cx="9144000" cy="6858000" type="screen4x3"/>
+  <p:sldSz cx="9144000" cy="5143500" type="screen16x9"/>
   <p:notesSz cx="6858000" cy="9144000"/>
   <p:defaultTextStyle>
     <a:defPPr>
@@ -145,6 +150,1060 @@
 </p:presentation>
 </file>
 
+<file path=ppt/notesMasters/notesMaster1.xml><?xml version="1.0" encoding="utf-8"?>
+<p:notesMaster xmlns:a="http://schemas.openxmlformats.org/drawingml/2006/main" xmlns:r="http://schemas.openxmlformats.org/officeDocument/2006/relationships" xmlns:p="http://schemas.openxmlformats.org/presentationml/2006/main">
+  <p:cSld>
+    <p:bg>
+      <p:bgRef idx="1001">
+        <a:schemeClr val="bg1"/>
+      </p:bgRef>
+    </p:bg>
+    <p:spTree>
+      <p:nvGrpSpPr>
+        <p:cNvPr id="1" name=""/>
+        <p:cNvGrpSpPr/>
+        <p:nvPr/>
+      </p:nvGrpSpPr>
+      <p:grpSpPr>
+        <a:xfrm>
+          <a:off x="0" y="0"/>
+          <a:ext cx="0" cy="0"/>
+          <a:chOff x="0" y="0"/>
+          <a:chExt cx="0" cy="0"/>
+        </a:xfrm>
+      </p:grpSpPr>
+      <p:sp>
+        <p:nvSpPr>
+          <p:cNvPr id="2" name="Header Placeholder 1"/>
+          <p:cNvSpPr>
+            <a:spLocks noGrp="1"/>
+          </p:cNvSpPr>
+          <p:nvPr>
+            <p:ph type="hdr" sz="quarter"/>
+          </p:nvPr>
+        </p:nvSpPr>
+        <p:spPr>
+          <a:xfrm>
+            <a:off x="0" y="0"/>
+            <a:ext cx="2971800" cy="457200"/>
+          </a:xfrm>
+          <a:prstGeom prst="rect">
+            <a:avLst/>
+          </a:prstGeom>
+        </p:spPr>
+        <p:txBody>
+          <a:bodyPr vert="horz" lIns="91440" tIns="45720" rIns="91440" bIns="45720" rtlCol="0"/>
+          <a:lstStyle>
+            <a:lvl1pPr algn="l">
+              <a:defRPr sz="1200"/>
+            </a:lvl1pPr>
+          </a:lstStyle>
+          <a:p>
+            <a:endParaRPr lang="en-US"/>
+          </a:p>
+        </p:txBody>
+      </p:sp>
+      <p:sp>
+        <p:nvSpPr>
+          <p:cNvPr id="3" name="Date Placeholder 2"/>
+          <p:cNvSpPr>
+            <a:spLocks noGrp="1"/>
+          </p:cNvSpPr>
+          <p:nvPr>
+            <p:ph type="dt" idx="1"/>
+          </p:nvPr>
+        </p:nvSpPr>
+        <p:spPr>
+          <a:xfrm>
+            <a:off x="3884613" y="0"/>
+            <a:ext cx="2971800" cy="457200"/>
+          </a:xfrm>
+          <a:prstGeom prst="rect">
+            <a:avLst/>
+          </a:prstGeom>
+        </p:spPr>
+        <p:txBody>
+          <a:bodyPr vert="horz" lIns="91440" tIns="45720" rIns="91440" bIns="45720" rtlCol="0"/>
+          <a:lstStyle>
+            <a:lvl1pPr algn="r">
+              <a:defRPr sz="1200"/>
+            </a:lvl1pPr>
+          </a:lstStyle>
+          <a:p>
+            <a:fld id="{36A1C95E-1CF8-4926-B750-D85B02FE5FAD}" type="datetimeFigureOut">
+              <a:rPr lang="en-US" smtClean="0"/>
+              <a:t>4/9/2016</a:t>
+            </a:fld>
+            <a:endParaRPr lang="en-US"/>
+          </a:p>
+        </p:txBody>
+      </p:sp>
+      <p:sp>
+        <p:nvSpPr>
+          <p:cNvPr id="4" name="Slide Image Placeholder 3"/>
+          <p:cNvSpPr>
+            <a:spLocks noGrp="1" noRot="1" noChangeAspect="1"/>
+          </p:cNvSpPr>
+          <p:nvPr>
+            <p:ph type="sldImg" idx="2"/>
+          </p:nvPr>
+        </p:nvSpPr>
+        <p:spPr>
+          <a:xfrm>
+            <a:off x="381000" y="685800"/>
+            <a:ext cx="6096000" cy="3429000"/>
+          </a:xfrm>
+          <a:prstGeom prst="rect">
+            <a:avLst/>
+          </a:prstGeom>
+          <a:noFill/>
+          <a:ln w="12700">
+            <a:solidFill>
+              <a:prstClr val="black"/>
+            </a:solidFill>
+          </a:ln>
+        </p:spPr>
+        <p:txBody>
+          <a:bodyPr vert="horz" lIns="91440" tIns="45720" rIns="91440" bIns="45720" rtlCol="0" anchor="ctr"/>
+          <a:lstStyle/>
+          <a:p>
+            <a:endParaRPr lang="en-US"/>
+          </a:p>
+        </p:txBody>
+      </p:sp>
+      <p:sp>
+        <p:nvSpPr>
+          <p:cNvPr id="5" name="Notes Placeholder 4"/>
+          <p:cNvSpPr>
+            <a:spLocks noGrp="1"/>
+          </p:cNvSpPr>
+          <p:nvPr>
+            <p:ph type="body" sz="quarter" idx="3"/>
+          </p:nvPr>
+        </p:nvSpPr>
+        <p:spPr>
+          <a:xfrm>
+            <a:off x="685800" y="4343400"/>
+            <a:ext cx="5486400" cy="4114800"/>
+          </a:xfrm>
+          <a:prstGeom prst="rect">
+            <a:avLst/>
+          </a:prstGeom>
+        </p:spPr>
+        <p:txBody>
+          <a:bodyPr vert="horz" lIns="91440" tIns="45720" rIns="91440" bIns="45720" rtlCol="0"/>
+          <a:lstStyle/>
+          <a:p>
+            <a:pPr lvl="0"/>
+            <a:r>
+              <a:rPr lang="en-US" smtClean="0"/>
+              <a:t>Click to edit Master text styles</a:t>
+            </a:r>
+          </a:p>
+          <a:p>
+            <a:pPr lvl="1"/>
+            <a:r>
+              <a:rPr lang="en-US" smtClean="0"/>
+              <a:t>Second level</a:t>
+            </a:r>
+          </a:p>
+          <a:p>
+            <a:pPr lvl="2"/>
+            <a:r>
+              <a:rPr lang="en-US" smtClean="0"/>
+              <a:t>Third level</a:t>
+            </a:r>
+          </a:p>
+          <a:p>
+            <a:pPr lvl="3"/>
+            <a:r>
+              <a:rPr lang="en-US" smtClean="0"/>
+              <a:t>Fourth level</a:t>
+            </a:r>
+          </a:p>
+          <a:p>
+            <a:pPr lvl="4"/>
+            <a:r>
+              <a:rPr lang="en-US" smtClean="0"/>
+              <a:t>Fifth level</a:t>
+            </a:r>
+            <a:endParaRPr lang="en-US"/>
+          </a:p>
+        </p:txBody>
+      </p:sp>
+      <p:sp>
+        <p:nvSpPr>
+          <p:cNvPr id="6" name="Footer Placeholder 5"/>
+          <p:cNvSpPr>
+            <a:spLocks noGrp="1"/>
+          </p:cNvSpPr>
+          <p:nvPr>
+            <p:ph type="ftr" sz="quarter" idx="4"/>
+          </p:nvPr>
+        </p:nvSpPr>
+        <p:spPr>
+          <a:xfrm>
+            <a:off x="0" y="8685213"/>
+            <a:ext cx="2971800" cy="457200"/>
+          </a:xfrm>
+          <a:prstGeom prst="rect">
+            <a:avLst/>
+          </a:prstGeom>
+        </p:spPr>
+        <p:txBody>
+          <a:bodyPr vert="horz" lIns="91440" tIns="45720" rIns="91440" bIns="45720" rtlCol="0" anchor="b"/>
+          <a:lstStyle>
+            <a:lvl1pPr algn="l">
+              <a:defRPr sz="1200"/>
+            </a:lvl1pPr>
+          </a:lstStyle>
+          <a:p>
+            <a:endParaRPr lang="en-US"/>
+          </a:p>
+        </p:txBody>
+      </p:sp>
+      <p:sp>
+        <p:nvSpPr>
+          <p:cNvPr id="7" name="Slide Number Placeholder 6"/>
+          <p:cNvSpPr>
+            <a:spLocks noGrp="1"/>
+          </p:cNvSpPr>
+          <p:nvPr>
+            <p:ph type="sldNum" sz="quarter" idx="5"/>
+          </p:nvPr>
+        </p:nvSpPr>
+        <p:spPr>
+          <a:xfrm>
+            <a:off x="3884613" y="8685213"/>
+            <a:ext cx="2971800" cy="457200"/>
+          </a:xfrm>
+          <a:prstGeom prst="rect">
+            <a:avLst/>
+          </a:prstGeom>
+        </p:spPr>
+        <p:txBody>
+          <a:bodyPr vert="horz" lIns="91440" tIns="45720" rIns="91440" bIns="45720" rtlCol="0" anchor="b"/>
+          <a:lstStyle>
+            <a:lvl1pPr algn="r">
+              <a:defRPr sz="1200"/>
+            </a:lvl1pPr>
+          </a:lstStyle>
+          <a:p>
+            <a:fld id="{40F03367-12A2-4115-91BC-40C376208EF2}" type="slidenum">
+              <a:rPr lang="en-US" smtClean="0"/>
+              <a:t>‹#›</a:t>
+            </a:fld>
+            <a:endParaRPr lang="en-US"/>
+          </a:p>
+        </p:txBody>
+      </p:sp>
+    </p:spTree>
+    <p:extLst>
+      <p:ext uri="{BB962C8B-B14F-4D97-AF65-F5344CB8AC3E}">
+        <p14:creationId xmlns:p14="http://schemas.microsoft.com/office/powerpoint/2010/main" val="4249641807"/>
+      </p:ext>
+    </p:extLst>
+  </p:cSld>
+  <p:clrMap bg1="lt1" tx1="dk1" bg2="lt2" tx2="dk2" accent1="accent1" accent2="accent2" accent3="accent3" accent4="accent4" accent5="accent5" accent6="accent6" hlink="hlink" folHlink="folHlink"/>
+  <p:notesStyle>
+    <a:lvl1pPr marL="0" algn="l" defTabSz="914400" rtl="0" eaLnBrk="1" latinLnBrk="0" hangingPunct="1">
+      <a:defRPr sz="1200" kern="1200">
+        <a:solidFill>
+          <a:schemeClr val="tx1"/>
+        </a:solidFill>
+        <a:latin typeface="+mn-lt"/>
+        <a:ea typeface="+mn-ea"/>
+        <a:cs typeface="+mn-cs"/>
+      </a:defRPr>
+    </a:lvl1pPr>
+    <a:lvl2pPr marL="457200" algn="l" defTabSz="914400" rtl="0" eaLnBrk="1" latinLnBrk="0" hangingPunct="1">
+      <a:defRPr sz="1200" kern="1200">
+        <a:solidFill>
+          <a:schemeClr val="tx1"/>
+        </a:solidFill>
+        <a:latin typeface="+mn-lt"/>
+        <a:ea typeface="+mn-ea"/>
+        <a:cs typeface="+mn-cs"/>
+      </a:defRPr>
+    </a:lvl2pPr>
+    <a:lvl3pPr marL="914400" algn="l" defTabSz="914400" rtl="0" eaLnBrk="1" latinLnBrk="0" hangingPunct="1">
+      <a:defRPr sz="1200" kern="1200">
+        <a:solidFill>
+          <a:schemeClr val="tx1"/>
+        </a:solidFill>
+        <a:latin typeface="+mn-lt"/>
+        <a:ea typeface="+mn-ea"/>
+        <a:cs typeface="+mn-cs"/>
+      </a:defRPr>
+    </a:lvl3pPr>
+    <a:lvl4pPr marL="1371600" algn="l" defTabSz="914400" rtl="0" eaLnBrk="1" latinLnBrk="0" hangingPunct="1">
+      <a:defRPr sz="1200" kern="1200">
+        <a:solidFill>
+          <a:schemeClr val="tx1"/>
+        </a:solidFill>
+        <a:latin typeface="+mn-lt"/>
+        <a:ea typeface="+mn-ea"/>
+        <a:cs typeface="+mn-cs"/>
+      </a:defRPr>
+    </a:lvl4pPr>
+    <a:lvl5pPr marL="1828800" algn="l" defTabSz="914400" rtl="0" eaLnBrk="1" latinLnBrk="0" hangingPunct="1">
+      <a:defRPr sz="1200" kern="1200">
+        <a:solidFill>
+          <a:schemeClr val="tx1"/>
+        </a:solidFill>
+        <a:latin typeface="+mn-lt"/>
+        <a:ea typeface="+mn-ea"/>
+        <a:cs typeface="+mn-cs"/>
+      </a:defRPr>
+    </a:lvl5pPr>
+    <a:lvl6pPr marL="2286000" algn="l" defTabSz="914400" rtl="0" eaLnBrk="1" latinLnBrk="0" hangingPunct="1">
+      <a:defRPr sz="1200" kern="1200">
+        <a:solidFill>
+          <a:schemeClr val="tx1"/>
+        </a:solidFill>
+        <a:latin typeface="+mn-lt"/>
+        <a:ea typeface="+mn-ea"/>
+        <a:cs typeface="+mn-cs"/>
+      </a:defRPr>
+    </a:lvl6pPr>
+    <a:lvl7pPr marL="2743200" algn="l" defTabSz="914400" rtl="0" eaLnBrk="1" latinLnBrk="0" hangingPunct="1">
+      <a:defRPr sz="1200" kern="1200">
+        <a:solidFill>
+          <a:schemeClr val="tx1"/>
+        </a:solidFill>
+        <a:latin typeface="+mn-lt"/>
+        <a:ea typeface="+mn-ea"/>
+        <a:cs typeface="+mn-cs"/>
+      </a:defRPr>
+    </a:lvl7pPr>
+    <a:lvl8pPr marL="3200400" algn="l" defTabSz="914400" rtl="0" eaLnBrk="1" latinLnBrk="0" hangingPunct="1">
+      <a:defRPr sz="1200" kern="1200">
+        <a:solidFill>
+          <a:schemeClr val="tx1"/>
+        </a:solidFill>
+        <a:latin typeface="+mn-lt"/>
+        <a:ea typeface="+mn-ea"/>
+        <a:cs typeface="+mn-cs"/>
+      </a:defRPr>
+    </a:lvl8pPr>
+    <a:lvl9pPr marL="3657600" algn="l" defTabSz="914400" rtl="0" eaLnBrk="1" latinLnBrk="0" hangingPunct="1">
+      <a:defRPr sz="1200" kern="1200">
+        <a:solidFill>
+          <a:schemeClr val="tx1"/>
+        </a:solidFill>
+        <a:latin typeface="+mn-lt"/>
+        <a:ea typeface="+mn-ea"/>
+        <a:cs typeface="+mn-cs"/>
+      </a:defRPr>
+    </a:lvl9pPr>
+  </p:notesStyle>
+</p:notesMaster>
+</file>
+
+<file path=ppt/notesSlides/notesSlide1.xml><?xml version="1.0" encoding="utf-8"?>
+<p:notes xmlns:a="http://schemas.openxmlformats.org/drawingml/2006/main" xmlns:r="http://schemas.openxmlformats.org/officeDocument/2006/relationships" xmlns:p="http://schemas.openxmlformats.org/presentationml/2006/main">
+  <p:cSld>
+    <p:spTree>
+      <p:nvGrpSpPr>
+        <p:cNvPr id="1" name=""/>
+        <p:cNvGrpSpPr/>
+        <p:nvPr/>
+      </p:nvGrpSpPr>
+      <p:grpSpPr>
+        <a:xfrm>
+          <a:off x="0" y="0"/>
+          <a:ext cx="0" cy="0"/>
+          <a:chOff x="0" y="0"/>
+          <a:chExt cx="0" cy="0"/>
+        </a:xfrm>
+      </p:grpSpPr>
+      <p:sp>
+        <p:nvSpPr>
+          <p:cNvPr id="2" name="Slide Image Placeholder 1"/>
+          <p:cNvSpPr>
+            <a:spLocks noGrp="1" noRot="1" noChangeAspect="1"/>
+          </p:cNvSpPr>
+          <p:nvPr>
+            <p:ph type="sldImg"/>
+          </p:nvPr>
+        </p:nvSpPr>
+        <p:spPr/>
+      </p:sp>
+      <p:sp>
+        <p:nvSpPr>
+          <p:cNvPr id="3" name="Notes Placeholder 2"/>
+          <p:cNvSpPr>
+            <a:spLocks noGrp="1"/>
+          </p:cNvSpPr>
+          <p:nvPr>
+            <p:ph type="body" idx="1"/>
+          </p:nvPr>
+        </p:nvSpPr>
+        <p:spPr/>
+        <p:txBody>
+          <a:bodyPr/>
+          <a:lstStyle/>
+          <a:p>
+            <a:r>
+              <a:rPr lang="en-US" dirty="0" smtClean="0"/>
+              <a:t>Introduce People in the</a:t>
+            </a:r>
+            <a:r>
+              <a:rPr lang="en-US" baseline="0" dirty="0" smtClean="0"/>
+              <a:t> room</a:t>
+            </a:r>
+            <a:endParaRPr lang="en-US" dirty="0"/>
+          </a:p>
+        </p:txBody>
+      </p:sp>
+      <p:sp>
+        <p:nvSpPr>
+          <p:cNvPr id="4" name="Slide Number Placeholder 3"/>
+          <p:cNvSpPr>
+            <a:spLocks noGrp="1"/>
+          </p:cNvSpPr>
+          <p:nvPr>
+            <p:ph type="sldNum" sz="quarter" idx="10"/>
+          </p:nvPr>
+        </p:nvSpPr>
+        <p:spPr/>
+        <p:txBody>
+          <a:bodyPr/>
+          <a:lstStyle/>
+          <a:p>
+            <a:fld id="{40F03367-12A2-4115-91BC-40C376208EF2}" type="slidenum">
+              <a:rPr lang="en-US" smtClean="0"/>
+              <a:t>1</a:t>
+            </a:fld>
+            <a:endParaRPr lang="en-US"/>
+          </a:p>
+        </p:txBody>
+      </p:sp>
+    </p:spTree>
+    <p:extLst>
+      <p:ext uri="{BB962C8B-B14F-4D97-AF65-F5344CB8AC3E}">
+        <p14:creationId xmlns:p14="http://schemas.microsoft.com/office/powerpoint/2010/main" val="1053120186"/>
+      </p:ext>
+    </p:extLst>
+  </p:cSld>
+  <p:clrMapOvr>
+    <a:masterClrMapping/>
+  </p:clrMapOvr>
+</p:notes>
+</file>
+
+<file path=ppt/notesSlides/notesSlide2.xml><?xml version="1.0" encoding="utf-8"?>
+<p:notes xmlns:a="http://schemas.openxmlformats.org/drawingml/2006/main" xmlns:r="http://schemas.openxmlformats.org/officeDocument/2006/relationships" xmlns:p="http://schemas.openxmlformats.org/presentationml/2006/main">
+  <p:cSld>
+    <p:spTree>
+      <p:nvGrpSpPr>
+        <p:cNvPr id="1" name=""/>
+        <p:cNvGrpSpPr/>
+        <p:nvPr/>
+      </p:nvGrpSpPr>
+      <p:grpSpPr>
+        <a:xfrm>
+          <a:off x="0" y="0"/>
+          <a:ext cx="0" cy="0"/>
+          <a:chOff x="0" y="0"/>
+          <a:chExt cx="0" cy="0"/>
+        </a:xfrm>
+      </p:grpSpPr>
+      <p:sp>
+        <p:nvSpPr>
+          <p:cNvPr id="2" name="Slide Image Placeholder 1"/>
+          <p:cNvSpPr>
+            <a:spLocks noGrp="1" noRot="1" noChangeAspect="1"/>
+          </p:cNvSpPr>
+          <p:nvPr>
+            <p:ph type="sldImg"/>
+          </p:nvPr>
+        </p:nvSpPr>
+        <p:spPr>
+          <a:xfrm>
+            <a:off x="381000" y="685800"/>
+            <a:ext cx="6096000" cy="3429000"/>
+          </a:xfrm>
+        </p:spPr>
+      </p:sp>
+      <p:sp>
+        <p:nvSpPr>
+          <p:cNvPr id="3" name="Notes Placeholder 2"/>
+          <p:cNvSpPr>
+            <a:spLocks noGrp="1"/>
+          </p:cNvSpPr>
+          <p:nvPr>
+            <p:ph type="body" idx="1"/>
+          </p:nvPr>
+        </p:nvSpPr>
+        <p:spPr/>
+        <p:txBody>
+          <a:bodyPr/>
+          <a:lstStyle/>
+          <a:p>
+            <a:r>
+              <a:rPr lang="en-US" dirty="0" smtClean="0"/>
+              <a:t>Discuss Digital vs Analog Communication. Ironic note about how APRS</a:t>
+            </a:r>
+            <a:r>
+              <a:rPr lang="en-US" baseline="0" dirty="0" smtClean="0"/>
+              <a:t> is both.</a:t>
+            </a:r>
+          </a:p>
+          <a:p>
+            <a:r>
+              <a:rPr lang="en-US" baseline="0" dirty="0" smtClean="0"/>
+              <a:t>Packet content can be many things but most commonly is a GPS position.</a:t>
+            </a:r>
+          </a:p>
+          <a:p>
+            <a:r>
+              <a:rPr lang="en-US" baseline="0" dirty="0" smtClean="0"/>
+              <a:t>Mention that Bell 202 is the key to this research (not too much detail about what it is since that will be covered later)</a:t>
+            </a:r>
+          </a:p>
+        </p:txBody>
+      </p:sp>
+      <p:sp>
+        <p:nvSpPr>
+          <p:cNvPr id="4" name="Slide Number Placeholder 3"/>
+          <p:cNvSpPr>
+            <a:spLocks noGrp="1"/>
+          </p:cNvSpPr>
+          <p:nvPr>
+            <p:ph type="sldNum" sz="quarter" idx="10"/>
+          </p:nvPr>
+        </p:nvSpPr>
+        <p:spPr/>
+        <p:txBody>
+          <a:bodyPr/>
+          <a:lstStyle/>
+          <a:p>
+            <a:fld id="{40F03367-12A2-4115-91BC-40C376208EF2}" type="slidenum">
+              <a:rPr lang="en-US" smtClean="0"/>
+              <a:t>2</a:t>
+            </a:fld>
+            <a:endParaRPr lang="en-US"/>
+          </a:p>
+        </p:txBody>
+      </p:sp>
+    </p:spTree>
+    <p:extLst>
+      <p:ext uri="{BB962C8B-B14F-4D97-AF65-F5344CB8AC3E}">
+        <p14:creationId xmlns:p14="http://schemas.microsoft.com/office/powerpoint/2010/main" val="1816643174"/>
+      </p:ext>
+    </p:extLst>
+  </p:cSld>
+  <p:clrMapOvr>
+    <a:masterClrMapping/>
+  </p:clrMapOvr>
+</p:notes>
+</file>
+
+<file path=ppt/notesSlides/notesSlide3.xml><?xml version="1.0" encoding="utf-8"?>
+<p:notes xmlns:a="http://schemas.openxmlformats.org/drawingml/2006/main" xmlns:r="http://schemas.openxmlformats.org/officeDocument/2006/relationships" xmlns:p="http://schemas.openxmlformats.org/presentationml/2006/main">
+  <p:cSld>
+    <p:spTree>
+      <p:nvGrpSpPr>
+        <p:cNvPr id="1" name=""/>
+        <p:cNvGrpSpPr/>
+        <p:nvPr/>
+      </p:nvGrpSpPr>
+      <p:grpSpPr>
+        <a:xfrm>
+          <a:off x="0" y="0"/>
+          <a:ext cx="0" cy="0"/>
+          <a:chOff x="0" y="0"/>
+          <a:chExt cx="0" cy="0"/>
+        </a:xfrm>
+      </p:grpSpPr>
+      <p:sp>
+        <p:nvSpPr>
+          <p:cNvPr id="2" name="Slide Image Placeholder 1"/>
+          <p:cNvSpPr>
+            <a:spLocks noGrp="1" noRot="1" noChangeAspect="1"/>
+          </p:cNvSpPr>
+          <p:nvPr>
+            <p:ph type="sldImg"/>
+          </p:nvPr>
+        </p:nvSpPr>
+        <p:spPr/>
+      </p:sp>
+      <p:sp>
+        <p:nvSpPr>
+          <p:cNvPr id="3" name="Notes Placeholder 2"/>
+          <p:cNvSpPr>
+            <a:spLocks noGrp="1"/>
+          </p:cNvSpPr>
+          <p:nvPr>
+            <p:ph type="body" idx="1"/>
+          </p:nvPr>
+        </p:nvSpPr>
+        <p:spPr/>
+        <p:txBody>
+          <a:bodyPr/>
+          <a:lstStyle/>
+          <a:p>
+            <a:r>
+              <a:rPr lang="en-US" dirty="0" err="1" smtClean="0"/>
+              <a:t>AGWTracker</a:t>
+            </a:r>
+            <a:r>
+              <a:rPr lang="en-US" dirty="0" smtClean="0"/>
+              <a:t>,</a:t>
+            </a:r>
+            <a:r>
+              <a:rPr lang="en-US" baseline="0" dirty="0" smtClean="0"/>
+              <a:t> </a:t>
+            </a:r>
+            <a:r>
+              <a:rPr lang="en-US" dirty="0" smtClean="0"/>
+              <a:t>AGWPE, Wildflower, course maps.</a:t>
+            </a:r>
+            <a:endParaRPr lang="en-US" dirty="0"/>
+          </a:p>
+        </p:txBody>
+      </p:sp>
+      <p:sp>
+        <p:nvSpPr>
+          <p:cNvPr id="4" name="Slide Number Placeholder 3"/>
+          <p:cNvSpPr>
+            <a:spLocks noGrp="1"/>
+          </p:cNvSpPr>
+          <p:nvPr>
+            <p:ph type="sldNum" sz="quarter" idx="10"/>
+          </p:nvPr>
+        </p:nvSpPr>
+        <p:spPr/>
+        <p:txBody>
+          <a:bodyPr/>
+          <a:lstStyle/>
+          <a:p>
+            <a:fld id="{40F03367-12A2-4115-91BC-40C376208EF2}" type="slidenum">
+              <a:rPr lang="en-US" smtClean="0"/>
+              <a:t>3</a:t>
+            </a:fld>
+            <a:endParaRPr lang="en-US"/>
+          </a:p>
+        </p:txBody>
+      </p:sp>
+    </p:spTree>
+    <p:extLst>
+      <p:ext uri="{BB962C8B-B14F-4D97-AF65-F5344CB8AC3E}">
+        <p14:creationId xmlns:p14="http://schemas.microsoft.com/office/powerpoint/2010/main" val="2801844967"/>
+      </p:ext>
+    </p:extLst>
+  </p:cSld>
+  <p:clrMapOvr>
+    <a:masterClrMapping/>
+  </p:clrMapOvr>
+</p:notes>
+</file>
+
+<file path=ppt/notesSlides/notesSlide4.xml><?xml version="1.0" encoding="utf-8"?>
+<p:notes xmlns:a="http://schemas.openxmlformats.org/drawingml/2006/main" xmlns:r="http://schemas.openxmlformats.org/officeDocument/2006/relationships" xmlns:p="http://schemas.openxmlformats.org/presentationml/2006/main">
+  <p:cSld>
+    <p:spTree>
+      <p:nvGrpSpPr>
+        <p:cNvPr id="1" name=""/>
+        <p:cNvGrpSpPr/>
+        <p:nvPr/>
+      </p:nvGrpSpPr>
+      <p:grpSpPr>
+        <a:xfrm>
+          <a:off x="0" y="0"/>
+          <a:ext cx="0" cy="0"/>
+          <a:chOff x="0" y="0"/>
+          <a:chExt cx="0" cy="0"/>
+        </a:xfrm>
+      </p:grpSpPr>
+      <p:sp>
+        <p:nvSpPr>
+          <p:cNvPr id="2" name="Slide Image Placeholder 1"/>
+          <p:cNvSpPr>
+            <a:spLocks noGrp="1" noRot="1" noChangeAspect="1"/>
+          </p:cNvSpPr>
+          <p:nvPr>
+            <p:ph type="sldImg"/>
+          </p:nvPr>
+        </p:nvSpPr>
+        <p:spPr>
+          <a:xfrm>
+            <a:off x="381000" y="685800"/>
+            <a:ext cx="6096000" cy="3429000"/>
+          </a:xfrm>
+        </p:spPr>
+      </p:sp>
+      <p:sp>
+        <p:nvSpPr>
+          <p:cNvPr id="3" name="Notes Placeholder 2"/>
+          <p:cNvSpPr>
+            <a:spLocks noGrp="1"/>
+          </p:cNvSpPr>
+          <p:nvPr>
+            <p:ph type="body" idx="1"/>
+          </p:nvPr>
+        </p:nvSpPr>
+        <p:spPr/>
+        <p:txBody>
+          <a:bodyPr/>
+          <a:lstStyle/>
+          <a:p>
+            <a:r>
+              <a:rPr lang="en-US" dirty="0" smtClean="0"/>
+              <a:t>Walk through of APRS.fi</a:t>
+            </a:r>
+            <a:r>
+              <a:rPr lang="en-US" baseline="0" dirty="0" smtClean="0"/>
+              <a:t> show:</a:t>
+            </a:r>
+          </a:p>
+          <a:p>
+            <a:r>
+              <a:rPr lang="en-US" baseline="0" dirty="0" smtClean="0"/>
+              <a:t>-Stations</a:t>
+            </a:r>
+          </a:p>
+          <a:p>
+            <a:r>
+              <a:rPr lang="en-US" baseline="0" dirty="0" smtClean="0"/>
+              <a:t>-Tracks</a:t>
+            </a:r>
+          </a:p>
+          <a:p>
+            <a:r>
+              <a:rPr lang="en-US" baseline="0" dirty="0" smtClean="0"/>
+              <a:t>-Messages</a:t>
+            </a:r>
+          </a:p>
+          <a:p>
+            <a:r>
+              <a:rPr lang="en-US" baseline="0" dirty="0" smtClean="0"/>
+              <a:t>-Telemetry</a:t>
+            </a:r>
+          </a:p>
+        </p:txBody>
+      </p:sp>
+      <p:sp>
+        <p:nvSpPr>
+          <p:cNvPr id="4" name="Slide Number Placeholder 3"/>
+          <p:cNvSpPr>
+            <a:spLocks noGrp="1"/>
+          </p:cNvSpPr>
+          <p:nvPr>
+            <p:ph type="sldNum" sz="quarter" idx="10"/>
+          </p:nvPr>
+        </p:nvSpPr>
+        <p:spPr/>
+        <p:txBody>
+          <a:bodyPr/>
+          <a:lstStyle/>
+          <a:p>
+            <a:fld id="{40F03367-12A2-4115-91BC-40C376208EF2}" type="slidenum">
+              <a:rPr lang="en-US" smtClean="0"/>
+              <a:t>4</a:t>
+            </a:fld>
+            <a:endParaRPr lang="en-US"/>
+          </a:p>
+        </p:txBody>
+      </p:sp>
+    </p:spTree>
+    <p:extLst>
+      <p:ext uri="{BB962C8B-B14F-4D97-AF65-F5344CB8AC3E}">
+        <p14:creationId xmlns:p14="http://schemas.microsoft.com/office/powerpoint/2010/main" val="2034523353"/>
+      </p:ext>
+    </p:extLst>
+  </p:cSld>
+  <p:clrMapOvr>
+    <a:masterClrMapping/>
+  </p:clrMapOvr>
+</p:notes>
+</file>
+
+<file path=ppt/notesSlides/notesSlide5.xml><?xml version="1.0" encoding="utf-8"?>
+<p:notes xmlns:a="http://schemas.openxmlformats.org/drawingml/2006/main" xmlns:r="http://schemas.openxmlformats.org/officeDocument/2006/relationships" xmlns:p="http://schemas.openxmlformats.org/presentationml/2006/main">
+  <p:cSld>
+    <p:spTree>
+      <p:nvGrpSpPr>
+        <p:cNvPr id="1" name=""/>
+        <p:cNvGrpSpPr/>
+        <p:nvPr/>
+      </p:nvGrpSpPr>
+      <p:grpSpPr>
+        <a:xfrm>
+          <a:off x="0" y="0"/>
+          <a:ext cx="0" cy="0"/>
+          <a:chOff x="0" y="0"/>
+          <a:chExt cx="0" cy="0"/>
+        </a:xfrm>
+      </p:grpSpPr>
+      <p:sp>
+        <p:nvSpPr>
+          <p:cNvPr id="2" name="Slide Image Placeholder 1"/>
+          <p:cNvSpPr>
+            <a:spLocks noGrp="1" noRot="1" noChangeAspect="1"/>
+          </p:cNvSpPr>
+          <p:nvPr>
+            <p:ph type="sldImg"/>
+          </p:nvPr>
+        </p:nvSpPr>
+        <p:spPr/>
+      </p:sp>
+      <p:sp>
+        <p:nvSpPr>
+          <p:cNvPr id="3" name="Notes Placeholder 2"/>
+          <p:cNvSpPr>
+            <a:spLocks noGrp="1"/>
+          </p:cNvSpPr>
+          <p:nvPr>
+            <p:ph type="body" idx="1"/>
+          </p:nvPr>
+        </p:nvSpPr>
+        <p:spPr/>
+        <p:txBody>
+          <a:bodyPr/>
+          <a:lstStyle/>
+          <a:p>
+            <a:r>
+              <a:rPr lang="en-US" dirty="0" smtClean="0"/>
+              <a:t>1200Hz and 2200Hz tones.</a:t>
+            </a:r>
+          </a:p>
+          <a:p>
+            <a:r>
+              <a:rPr lang="en-US" dirty="0" smtClean="0"/>
+              <a:t>Since 2200Hz</a:t>
+            </a:r>
+            <a:r>
+              <a:rPr lang="en-US" baseline="0" dirty="0" smtClean="0"/>
+              <a:t> doesn’t divide evenly in a 1200 baud bit period you can see that it changes the phase.</a:t>
+            </a:r>
+            <a:endParaRPr lang="en-US" dirty="0"/>
+          </a:p>
+        </p:txBody>
+      </p:sp>
+      <p:sp>
+        <p:nvSpPr>
+          <p:cNvPr id="4" name="Slide Number Placeholder 3"/>
+          <p:cNvSpPr>
+            <a:spLocks noGrp="1"/>
+          </p:cNvSpPr>
+          <p:nvPr>
+            <p:ph type="sldNum" sz="quarter" idx="10"/>
+          </p:nvPr>
+        </p:nvSpPr>
+        <p:spPr/>
+        <p:txBody>
+          <a:bodyPr/>
+          <a:lstStyle/>
+          <a:p>
+            <a:fld id="{40F03367-12A2-4115-91BC-40C376208EF2}" type="slidenum">
+              <a:rPr lang="en-US" smtClean="0"/>
+              <a:t>6</a:t>
+            </a:fld>
+            <a:endParaRPr lang="en-US"/>
+          </a:p>
+        </p:txBody>
+      </p:sp>
+    </p:spTree>
+    <p:extLst>
+      <p:ext uri="{BB962C8B-B14F-4D97-AF65-F5344CB8AC3E}">
+        <p14:creationId xmlns:p14="http://schemas.microsoft.com/office/powerpoint/2010/main" val="641957164"/>
+      </p:ext>
+    </p:extLst>
+  </p:cSld>
+  <p:clrMapOvr>
+    <a:masterClrMapping/>
+  </p:clrMapOvr>
+</p:notes>
+</file>
+
+<file path=ppt/notesSlides/notesSlide6.xml><?xml version="1.0" encoding="utf-8"?>
+<p:notes xmlns:a="http://schemas.openxmlformats.org/drawingml/2006/main" xmlns:r="http://schemas.openxmlformats.org/officeDocument/2006/relationships" xmlns:p="http://schemas.openxmlformats.org/presentationml/2006/main">
+  <p:cSld>
+    <p:spTree>
+      <p:nvGrpSpPr>
+        <p:cNvPr id="1" name=""/>
+        <p:cNvGrpSpPr/>
+        <p:nvPr/>
+      </p:nvGrpSpPr>
+      <p:grpSpPr>
+        <a:xfrm>
+          <a:off x="0" y="0"/>
+          <a:ext cx="0" cy="0"/>
+          <a:chOff x="0" y="0"/>
+          <a:chExt cx="0" cy="0"/>
+        </a:xfrm>
+      </p:grpSpPr>
+      <p:sp>
+        <p:nvSpPr>
+          <p:cNvPr id="2" name="Slide Image Placeholder 1"/>
+          <p:cNvSpPr>
+            <a:spLocks noGrp="1" noRot="1" noChangeAspect="1"/>
+          </p:cNvSpPr>
+          <p:nvPr>
+            <p:ph type="sldImg"/>
+          </p:nvPr>
+        </p:nvSpPr>
+        <p:spPr/>
+      </p:sp>
+      <p:sp>
+        <p:nvSpPr>
+          <p:cNvPr id="3" name="Notes Placeholder 2"/>
+          <p:cNvSpPr>
+            <a:spLocks noGrp="1"/>
+          </p:cNvSpPr>
+          <p:nvPr>
+            <p:ph type="body" idx="1"/>
+          </p:nvPr>
+        </p:nvSpPr>
+        <p:spPr/>
+        <p:txBody>
+          <a:bodyPr/>
+          <a:lstStyle/>
+          <a:p>
+            <a:r>
+              <a:rPr lang="en-US" dirty="0" smtClean="0"/>
+              <a:t>Play Example</a:t>
+            </a:r>
+            <a:r>
+              <a:rPr lang="en-US" baseline="0" dirty="0" smtClean="0"/>
+              <a:t> APRS packet</a:t>
+            </a:r>
+          </a:p>
+          <a:p>
+            <a:r>
+              <a:rPr lang="en-US" baseline="0" dirty="0" smtClean="0"/>
+              <a:t>Brief introduction to flags. Data is only contained in 0.5s worth of the audio file.</a:t>
+            </a:r>
+            <a:endParaRPr lang="en-US" dirty="0"/>
+          </a:p>
+        </p:txBody>
+      </p:sp>
+      <p:sp>
+        <p:nvSpPr>
+          <p:cNvPr id="4" name="Slide Number Placeholder 3"/>
+          <p:cNvSpPr>
+            <a:spLocks noGrp="1"/>
+          </p:cNvSpPr>
+          <p:nvPr>
+            <p:ph type="sldNum" sz="quarter" idx="10"/>
+          </p:nvPr>
+        </p:nvSpPr>
+        <p:spPr/>
+        <p:txBody>
+          <a:bodyPr/>
+          <a:lstStyle/>
+          <a:p>
+            <a:fld id="{40F03367-12A2-4115-91BC-40C376208EF2}" type="slidenum">
+              <a:rPr lang="en-US" smtClean="0"/>
+              <a:t>7</a:t>
+            </a:fld>
+            <a:endParaRPr lang="en-US"/>
+          </a:p>
+        </p:txBody>
+      </p:sp>
+    </p:spTree>
+    <p:extLst>
+      <p:ext uri="{BB962C8B-B14F-4D97-AF65-F5344CB8AC3E}">
+        <p14:creationId xmlns:p14="http://schemas.microsoft.com/office/powerpoint/2010/main" val="3342149527"/>
+      </p:ext>
+    </p:extLst>
+  </p:cSld>
+  <p:clrMapOvr>
+    <a:masterClrMapping/>
+  </p:clrMapOvr>
+</p:notes>
+</file>
+
+<file path=ppt/notesSlides/notesSlide7.xml><?xml version="1.0" encoding="utf-8"?>
+<p:notes xmlns:a="http://schemas.openxmlformats.org/drawingml/2006/main" xmlns:r="http://schemas.openxmlformats.org/officeDocument/2006/relationships" xmlns:p="http://schemas.openxmlformats.org/presentationml/2006/main">
+  <p:cSld>
+    <p:spTree>
+      <p:nvGrpSpPr>
+        <p:cNvPr id="1" name=""/>
+        <p:cNvGrpSpPr/>
+        <p:nvPr/>
+      </p:nvGrpSpPr>
+      <p:grpSpPr>
+        <a:xfrm>
+          <a:off x="0" y="0"/>
+          <a:ext cx="0" cy="0"/>
+          <a:chOff x="0" y="0"/>
+          <a:chExt cx="0" cy="0"/>
+        </a:xfrm>
+      </p:grpSpPr>
+      <p:sp>
+        <p:nvSpPr>
+          <p:cNvPr id="2" name="Slide Image Placeholder 1"/>
+          <p:cNvSpPr>
+            <a:spLocks noGrp="1" noRot="1" noChangeAspect="1"/>
+          </p:cNvSpPr>
+          <p:nvPr>
+            <p:ph type="sldImg"/>
+          </p:nvPr>
+        </p:nvSpPr>
+        <p:spPr/>
+      </p:sp>
+      <p:sp>
+        <p:nvSpPr>
+          <p:cNvPr id="3" name="Notes Placeholder 2"/>
+          <p:cNvSpPr>
+            <a:spLocks noGrp="1"/>
+          </p:cNvSpPr>
+          <p:nvPr>
+            <p:ph type="body" idx="1"/>
+          </p:nvPr>
+        </p:nvSpPr>
+        <p:spPr/>
+        <p:txBody>
+          <a:bodyPr/>
+          <a:lstStyle/>
+          <a:p>
+            <a:r>
+              <a:rPr lang="en-US" dirty="0" smtClean="0"/>
+              <a:t>These approaches are shared in both hardware and software based approaches.</a:t>
+            </a:r>
+            <a:endParaRPr lang="en-US" dirty="0"/>
+          </a:p>
+        </p:txBody>
+      </p:sp>
+      <p:sp>
+        <p:nvSpPr>
+          <p:cNvPr id="4" name="Slide Number Placeholder 3"/>
+          <p:cNvSpPr>
+            <a:spLocks noGrp="1"/>
+          </p:cNvSpPr>
+          <p:nvPr>
+            <p:ph type="sldNum" sz="quarter" idx="10"/>
+          </p:nvPr>
+        </p:nvSpPr>
+        <p:spPr/>
+        <p:txBody>
+          <a:bodyPr/>
+          <a:lstStyle/>
+          <a:p>
+            <a:fld id="{40F03367-12A2-4115-91BC-40C376208EF2}" type="slidenum">
+              <a:rPr lang="en-US" smtClean="0"/>
+              <a:t>8</a:t>
+            </a:fld>
+            <a:endParaRPr lang="en-US"/>
+          </a:p>
+        </p:txBody>
+      </p:sp>
+    </p:spTree>
+    <p:extLst>
+      <p:ext uri="{BB962C8B-B14F-4D97-AF65-F5344CB8AC3E}">
+        <p14:creationId xmlns:p14="http://schemas.microsoft.com/office/powerpoint/2010/main" val="2407579505"/>
+      </p:ext>
+    </p:extLst>
+  </p:cSld>
+  <p:clrMapOvr>
+    <a:masterClrMapping/>
+  </p:clrMapOvr>
+</p:notes>
+</file>
+
 <file path=ppt/slideLayouts/slideLayout1.xml><?xml version="1.0" encoding="utf-8"?>
 <p:sldLayout xmlns:a="http://schemas.openxmlformats.org/drawingml/2006/main" xmlns:r="http://schemas.openxmlformats.org/officeDocument/2006/relationships" xmlns:p="http://schemas.openxmlformats.org/presentationml/2006/main" type="title" preserve="1">
   <p:cSld name="Title Slide">
@@ -174,8 +1233,8 @@
         </p:nvSpPr>
         <p:spPr>
           <a:xfrm>
-            <a:off x="685800" y="1905000"/>
-            <a:ext cx="7543800" cy="2593975"/>
+            <a:off x="685800" y="1428751"/>
+            <a:ext cx="7543800" cy="1945481"/>
           </a:xfrm>
         </p:spPr>
         <p:txBody>
@@ -213,8 +1272,8 @@
         </p:nvSpPr>
         <p:spPr>
           <a:xfrm>
-            <a:off x="685800" y="4572000"/>
-            <a:ext cx="6461760" cy="1066800"/>
+            <a:off x="685800" y="3429000"/>
+            <a:ext cx="6461760" cy="800100"/>
           </a:xfrm>
         </p:spPr>
         <p:txBody>
@@ -337,9 +1396,9 @@
           <a:bodyPr/>
           <a:lstStyle/>
           <a:p>
-            <a:fld id="{E54956DF-4A92-4C14-BA40-5C7CAD464D86}" type="datetimeFigureOut">
-              <a:rPr lang="en-US" smtClean="0"/>
-              <a:t>2/27/2016</a:t>
+            <a:fld id="{DED1A555-0307-4A79-A556-98A44DB0B6FF}" type="datetime1">
+              <a:rPr lang="en-US" smtClean="0"/>
+              <a:t>4/9/2016</a:t>
             </a:fld>
             <a:endParaRPr lang="en-US"/>
           </a:p>
@@ -502,9 +1561,9 @@
           <a:bodyPr/>
           <a:lstStyle/>
           <a:p>
-            <a:fld id="{E54956DF-4A92-4C14-BA40-5C7CAD464D86}" type="datetimeFigureOut">
-              <a:rPr lang="en-US" smtClean="0"/>
-              <a:t>2/27/2016</a:t>
+            <a:fld id="{52D83D95-7A82-4F21-8A65-062EC056839B}" type="datetime1">
+              <a:rPr lang="en-US" smtClean="0"/>
+              <a:t>4/9/2016</a:t>
             </a:fld>
             <a:endParaRPr lang="en-US"/>
           </a:p>
@@ -589,8 +1648,8 @@
         </p:nvSpPr>
         <p:spPr>
           <a:xfrm>
-            <a:off x="6629400" y="274638"/>
-            <a:ext cx="1752600" cy="5851525"/>
+            <a:off x="6629400" y="205979"/>
+            <a:ext cx="1752600" cy="4388644"/>
           </a:xfrm>
         </p:spPr>
         <p:txBody>
@@ -617,8 +1676,8 @@
         </p:nvSpPr>
         <p:spPr>
           <a:xfrm>
-            <a:off x="457200" y="274638"/>
-            <a:ext cx="6019800" cy="5851525"/>
+            <a:off x="457200" y="205979"/>
+            <a:ext cx="6019800" cy="4388644"/>
           </a:xfrm>
         </p:spPr>
         <p:txBody>
@@ -677,9 +1736,9 @@
           <a:bodyPr/>
           <a:lstStyle/>
           <a:p>
-            <a:fld id="{E54956DF-4A92-4C14-BA40-5C7CAD464D86}" type="datetimeFigureOut">
-              <a:rPr lang="en-US" smtClean="0"/>
-              <a:t>2/27/2016</a:t>
+            <a:fld id="{BB0EDF4D-ED1D-4336-A8A7-6B82EB5D2413}" type="datetime1">
+              <a:rPr lang="en-US" smtClean="0"/>
+              <a:t>4/9/2016</a:t>
             </a:fld>
             <a:endParaRPr lang="en-US"/>
           </a:p>
@@ -842,9 +1901,9 @@
           <a:bodyPr/>
           <a:lstStyle/>
           <a:p>
-            <a:fld id="{E54956DF-4A92-4C14-BA40-5C7CAD464D86}" type="datetimeFigureOut">
-              <a:rPr lang="en-US" smtClean="0"/>
-              <a:t>2/27/2016</a:t>
+            <a:fld id="{71352417-BB1A-494E-A4DA-135265FCC881}" type="datetime1">
+              <a:rPr lang="en-US" smtClean="0"/>
+              <a:t>4/9/2016</a:t>
             </a:fld>
             <a:endParaRPr lang="en-US"/>
           </a:p>
@@ -929,8 +1988,8 @@
         </p:nvSpPr>
         <p:spPr>
           <a:xfrm>
-            <a:off x="722313" y="5486400"/>
-            <a:ext cx="7659687" cy="1168400"/>
+            <a:off x="722314" y="4114800"/>
+            <a:ext cx="7659687" cy="876300"/>
           </a:xfrm>
         </p:spPr>
         <p:txBody>
@@ -961,8 +2020,8 @@
         </p:nvSpPr>
         <p:spPr>
           <a:xfrm>
-            <a:off x="722313" y="3852863"/>
-            <a:ext cx="6135687" cy="1633538"/>
+            <a:off x="722314" y="2889647"/>
+            <a:ext cx="6135687" cy="1225154"/>
           </a:xfrm>
         </p:spPr>
         <p:txBody>
@@ -1083,9 +2142,9 @@
           <a:bodyPr/>
           <a:lstStyle/>
           <a:p>
-            <a:fld id="{E54956DF-4A92-4C14-BA40-5C7CAD464D86}" type="datetimeFigureOut">
-              <a:rPr lang="en-US" smtClean="0"/>
-              <a:t>2/27/2016</a:t>
+            <a:fld id="{6F117249-023D-4B77-8123-C8FFD9D02F0B}" type="datetime1">
+              <a:rPr lang="en-US" smtClean="0"/>
+              <a:t>4/9/2016</a:t>
             </a:fld>
             <a:endParaRPr lang="en-US"/>
           </a:p>
@@ -1193,8 +2252,8 @@
         </p:nvSpPr>
         <p:spPr>
           <a:xfrm>
-            <a:off x="457200" y="1536192"/>
-            <a:ext cx="3657600" cy="4590288"/>
+            <a:off x="457200" y="1152144"/>
+            <a:ext cx="3657600" cy="3442716"/>
           </a:xfrm>
         </p:spPr>
         <p:txBody>
@@ -1278,8 +2337,8 @@
         </p:nvSpPr>
         <p:spPr>
           <a:xfrm>
-            <a:off x="4419600" y="1536192"/>
-            <a:ext cx="3657600" cy="4590288"/>
+            <a:off x="4419600" y="1152144"/>
+            <a:ext cx="3657600" cy="3442716"/>
           </a:xfrm>
         </p:spPr>
         <p:txBody>
@@ -1366,9 +2425,9 @@
           <a:bodyPr/>
           <a:lstStyle/>
           <a:p>
-            <a:fld id="{E54956DF-4A92-4C14-BA40-5C7CAD464D86}" type="datetimeFigureOut">
-              <a:rPr lang="en-US" smtClean="0"/>
-              <a:t>2/27/2016</a:t>
+            <a:fld id="{45642988-BB84-4807-9E77-175CE5CECDE0}" type="datetime1">
+              <a:rPr lang="en-US" smtClean="0"/>
+              <a:t>4/9/2016</a:t>
             </a:fld>
             <a:endParaRPr lang="en-US"/>
           </a:p>
@@ -1480,8 +2539,8 @@
         </p:nvSpPr>
         <p:spPr>
           <a:xfrm>
-            <a:off x="457200" y="1535113"/>
-            <a:ext cx="3657600" cy="639762"/>
+            <a:off x="457200" y="1151335"/>
+            <a:ext cx="3657600" cy="479822"/>
           </a:xfrm>
         </p:spPr>
         <p:txBody>
@@ -1551,8 +2610,8 @@
         </p:nvSpPr>
         <p:spPr>
           <a:xfrm>
-            <a:off x="457200" y="2174875"/>
-            <a:ext cx="3657600" cy="3951288"/>
+            <a:off x="457200" y="1631156"/>
+            <a:ext cx="3657600" cy="2963466"/>
           </a:xfrm>
         </p:spPr>
         <p:txBody>
@@ -1636,8 +2695,8 @@
         </p:nvSpPr>
         <p:spPr>
           <a:xfrm>
-            <a:off x="4419600" y="1535113"/>
-            <a:ext cx="3657600" cy="639762"/>
+            <a:off x="4419600" y="1151335"/>
+            <a:ext cx="3657600" cy="479822"/>
           </a:xfrm>
         </p:spPr>
         <p:txBody>
@@ -1707,8 +2766,8 @@
         </p:nvSpPr>
         <p:spPr>
           <a:xfrm>
-            <a:off x="4419600" y="2174875"/>
-            <a:ext cx="3657600" cy="3951288"/>
+            <a:off x="4419600" y="1631156"/>
+            <a:ext cx="3657600" cy="2963466"/>
           </a:xfrm>
         </p:spPr>
         <p:txBody>
@@ -1795,9 +2854,9 @@
           <a:bodyPr/>
           <a:lstStyle/>
           <a:p>
-            <a:fld id="{E54956DF-4A92-4C14-BA40-5C7CAD464D86}" type="datetimeFigureOut">
-              <a:rPr lang="en-US" smtClean="0"/>
-              <a:t>2/27/2016</a:t>
+            <a:fld id="{6D96F54B-A69F-4859-ADA4-B2253D584FB6}" type="datetime1">
+              <a:rPr lang="en-US" smtClean="0"/>
+              <a:t>4/9/2016</a:t>
             </a:fld>
             <a:endParaRPr lang="en-US"/>
           </a:p>
@@ -1908,9 +2967,9 @@
           <a:bodyPr/>
           <a:lstStyle/>
           <a:p>
-            <a:fld id="{E54956DF-4A92-4C14-BA40-5C7CAD464D86}" type="datetimeFigureOut">
-              <a:rPr lang="en-US" smtClean="0"/>
-              <a:t>2/27/2016</a:t>
+            <a:fld id="{B70C02B0-0B73-49BF-B56F-7F628100337A}" type="datetime1">
+              <a:rPr lang="en-US" smtClean="0"/>
+              <a:t>4/9/2016</a:t>
             </a:fld>
             <a:endParaRPr lang="en-US"/>
           </a:p>
@@ -1998,9 +3057,9 @@
           <a:bodyPr/>
           <a:lstStyle/>
           <a:p>
-            <a:fld id="{E54956DF-4A92-4C14-BA40-5C7CAD464D86}" type="datetimeFigureOut">
-              <a:rPr lang="en-US" smtClean="0"/>
-              <a:t>2/27/2016</a:t>
+            <a:fld id="{61AC1934-F2BC-46DA-BF21-8FEDF0D97A28}" type="datetime1">
+              <a:rPr lang="en-US" smtClean="0"/>
+              <a:t>4/9/2016</a:t>
             </a:fld>
             <a:endParaRPr lang="en-US"/>
           </a:p>
@@ -2085,8 +3144,8 @@
         </p:nvSpPr>
         <p:spPr>
           <a:xfrm>
-            <a:off x="304801" y="5495544"/>
-            <a:ext cx="7772400" cy="594360"/>
+            <a:off x="304801" y="4121658"/>
+            <a:ext cx="7772400" cy="445770"/>
           </a:xfrm>
         </p:spPr>
         <p:txBody>
@@ -2117,8 +3176,8 @@
         </p:nvSpPr>
         <p:spPr>
           <a:xfrm>
-            <a:off x="304799" y="6096000"/>
-            <a:ext cx="7772401" cy="609600"/>
+            <a:off x="304800" y="4572000"/>
+            <a:ext cx="7772401" cy="457200"/>
           </a:xfrm>
         </p:spPr>
         <p:txBody>
@@ -2187,9 +3246,9 @@
           <a:bodyPr/>
           <a:lstStyle/>
           <a:p>
-            <a:fld id="{E54956DF-4A92-4C14-BA40-5C7CAD464D86}" type="datetimeFigureOut">
-              <a:rPr lang="en-US" smtClean="0"/>
-              <a:t>2/27/2016</a:t>
+            <a:fld id="{059CEC1F-F11C-4127-80E5-4FA9DF92B5D8}" type="datetime1">
+              <a:rPr lang="en-US" smtClean="0"/>
+              <a:t>4/9/2016</a:t>
             </a:fld>
             <a:endParaRPr lang="en-US"/>
           </a:p>
@@ -2249,8 +3308,8 @@
         </p:nvSpPr>
         <p:spPr>
           <a:xfrm>
-            <a:off x="304800" y="381000"/>
-            <a:ext cx="7772400" cy="4942840"/>
+            <a:off x="304800" y="285750"/>
+            <a:ext cx="7772400" cy="3707130"/>
           </a:xfrm>
         </p:spPr>
         <p:txBody>
@@ -2331,8 +3390,8 @@
         </p:nvSpPr>
         <p:spPr>
           <a:xfrm>
-            <a:off x="301752" y="5495278"/>
-            <a:ext cx="7772400" cy="594626"/>
+            <a:off x="301752" y="4121458"/>
+            <a:ext cx="7772400" cy="445970"/>
           </a:xfrm>
         </p:spPr>
         <p:txBody>
@@ -2371,7 +3430,7 @@
         <p:spPr>
           <a:xfrm>
             <a:off x="0" y="0"/>
-            <a:ext cx="8458200" cy="5486400"/>
+            <a:ext cx="8458200" cy="4114800"/>
           </a:xfrm>
         </p:spPr>
         <p:txBody>
@@ -2435,8 +3494,8 @@
         </p:nvSpPr>
         <p:spPr>
           <a:xfrm>
-            <a:off x="301752" y="6096000"/>
-            <a:ext cx="7772400" cy="612648"/>
+            <a:off x="301752" y="4572000"/>
+            <a:ext cx="7772400" cy="459486"/>
           </a:xfrm>
         </p:spPr>
         <p:txBody>
@@ -2505,9 +3564,9 @@
           <a:bodyPr/>
           <a:lstStyle/>
           <a:p>
-            <a:fld id="{E54956DF-4A92-4C14-BA40-5C7CAD464D86}" type="datetimeFigureOut">
-              <a:rPr lang="en-US" smtClean="0"/>
-              <a:t>2/27/2016</a:t>
+            <a:fld id="{265B60AB-6060-4DC1-97F7-58A23AAF3FD2}" type="datetime1">
+              <a:rPr lang="en-US" smtClean="0"/>
+              <a:t>4/9/2016</a:t>
             </a:fld>
             <a:endParaRPr lang="en-US"/>
           </a:p>
@@ -2597,8 +3656,8 @@
         </p:nvSpPr>
         <p:spPr>
           <a:xfrm>
-            <a:off x="457200" y="274638"/>
-            <a:ext cx="7620000" cy="1143000"/>
+            <a:off x="457200" y="205979"/>
+            <a:ext cx="7620000" cy="857250"/>
           </a:xfrm>
           <a:prstGeom prst="rect">
             <a:avLst/>
@@ -2630,8 +3689,8 @@
         </p:nvSpPr>
         <p:spPr>
           <a:xfrm>
-            <a:off x="457200" y="1600200"/>
-            <a:ext cx="7620000" cy="4800600"/>
+            <a:off x="457200" y="1200150"/>
+            <a:ext cx="7620000" cy="3600450"/>
           </a:xfrm>
           <a:prstGeom prst="rect">
             <a:avLst/>
@@ -2689,7 +3748,7 @@
         <p:spPr>
           <a:xfrm>
             <a:off x="8458200" y="0"/>
-            <a:ext cx="685800" cy="6858000"/>
+            <a:ext cx="685800" cy="5143500"/>
           </a:xfrm>
           <a:prstGeom prst="rect">
             <a:avLst/>
@@ -2734,8 +3793,8 @@
         </p:nvSpPr>
         <p:spPr>
           <a:xfrm>
-            <a:off x="8458200" y="5486400"/>
-            <a:ext cx="685800" cy="685800"/>
+            <a:off x="8458200" y="4114800"/>
+            <a:ext cx="685800" cy="514350"/>
           </a:xfrm>
           <a:prstGeom prst="rect">
             <a:avLst/>
@@ -2784,8 +3843,8 @@
         </p:nvSpPr>
         <p:spPr>
           <a:xfrm>
-            <a:off x="8531788" y="5648960"/>
-            <a:ext cx="548640" cy="396240"/>
+            <a:off x="8531788" y="4236720"/>
+            <a:ext cx="548640" cy="297180"/>
           </a:xfrm>
           <a:prstGeom prst="bracketPair">
             <a:avLst>
@@ -2830,8 +3889,8 @@
         </p:nvSpPr>
         <p:spPr>
           <a:xfrm rot="16200000">
-            <a:off x="7586910" y="4048760"/>
-            <a:ext cx="2367281" cy="365760"/>
+            <a:off x="7882821" y="2990850"/>
+            <a:ext cx="1775461" cy="365760"/>
           </a:xfrm>
           <a:prstGeom prst="rect">
             <a:avLst/>
@@ -2865,8 +3924,8 @@
         </p:nvSpPr>
         <p:spPr>
           <a:xfrm rot="16200000">
-            <a:off x="7551351" y="1645920"/>
-            <a:ext cx="2438399" cy="365760"/>
+            <a:off x="7856152" y="1188720"/>
+            <a:ext cx="1828799" cy="365760"/>
           </a:xfrm>
           <a:prstGeom prst="rect">
             <a:avLst/>
@@ -2884,9 +3943,9 @@
             </a:lvl1pPr>
           </a:lstStyle>
           <a:p>
-            <a:fld id="{E54956DF-4A92-4C14-BA40-5C7CAD464D86}" type="datetimeFigureOut">
-              <a:rPr lang="en-US" smtClean="0"/>
-              <a:t>2/27/2016</a:t>
+            <a:fld id="{B236E3DE-3988-44CB-9697-C84D864E0643}" type="datetime1">
+              <a:rPr lang="en-US" smtClean="0"/>
+              <a:t>4/9/2016</a:t>
             </a:fld>
             <a:endParaRPr lang="en-US"/>
           </a:p>
@@ -2908,6 +3967,7 @@
     <p:sldLayoutId id="2147483670" r:id="rId10"/>
     <p:sldLayoutId id="2147483671" r:id="rId11"/>
   </p:sldLayoutIdLst>
+  <p:hf hdr="0" ftr="0" dt="0"/>
   <p:txStyles>
     <p:titleStyle>
       <a:lvl1pPr algn="l" defTabSz="914400" rtl="0" eaLnBrk="1" latinLnBrk="0" hangingPunct="1">
@@ -3251,7 +4311,9 @@
         </p:nvSpPr>
         <p:spPr/>
         <p:txBody>
-          <a:bodyPr/>
+          <a:bodyPr>
+            <a:normAutofit fontScale="85000" lnSpcReduction="20000"/>
+          </a:bodyPr>
           <a:lstStyle/>
           <a:p>
             <a:r>
@@ -3277,6 +4339,29 @@
               <a:t>Derickson</a:t>
             </a:r>
             <a:endParaRPr lang="en-US" dirty="0"/>
+          </a:p>
+        </p:txBody>
+      </p:sp>
+      <p:sp>
+        <p:nvSpPr>
+          <p:cNvPr id="4" name="Slide Number Placeholder 3"/>
+          <p:cNvSpPr>
+            <a:spLocks noGrp="1"/>
+          </p:cNvSpPr>
+          <p:nvPr>
+            <p:ph type="sldNum" sz="quarter" idx="12"/>
+          </p:nvPr>
+        </p:nvSpPr>
+        <p:spPr/>
+        <p:txBody>
+          <a:bodyPr/>
+          <a:lstStyle/>
+          <a:p>
+            <a:fld id="{3C11000A-9EC0-40DA-B0AC-602B3E73336E}" type="slidenum">
+              <a:rPr lang="en-US" smtClean="0"/>
+              <a:t>1</a:t>
+            </a:fld>
+            <a:endParaRPr lang="en-US"/>
           </a:p>
         </p:txBody>
       </p:sp>
@@ -3327,7 +4412,7 @@
           <a:p>
             <a:r>
               <a:rPr lang="en-US" dirty="0" smtClean="0"/>
-              <a:t>Phase Locked Loop (PLL)</a:t>
+              <a:t>Correlation</a:t>
             </a:r>
             <a:endParaRPr lang="en-US" dirty="0"/>
           </a:p>
@@ -3349,9 +4434,32 @@
           <a:lstStyle/>
           <a:p>
             <a:r>
-              <a:rPr lang="en-US" smtClean="0"/>
-              <a:t> </a:t>
-            </a:r>
+              <a:rPr lang="en-US" dirty="0" smtClean="0"/>
+              <a:t>Correlates original signal with expected signals.</a:t>
+            </a:r>
+            <a:endParaRPr lang="en-US" dirty="0"/>
+          </a:p>
+        </p:txBody>
+      </p:sp>
+      <p:sp>
+        <p:nvSpPr>
+          <p:cNvPr id="4" name="Slide Number Placeholder 3"/>
+          <p:cNvSpPr>
+            <a:spLocks noGrp="1"/>
+          </p:cNvSpPr>
+          <p:nvPr>
+            <p:ph type="sldNum" sz="quarter" idx="12"/>
+          </p:nvPr>
+        </p:nvSpPr>
+        <p:spPr/>
+        <p:txBody>
+          <a:bodyPr/>
+          <a:lstStyle/>
+          <a:p>
+            <a:fld id="{3C11000A-9EC0-40DA-B0AC-602B3E73336E}" type="slidenum">
+              <a:rPr lang="en-US" smtClean="0"/>
+              <a:t>10</a:t>
+            </a:fld>
             <a:endParaRPr lang="en-US"/>
           </a:p>
         </p:txBody>
@@ -3359,7 +4467,7 @@
     </p:spTree>
     <p:extLst>
       <p:ext uri="{BB962C8B-B14F-4D97-AF65-F5344CB8AC3E}">
-        <p14:creationId xmlns:p14="http://schemas.microsoft.com/office/powerpoint/2010/main" val="4095158208"/>
+        <p14:creationId xmlns:p14="http://schemas.microsoft.com/office/powerpoint/2010/main" val="2028967215"/>
       </p:ext>
     </p:extLst>
   </p:cSld>
@@ -3403,7 +4511,7 @@
           <a:p>
             <a:r>
               <a:rPr lang="en-US" dirty="0" smtClean="0"/>
-              <a:t>Approaches to Accessing the Network</a:t>
+              <a:t>Filters</a:t>
             </a:r>
             <a:endParaRPr lang="en-US" dirty="0"/>
           </a:p>
@@ -3426,28 +4534,39 @@
           <a:p>
             <a:r>
               <a:rPr lang="en-US" dirty="0" smtClean="0"/>
-              <a:t>Terminal Node Controllers</a:t>
-            </a:r>
-          </a:p>
-          <a:p>
-            <a:r>
-              <a:rPr lang="en-US" dirty="0" smtClean="0"/>
-              <a:t>Specialty APRS Hardware</a:t>
-            </a:r>
-          </a:p>
-          <a:p>
-            <a:r>
-              <a:rPr lang="en-US" dirty="0" smtClean="0"/>
-              <a:t>Software</a:t>
+              <a:t>Filters look at signal strength of individual frequencies</a:t>
             </a:r>
             <a:endParaRPr lang="en-US" dirty="0"/>
+          </a:p>
+        </p:txBody>
+      </p:sp>
+      <p:sp>
+        <p:nvSpPr>
+          <p:cNvPr id="4" name="Slide Number Placeholder 3"/>
+          <p:cNvSpPr>
+            <a:spLocks noGrp="1"/>
+          </p:cNvSpPr>
+          <p:nvPr>
+            <p:ph type="sldNum" sz="quarter" idx="12"/>
+          </p:nvPr>
+        </p:nvSpPr>
+        <p:spPr/>
+        <p:txBody>
+          <a:bodyPr/>
+          <a:lstStyle/>
+          <a:p>
+            <a:fld id="{3C11000A-9EC0-40DA-B0AC-602B3E73336E}" type="slidenum">
+              <a:rPr lang="en-US" smtClean="0"/>
+              <a:t>11</a:t>
+            </a:fld>
+            <a:endParaRPr lang="en-US"/>
           </a:p>
         </p:txBody>
       </p:sp>
     </p:spTree>
     <p:extLst>
       <p:ext uri="{BB962C8B-B14F-4D97-AF65-F5344CB8AC3E}">
-        <p14:creationId xmlns:p14="http://schemas.microsoft.com/office/powerpoint/2010/main" val="2859884497"/>
+        <p14:creationId xmlns:p14="http://schemas.microsoft.com/office/powerpoint/2010/main" val="32162559"/>
       </p:ext>
     </p:extLst>
   </p:cSld>
@@ -3491,7 +4610,7 @@
           <a:p>
             <a:r>
               <a:rPr lang="en-US" dirty="0" smtClean="0"/>
-              <a:t>TNC Example: PK-232</a:t>
+              <a:t>Phase Locked Loop (PLL)</a:t>
             </a:r>
             <a:endParaRPr lang="en-US" dirty="0"/>
           </a:p>
@@ -3512,6 +4631,33 @@
           <a:bodyPr/>
           <a:lstStyle/>
           <a:p>
+            <a:r>
+              <a:rPr lang="en-US" smtClean="0"/>
+              <a:t> </a:t>
+            </a:r>
+            <a:endParaRPr lang="en-US"/>
+          </a:p>
+        </p:txBody>
+      </p:sp>
+      <p:sp>
+        <p:nvSpPr>
+          <p:cNvPr id="4" name="Slide Number Placeholder 3"/>
+          <p:cNvSpPr>
+            <a:spLocks noGrp="1"/>
+          </p:cNvSpPr>
+          <p:nvPr>
+            <p:ph type="sldNum" sz="quarter" idx="12"/>
+          </p:nvPr>
+        </p:nvSpPr>
+        <p:spPr/>
+        <p:txBody>
+          <a:bodyPr/>
+          <a:lstStyle/>
+          <a:p>
+            <a:fld id="{3C11000A-9EC0-40DA-B0AC-602B3E73336E}" type="slidenum">
+              <a:rPr lang="en-US" smtClean="0"/>
+              <a:t>12</a:t>
+            </a:fld>
             <a:endParaRPr lang="en-US"/>
           </a:p>
         </p:txBody>
@@ -3519,7 +4665,7 @@
     </p:spTree>
     <p:extLst>
       <p:ext uri="{BB962C8B-B14F-4D97-AF65-F5344CB8AC3E}">
-        <p14:creationId xmlns:p14="http://schemas.microsoft.com/office/powerpoint/2010/main" val="4108006021"/>
+        <p14:creationId xmlns:p14="http://schemas.microsoft.com/office/powerpoint/2010/main" val="4095158208"/>
       </p:ext>
     </p:extLst>
   </p:cSld>
@@ -3563,7 +4709,7 @@
           <a:p>
             <a:r>
               <a:rPr lang="en-US" dirty="0" smtClean="0"/>
-              <a:t>TNC Example: MFJ-1278</a:t>
+              <a:t>Approaches to Accessing the Network</a:t>
             </a:r>
             <a:endParaRPr lang="en-US" dirty="0"/>
           </a:p>
@@ -3584,6 +4730,45 @@
           <a:bodyPr/>
           <a:lstStyle/>
           <a:p>
+            <a:r>
+              <a:rPr lang="en-US" dirty="0" smtClean="0"/>
+              <a:t>Terminal Node Controllers</a:t>
+            </a:r>
+          </a:p>
+          <a:p>
+            <a:r>
+              <a:rPr lang="en-US" dirty="0" smtClean="0"/>
+              <a:t>Specialty APRS Hardware</a:t>
+            </a:r>
+          </a:p>
+          <a:p>
+            <a:r>
+              <a:rPr lang="en-US" dirty="0" smtClean="0"/>
+              <a:t>Software</a:t>
+            </a:r>
+            <a:endParaRPr lang="en-US" dirty="0"/>
+          </a:p>
+        </p:txBody>
+      </p:sp>
+      <p:sp>
+        <p:nvSpPr>
+          <p:cNvPr id="4" name="Slide Number Placeholder 3"/>
+          <p:cNvSpPr>
+            <a:spLocks noGrp="1"/>
+          </p:cNvSpPr>
+          <p:nvPr>
+            <p:ph type="sldNum" sz="quarter" idx="12"/>
+          </p:nvPr>
+        </p:nvSpPr>
+        <p:spPr/>
+        <p:txBody>
+          <a:bodyPr/>
+          <a:lstStyle/>
+          <a:p>
+            <a:fld id="{3C11000A-9EC0-40DA-B0AC-602B3E73336E}" type="slidenum">
+              <a:rPr lang="en-US" smtClean="0"/>
+              <a:t>13</a:t>
+            </a:fld>
             <a:endParaRPr lang="en-US"/>
           </a:p>
         </p:txBody>
@@ -3591,7 +4776,7 @@
     </p:spTree>
     <p:extLst>
       <p:ext uri="{BB962C8B-B14F-4D97-AF65-F5344CB8AC3E}">
-        <p14:creationId xmlns:p14="http://schemas.microsoft.com/office/powerpoint/2010/main" val="1292577241"/>
+        <p14:creationId xmlns:p14="http://schemas.microsoft.com/office/powerpoint/2010/main" val="2859884497"/>
       </p:ext>
     </p:extLst>
   </p:cSld>
@@ -3635,15 +4820,7 @@
           <a:p>
             <a:r>
               <a:rPr lang="en-US" dirty="0" smtClean="0"/>
-              <a:t>TNC Example: </a:t>
-            </a:r>
-            <a:r>
-              <a:rPr lang="en-US" dirty="0" err="1" smtClean="0"/>
-              <a:t>Kantronics</a:t>
-            </a:r>
-            <a:r>
-              <a:rPr lang="en-US" dirty="0" smtClean="0"/>
-              <a:t> KAM</a:t>
+              <a:t>TNC Example: PK-232</a:t>
             </a:r>
             <a:endParaRPr lang="en-US" dirty="0"/>
           </a:p>
@@ -3664,6 +4841,29 @@
           <a:bodyPr/>
           <a:lstStyle/>
           <a:p>
+            <a:endParaRPr lang="en-US"/>
+          </a:p>
+        </p:txBody>
+      </p:sp>
+      <p:sp>
+        <p:nvSpPr>
+          <p:cNvPr id="4" name="Slide Number Placeholder 3"/>
+          <p:cNvSpPr>
+            <a:spLocks noGrp="1"/>
+          </p:cNvSpPr>
+          <p:nvPr>
+            <p:ph type="sldNum" sz="quarter" idx="12"/>
+          </p:nvPr>
+        </p:nvSpPr>
+        <p:spPr/>
+        <p:txBody>
+          <a:bodyPr/>
+          <a:lstStyle/>
+          <a:p>
+            <a:fld id="{3C11000A-9EC0-40DA-B0AC-602B3E73336E}" type="slidenum">
+              <a:rPr lang="en-US" smtClean="0"/>
+              <a:t>14</a:t>
+            </a:fld>
             <a:endParaRPr lang="en-US"/>
           </a:p>
         </p:txBody>
@@ -3671,7 +4871,7 @@
     </p:spTree>
     <p:extLst>
       <p:ext uri="{BB962C8B-B14F-4D97-AF65-F5344CB8AC3E}">
-        <p14:creationId xmlns:p14="http://schemas.microsoft.com/office/powerpoint/2010/main" val="1895688388"/>
+        <p14:creationId xmlns:p14="http://schemas.microsoft.com/office/powerpoint/2010/main" val="4108006021"/>
       </p:ext>
     </p:extLst>
   </p:cSld>
@@ -3715,11 +4915,7 @@
           <a:p>
             <a:r>
               <a:rPr lang="en-US" dirty="0" smtClean="0"/>
-              <a:t>APRS </a:t>
-            </a:r>
-            <a:r>
-              <a:rPr lang="en-US" smtClean="0"/>
-              <a:t>Open Trackers</a:t>
+              <a:t>TNC Example: MFJ-1278</a:t>
             </a:r>
             <a:endParaRPr lang="en-US" dirty="0"/>
           </a:p>
@@ -3740,6 +4936,29 @@
           <a:bodyPr/>
           <a:lstStyle/>
           <a:p>
+            <a:endParaRPr lang="en-US"/>
+          </a:p>
+        </p:txBody>
+      </p:sp>
+      <p:sp>
+        <p:nvSpPr>
+          <p:cNvPr id="4" name="Slide Number Placeholder 3"/>
+          <p:cNvSpPr>
+            <a:spLocks noGrp="1"/>
+          </p:cNvSpPr>
+          <p:nvPr>
+            <p:ph type="sldNum" sz="quarter" idx="12"/>
+          </p:nvPr>
+        </p:nvSpPr>
+        <p:spPr/>
+        <p:txBody>
+          <a:bodyPr/>
+          <a:lstStyle/>
+          <a:p>
+            <a:fld id="{3C11000A-9EC0-40DA-B0AC-602B3E73336E}" type="slidenum">
+              <a:rPr lang="en-US" smtClean="0"/>
+              <a:t>15</a:t>
+            </a:fld>
             <a:endParaRPr lang="en-US"/>
           </a:p>
         </p:txBody>
@@ -3747,7 +4966,7 @@
     </p:spTree>
     <p:extLst>
       <p:ext uri="{BB962C8B-B14F-4D97-AF65-F5344CB8AC3E}">
-        <p14:creationId xmlns:p14="http://schemas.microsoft.com/office/powerpoint/2010/main" val="1457167290"/>
+        <p14:creationId xmlns:p14="http://schemas.microsoft.com/office/powerpoint/2010/main" val="1292577241"/>
       </p:ext>
     </p:extLst>
   </p:cSld>
@@ -3791,7 +5010,15 @@
           <a:p>
             <a:r>
               <a:rPr lang="en-US" dirty="0" smtClean="0"/>
-              <a:t>AGWPE</a:t>
+              <a:t>TNC Example: </a:t>
+            </a:r>
+            <a:r>
+              <a:rPr lang="en-US" dirty="0" err="1" smtClean="0"/>
+              <a:t>Kantronics</a:t>
+            </a:r>
+            <a:r>
+              <a:rPr lang="en-US" dirty="0" smtClean="0"/>
+              <a:t> KAM</a:t>
             </a:r>
             <a:endParaRPr lang="en-US" dirty="0"/>
           </a:p>
@@ -3812,6 +5039,29 @@
           <a:bodyPr/>
           <a:lstStyle/>
           <a:p>
+            <a:endParaRPr lang="en-US"/>
+          </a:p>
+        </p:txBody>
+      </p:sp>
+      <p:sp>
+        <p:nvSpPr>
+          <p:cNvPr id="4" name="Slide Number Placeholder 3"/>
+          <p:cNvSpPr>
+            <a:spLocks noGrp="1"/>
+          </p:cNvSpPr>
+          <p:nvPr>
+            <p:ph type="sldNum" sz="quarter" idx="12"/>
+          </p:nvPr>
+        </p:nvSpPr>
+        <p:spPr/>
+        <p:txBody>
+          <a:bodyPr/>
+          <a:lstStyle/>
+          <a:p>
+            <a:fld id="{3C11000A-9EC0-40DA-B0AC-602B3E73336E}" type="slidenum">
+              <a:rPr lang="en-US" smtClean="0"/>
+              <a:t>16</a:t>
+            </a:fld>
             <a:endParaRPr lang="en-US"/>
           </a:p>
         </p:txBody>
@@ -3819,7 +5069,7 @@
     </p:spTree>
     <p:extLst>
       <p:ext uri="{BB962C8B-B14F-4D97-AF65-F5344CB8AC3E}">
-        <p14:creationId xmlns:p14="http://schemas.microsoft.com/office/powerpoint/2010/main" val="913351117"/>
+        <p14:creationId xmlns:p14="http://schemas.microsoft.com/office/powerpoint/2010/main" val="1895688388"/>
       </p:ext>
     </p:extLst>
   </p:cSld>
@@ -3863,7 +5113,11 @@
           <a:p>
             <a:r>
               <a:rPr lang="en-US" dirty="0" smtClean="0"/>
-              <a:t>javAX25</a:t>
+              <a:t>APRS </a:t>
+            </a:r>
+            <a:r>
+              <a:rPr lang="en-US" smtClean="0"/>
+              <a:t>Open Trackers</a:t>
             </a:r>
             <a:endParaRPr lang="en-US" dirty="0"/>
           </a:p>
@@ -3884,6 +5138,29 @@
           <a:bodyPr/>
           <a:lstStyle/>
           <a:p>
+            <a:endParaRPr lang="en-US"/>
+          </a:p>
+        </p:txBody>
+      </p:sp>
+      <p:sp>
+        <p:nvSpPr>
+          <p:cNvPr id="4" name="Slide Number Placeholder 3"/>
+          <p:cNvSpPr>
+            <a:spLocks noGrp="1"/>
+          </p:cNvSpPr>
+          <p:nvPr>
+            <p:ph type="sldNum" sz="quarter" idx="12"/>
+          </p:nvPr>
+        </p:nvSpPr>
+        <p:spPr/>
+        <p:txBody>
+          <a:bodyPr/>
+          <a:lstStyle/>
+          <a:p>
+            <a:fld id="{3C11000A-9EC0-40DA-B0AC-602B3E73336E}" type="slidenum">
+              <a:rPr lang="en-US" smtClean="0"/>
+              <a:t>17</a:t>
+            </a:fld>
             <a:endParaRPr lang="en-US"/>
           </a:p>
         </p:txBody>
@@ -3891,7 +5168,7 @@
     </p:spTree>
     <p:extLst>
       <p:ext uri="{BB962C8B-B14F-4D97-AF65-F5344CB8AC3E}">
-        <p14:creationId xmlns:p14="http://schemas.microsoft.com/office/powerpoint/2010/main" val="1035780179"/>
+        <p14:creationId xmlns:p14="http://schemas.microsoft.com/office/powerpoint/2010/main" val="1457167290"/>
       </p:ext>
     </p:extLst>
   </p:cSld>
@@ -3935,7 +5212,7 @@
           <a:p>
             <a:r>
               <a:rPr lang="en-US" dirty="0" smtClean="0"/>
-              <a:t>Challenges</a:t>
+              <a:t>AGWPE</a:t>
             </a:r>
             <a:endParaRPr lang="en-US" dirty="0"/>
           </a:p>
@@ -3956,30 +5233,37 @@
           <a:bodyPr/>
           <a:lstStyle/>
           <a:p>
-            <a:r>
-              <a:rPr lang="en-US" dirty="0" smtClean="0"/>
-              <a:t>DC Offset</a:t>
-            </a:r>
-          </a:p>
-          <a:p>
-            <a:r>
-              <a:rPr lang="en-US" dirty="0" smtClean="0"/>
-              <a:t>Noise</a:t>
-            </a:r>
-          </a:p>
-          <a:p>
-            <a:r>
-              <a:rPr lang="en-US" dirty="0" smtClean="0"/>
-              <a:t>Emphasis</a:t>
-            </a:r>
-            <a:endParaRPr lang="en-US" dirty="0"/>
+            <a:endParaRPr lang="en-US"/>
+          </a:p>
+        </p:txBody>
+      </p:sp>
+      <p:sp>
+        <p:nvSpPr>
+          <p:cNvPr id="4" name="Slide Number Placeholder 3"/>
+          <p:cNvSpPr>
+            <a:spLocks noGrp="1"/>
+          </p:cNvSpPr>
+          <p:nvPr>
+            <p:ph type="sldNum" sz="quarter" idx="12"/>
+          </p:nvPr>
+        </p:nvSpPr>
+        <p:spPr/>
+        <p:txBody>
+          <a:bodyPr/>
+          <a:lstStyle/>
+          <a:p>
+            <a:fld id="{3C11000A-9EC0-40DA-B0AC-602B3E73336E}" type="slidenum">
+              <a:rPr lang="en-US" smtClean="0"/>
+              <a:t>18</a:t>
+            </a:fld>
+            <a:endParaRPr lang="en-US"/>
           </a:p>
         </p:txBody>
       </p:sp>
     </p:spTree>
     <p:extLst>
       <p:ext uri="{BB962C8B-B14F-4D97-AF65-F5344CB8AC3E}">
-        <p14:creationId xmlns:p14="http://schemas.microsoft.com/office/powerpoint/2010/main" val="2519101358"/>
+        <p14:creationId xmlns:p14="http://schemas.microsoft.com/office/powerpoint/2010/main" val="913351117"/>
       </p:ext>
     </p:extLst>
   </p:cSld>
@@ -4023,7 +5307,7 @@
           <a:p>
             <a:r>
               <a:rPr lang="en-US" dirty="0" smtClean="0"/>
-              <a:t>DC Offset</a:t>
+              <a:t>javAX25</a:t>
             </a:r>
             <a:endParaRPr lang="en-US" dirty="0"/>
           </a:p>
@@ -4044,6 +5328,29 @@
           <a:bodyPr/>
           <a:lstStyle/>
           <a:p>
+            <a:endParaRPr lang="en-US"/>
+          </a:p>
+        </p:txBody>
+      </p:sp>
+      <p:sp>
+        <p:nvSpPr>
+          <p:cNvPr id="4" name="Slide Number Placeholder 3"/>
+          <p:cNvSpPr>
+            <a:spLocks noGrp="1"/>
+          </p:cNvSpPr>
+          <p:nvPr>
+            <p:ph type="sldNum" sz="quarter" idx="12"/>
+          </p:nvPr>
+        </p:nvSpPr>
+        <p:spPr/>
+        <p:txBody>
+          <a:bodyPr/>
+          <a:lstStyle/>
+          <a:p>
+            <a:fld id="{3C11000A-9EC0-40DA-B0AC-602B3E73336E}" type="slidenum">
+              <a:rPr lang="en-US" smtClean="0"/>
+              <a:t>19</a:t>
+            </a:fld>
             <a:endParaRPr lang="en-US"/>
           </a:p>
         </p:txBody>
@@ -4051,7 +5358,7 @@
     </p:spTree>
     <p:extLst>
       <p:ext uri="{BB962C8B-B14F-4D97-AF65-F5344CB8AC3E}">
-        <p14:creationId xmlns:p14="http://schemas.microsoft.com/office/powerpoint/2010/main" val="441966729"/>
+        <p14:creationId xmlns:p14="http://schemas.microsoft.com/office/powerpoint/2010/main" val="1035780179"/>
       </p:ext>
     </p:extLst>
   </p:cSld>
@@ -4130,9 +5437,40 @@
           <a:p>
             <a:r>
               <a:rPr lang="en-US" dirty="0" smtClean="0"/>
-              <a:t>Encoded onto the Radio Using Bell 202</a:t>
+              <a:t>Encoded </a:t>
+            </a:r>
+            <a:r>
+              <a:rPr lang="en-US" dirty="0" smtClean="0"/>
+              <a:t>into the </a:t>
+            </a:r>
+            <a:r>
+              <a:rPr lang="en-US" dirty="0" smtClean="0"/>
+              <a:t>Radio Using Bell 202</a:t>
             </a:r>
             <a:endParaRPr lang="en-US" dirty="0"/>
+          </a:p>
+        </p:txBody>
+      </p:sp>
+      <p:sp>
+        <p:nvSpPr>
+          <p:cNvPr id="4" name="Slide Number Placeholder 3"/>
+          <p:cNvSpPr>
+            <a:spLocks noGrp="1"/>
+          </p:cNvSpPr>
+          <p:nvPr>
+            <p:ph type="sldNum" sz="quarter" idx="12"/>
+          </p:nvPr>
+        </p:nvSpPr>
+        <p:spPr/>
+        <p:txBody>
+          <a:bodyPr/>
+          <a:lstStyle/>
+          <a:p>
+            <a:fld id="{3C11000A-9EC0-40DA-B0AC-602B3E73336E}" type="slidenum">
+              <a:rPr lang="en-US" smtClean="0"/>
+              <a:t>2</a:t>
+            </a:fld>
+            <a:endParaRPr lang="en-US"/>
           </a:p>
         </p:txBody>
       </p:sp>
@@ -4183,27 +5521,66 @@
           <a:p>
             <a:r>
               <a:rPr lang="en-US" dirty="0" smtClean="0"/>
+              <a:t>Challenges</a:t>
+            </a:r>
+            <a:endParaRPr lang="en-US" dirty="0"/>
+          </a:p>
+        </p:txBody>
+      </p:sp>
+      <p:sp>
+        <p:nvSpPr>
+          <p:cNvPr id="3" name="Content Placeholder 2"/>
+          <p:cNvSpPr>
+            <a:spLocks noGrp="1"/>
+          </p:cNvSpPr>
+          <p:nvPr>
+            <p:ph idx="1"/>
+          </p:nvPr>
+        </p:nvSpPr>
+        <p:spPr/>
+        <p:txBody>
+          <a:bodyPr/>
+          <a:lstStyle/>
+          <a:p>
+            <a:r>
+              <a:rPr lang="en-US" dirty="0" smtClean="0"/>
+              <a:t>DC Offset</a:t>
+            </a:r>
+          </a:p>
+          <a:p>
+            <a:r>
+              <a:rPr lang="en-US" dirty="0" smtClean="0"/>
               <a:t>Noise</a:t>
             </a:r>
+          </a:p>
+          <a:p>
+            <a:r>
+              <a:rPr lang="en-US" dirty="0" smtClean="0"/>
+              <a:t>Emphasis</a:t>
+            </a:r>
             <a:endParaRPr lang="en-US" dirty="0"/>
           </a:p>
         </p:txBody>
       </p:sp>
       <p:sp>
         <p:nvSpPr>
-          <p:cNvPr id="3" name="Content Placeholder 2"/>
-          <p:cNvSpPr>
-            <a:spLocks noGrp="1"/>
-          </p:cNvSpPr>
-          <p:nvPr>
-            <p:ph idx="1"/>
-          </p:nvPr>
-        </p:nvSpPr>
-        <p:spPr/>
-        <p:txBody>
-          <a:bodyPr/>
-          <a:lstStyle/>
-          <a:p>
+          <p:cNvPr id="4" name="Slide Number Placeholder 3"/>
+          <p:cNvSpPr>
+            <a:spLocks noGrp="1"/>
+          </p:cNvSpPr>
+          <p:nvPr>
+            <p:ph type="sldNum" sz="quarter" idx="12"/>
+          </p:nvPr>
+        </p:nvSpPr>
+        <p:spPr/>
+        <p:txBody>
+          <a:bodyPr/>
+          <a:lstStyle/>
+          <a:p>
+            <a:fld id="{3C11000A-9EC0-40DA-B0AC-602B3E73336E}" type="slidenum">
+              <a:rPr lang="en-US" smtClean="0"/>
+              <a:t>20</a:t>
+            </a:fld>
             <a:endParaRPr lang="en-US"/>
           </a:p>
         </p:txBody>
@@ -4211,7 +5588,7 @@
     </p:spTree>
     <p:extLst>
       <p:ext uri="{BB962C8B-B14F-4D97-AF65-F5344CB8AC3E}">
-        <p14:creationId xmlns:p14="http://schemas.microsoft.com/office/powerpoint/2010/main" val="1283167432"/>
+        <p14:creationId xmlns:p14="http://schemas.microsoft.com/office/powerpoint/2010/main" val="2519101358"/>
       </p:ext>
     </p:extLst>
   </p:cSld>
@@ -4255,7 +5632,7 @@
           <a:p>
             <a:r>
               <a:rPr lang="en-US" dirty="0" smtClean="0"/>
-              <a:t>Emphasis</a:t>
+              <a:t>DC Offset</a:t>
             </a:r>
             <a:endParaRPr lang="en-US" dirty="0"/>
           </a:p>
@@ -4276,6 +5653,29 @@
           <a:bodyPr/>
           <a:lstStyle/>
           <a:p>
+            <a:endParaRPr lang="en-US"/>
+          </a:p>
+        </p:txBody>
+      </p:sp>
+      <p:sp>
+        <p:nvSpPr>
+          <p:cNvPr id="4" name="Slide Number Placeholder 3"/>
+          <p:cNvSpPr>
+            <a:spLocks noGrp="1"/>
+          </p:cNvSpPr>
+          <p:nvPr>
+            <p:ph type="sldNum" sz="quarter" idx="12"/>
+          </p:nvPr>
+        </p:nvSpPr>
+        <p:spPr/>
+        <p:txBody>
+          <a:bodyPr/>
+          <a:lstStyle/>
+          <a:p>
+            <a:fld id="{3C11000A-9EC0-40DA-B0AC-602B3E73336E}" type="slidenum">
+              <a:rPr lang="en-US" smtClean="0"/>
+              <a:t>21</a:t>
+            </a:fld>
             <a:endParaRPr lang="en-US"/>
           </a:p>
         </p:txBody>
@@ -4283,7 +5683,7 @@
     </p:spTree>
     <p:extLst>
       <p:ext uri="{BB962C8B-B14F-4D97-AF65-F5344CB8AC3E}">
-        <p14:creationId xmlns:p14="http://schemas.microsoft.com/office/powerpoint/2010/main" val="2340361777"/>
+        <p14:creationId xmlns:p14="http://schemas.microsoft.com/office/powerpoint/2010/main" val="441966729"/>
       </p:ext>
     </p:extLst>
   </p:cSld>
@@ -4327,7 +5727,7 @@
           <a:p>
             <a:r>
               <a:rPr lang="en-US" dirty="0" smtClean="0"/>
-              <a:t>Algorithms Implemented</a:t>
+              <a:t>Noise</a:t>
             </a:r>
             <a:endParaRPr lang="en-US" dirty="0"/>
           </a:p>
@@ -4348,40 +5748,37 @@
           <a:bodyPr/>
           <a:lstStyle/>
           <a:p>
-            <a:r>
-              <a:rPr lang="en-US" dirty="0" smtClean="0"/>
-              <a:t>Zero Crossing</a:t>
-            </a:r>
-          </a:p>
-          <a:p>
-            <a:r>
-              <a:rPr lang="en-US" dirty="0" err="1" smtClean="0"/>
-              <a:t>Goertzel</a:t>
-            </a:r>
-            <a:r>
-              <a:rPr lang="en-US" dirty="0" smtClean="0"/>
-              <a:t> (DFT / Filtering)</a:t>
-            </a:r>
-          </a:p>
-          <a:p>
-            <a:r>
-              <a:rPr lang="en-US" dirty="0" smtClean="0"/>
-              <a:t>PLL</a:t>
-            </a:r>
-          </a:p>
-          <a:p>
-            <a:r>
-              <a:rPr lang="en-US" dirty="0" err="1" smtClean="0"/>
-              <a:t>Preclocking</a:t>
-            </a:r>
-            <a:endParaRPr lang="en-US" dirty="0"/>
+            <a:endParaRPr lang="en-US"/>
+          </a:p>
+        </p:txBody>
+      </p:sp>
+      <p:sp>
+        <p:nvSpPr>
+          <p:cNvPr id="4" name="Slide Number Placeholder 3"/>
+          <p:cNvSpPr>
+            <a:spLocks noGrp="1"/>
+          </p:cNvSpPr>
+          <p:nvPr>
+            <p:ph type="sldNum" sz="quarter" idx="12"/>
+          </p:nvPr>
+        </p:nvSpPr>
+        <p:spPr/>
+        <p:txBody>
+          <a:bodyPr/>
+          <a:lstStyle/>
+          <a:p>
+            <a:fld id="{3C11000A-9EC0-40DA-B0AC-602B3E73336E}" type="slidenum">
+              <a:rPr lang="en-US" smtClean="0"/>
+              <a:t>22</a:t>
+            </a:fld>
+            <a:endParaRPr lang="en-US"/>
           </a:p>
         </p:txBody>
       </p:sp>
     </p:spTree>
     <p:extLst>
       <p:ext uri="{BB962C8B-B14F-4D97-AF65-F5344CB8AC3E}">
-        <p14:creationId xmlns:p14="http://schemas.microsoft.com/office/powerpoint/2010/main" val="2589421091"/>
+        <p14:creationId xmlns:p14="http://schemas.microsoft.com/office/powerpoint/2010/main" val="1283167432"/>
       </p:ext>
     </p:extLst>
   </p:cSld>
@@ -4424,12 +5821,9 @@
           <a:lstStyle/>
           <a:p>
             <a:r>
-              <a:rPr lang="en-US" dirty="0"/>
-              <a:t>Zero Crossing</a:t>
-            </a:r>
-            <a:br>
-              <a:rPr lang="en-US" dirty="0"/>
-            </a:br>
+              <a:rPr lang="en-US" dirty="0" smtClean="0"/>
+              <a:t>Emphasis</a:t>
+            </a:r>
             <a:endParaRPr lang="en-US" dirty="0"/>
           </a:p>
         </p:txBody>
@@ -4449,6 +5843,29 @@
           <a:bodyPr/>
           <a:lstStyle/>
           <a:p>
+            <a:endParaRPr lang="en-US"/>
+          </a:p>
+        </p:txBody>
+      </p:sp>
+      <p:sp>
+        <p:nvSpPr>
+          <p:cNvPr id="4" name="Slide Number Placeholder 3"/>
+          <p:cNvSpPr>
+            <a:spLocks noGrp="1"/>
+          </p:cNvSpPr>
+          <p:nvPr>
+            <p:ph type="sldNum" sz="quarter" idx="12"/>
+          </p:nvPr>
+        </p:nvSpPr>
+        <p:spPr/>
+        <p:txBody>
+          <a:bodyPr/>
+          <a:lstStyle/>
+          <a:p>
+            <a:fld id="{3C11000A-9EC0-40DA-B0AC-602B3E73336E}" type="slidenum">
+              <a:rPr lang="en-US" smtClean="0"/>
+              <a:t>23</a:t>
+            </a:fld>
             <a:endParaRPr lang="en-US"/>
           </a:p>
         </p:txBody>
@@ -4456,7 +5873,7 @@
     </p:spTree>
     <p:extLst>
       <p:ext uri="{BB962C8B-B14F-4D97-AF65-F5344CB8AC3E}">
-        <p14:creationId xmlns:p14="http://schemas.microsoft.com/office/powerpoint/2010/main" val="3143651293"/>
+        <p14:creationId xmlns:p14="http://schemas.microsoft.com/office/powerpoint/2010/main" val="2340361777"/>
       </p:ext>
     </p:extLst>
   </p:cSld>
@@ -4499,16 +5916,53 @@
           <a:lstStyle/>
           <a:p>
             <a:r>
-              <a:rPr lang="en-US" dirty="0" err="1"/>
+              <a:rPr lang="en-US" dirty="0" smtClean="0"/>
+              <a:t>Algorithms Implemented</a:t>
+            </a:r>
+            <a:endParaRPr lang="en-US" dirty="0"/>
+          </a:p>
+        </p:txBody>
+      </p:sp>
+      <p:sp>
+        <p:nvSpPr>
+          <p:cNvPr id="3" name="Content Placeholder 2"/>
+          <p:cNvSpPr>
+            <a:spLocks noGrp="1"/>
+          </p:cNvSpPr>
+          <p:nvPr>
+            <p:ph idx="1"/>
+          </p:nvPr>
+        </p:nvSpPr>
+        <p:spPr/>
+        <p:txBody>
+          <a:bodyPr/>
+          <a:lstStyle/>
+          <a:p>
+            <a:r>
+              <a:rPr lang="en-US" dirty="0" smtClean="0"/>
+              <a:t>Zero Crossing</a:t>
+            </a:r>
+          </a:p>
+          <a:p>
+            <a:r>
+              <a:rPr lang="en-US" dirty="0" err="1" smtClean="0"/>
               <a:t>Goertzel</a:t>
             </a:r>
             <a:r>
-              <a:rPr lang="en-US" dirty="0"/>
-              <a:t> (DFT / Filtering</a:t>
-            </a:r>
-            <a:r>
               <a:rPr lang="en-US" dirty="0" smtClean="0"/>
-              <a:t>)</a:t>
+              <a:t> (DFT / Filtering)</a:t>
+            </a:r>
+          </a:p>
+          <a:p>
+            <a:r>
+              <a:rPr lang="en-US" dirty="0" smtClean="0"/>
+              <a:t>PLL</a:t>
+            </a:r>
+          </a:p>
+          <a:p>
+            <a:r>
+              <a:rPr lang="en-US" dirty="0" err="1" smtClean="0"/>
+              <a:t>Preclocking</a:t>
             </a:r>
             <a:endParaRPr lang="en-US" dirty="0"/>
           </a:p>
@@ -4516,19 +5970,23 @@
       </p:sp>
       <p:sp>
         <p:nvSpPr>
-          <p:cNvPr id="3" name="Content Placeholder 2"/>
-          <p:cNvSpPr>
-            <a:spLocks noGrp="1"/>
-          </p:cNvSpPr>
-          <p:nvPr>
-            <p:ph idx="1"/>
-          </p:nvPr>
-        </p:nvSpPr>
-        <p:spPr/>
-        <p:txBody>
-          <a:bodyPr/>
-          <a:lstStyle/>
-          <a:p>
+          <p:cNvPr id="4" name="Slide Number Placeholder 3"/>
+          <p:cNvSpPr>
+            <a:spLocks noGrp="1"/>
+          </p:cNvSpPr>
+          <p:nvPr>
+            <p:ph type="sldNum" sz="quarter" idx="12"/>
+          </p:nvPr>
+        </p:nvSpPr>
+        <p:spPr/>
+        <p:txBody>
+          <a:bodyPr/>
+          <a:lstStyle/>
+          <a:p>
+            <a:fld id="{3C11000A-9EC0-40DA-B0AC-602B3E73336E}" type="slidenum">
+              <a:rPr lang="en-US" smtClean="0"/>
+              <a:t>24</a:t>
+            </a:fld>
             <a:endParaRPr lang="en-US"/>
           </a:p>
         </p:txBody>
@@ -4536,7 +5994,7 @@
     </p:spTree>
     <p:extLst>
       <p:ext uri="{BB962C8B-B14F-4D97-AF65-F5344CB8AC3E}">
-        <p14:creationId xmlns:p14="http://schemas.microsoft.com/office/powerpoint/2010/main" val="750666133"/>
+        <p14:creationId xmlns:p14="http://schemas.microsoft.com/office/powerpoint/2010/main" val="2589421091"/>
       </p:ext>
     </p:extLst>
   </p:cSld>
@@ -4579,9 +6037,12 @@
           <a:lstStyle/>
           <a:p>
             <a:r>
-              <a:rPr lang="en-US" dirty="0" smtClean="0"/>
-              <a:t>PLL</a:t>
-            </a:r>
+              <a:rPr lang="en-US" dirty="0"/>
+              <a:t>Zero Crossing</a:t>
+            </a:r>
+            <a:br>
+              <a:rPr lang="en-US" dirty="0"/>
+            </a:br>
             <a:endParaRPr lang="en-US" dirty="0"/>
           </a:p>
         </p:txBody>
@@ -4601,6 +6062,29 @@
           <a:bodyPr/>
           <a:lstStyle/>
           <a:p>
+            <a:endParaRPr lang="en-US"/>
+          </a:p>
+        </p:txBody>
+      </p:sp>
+      <p:sp>
+        <p:nvSpPr>
+          <p:cNvPr id="4" name="Slide Number Placeholder 3"/>
+          <p:cNvSpPr>
+            <a:spLocks noGrp="1"/>
+          </p:cNvSpPr>
+          <p:nvPr>
+            <p:ph type="sldNum" sz="quarter" idx="12"/>
+          </p:nvPr>
+        </p:nvSpPr>
+        <p:spPr/>
+        <p:txBody>
+          <a:bodyPr/>
+          <a:lstStyle/>
+          <a:p>
+            <a:fld id="{3C11000A-9EC0-40DA-B0AC-602B3E73336E}" type="slidenum">
+              <a:rPr lang="en-US" smtClean="0"/>
+              <a:t>25</a:t>
+            </a:fld>
             <a:endParaRPr lang="en-US"/>
           </a:p>
         </p:txBody>
@@ -4608,7 +6092,7 @@
     </p:spTree>
     <p:extLst>
       <p:ext uri="{BB962C8B-B14F-4D97-AF65-F5344CB8AC3E}">
-        <p14:creationId xmlns:p14="http://schemas.microsoft.com/office/powerpoint/2010/main" val="126878189"/>
+        <p14:creationId xmlns:p14="http://schemas.microsoft.com/office/powerpoint/2010/main" val="3143651293"/>
       </p:ext>
     </p:extLst>
   </p:cSld>
@@ -4651,8 +6135,16 @@
           <a:lstStyle/>
           <a:p>
             <a:r>
-              <a:rPr lang="en-US" dirty="0" err="1" smtClean="0"/>
-              <a:t>Preclocking</a:t>
+              <a:rPr lang="en-US" dirty="0" err="1"/>
+              <a:t>Goertzel</a:t>
+            </a:r>
+            <a:r>
+              <a:rPr lang="en-US" dirty="0"/>
+              <a:t> (DFT / Filtering</a:t>
+            </a:r>
+            <a:r>
+              <a:rPr lang="en-US" dirty="0" smtClean="0"/>
+              <a:t>)</a:t>
             </a:r>
             <a:endParaRPr lang="en-US" dirty="0"/>
           </a:p>
@@ -4673,6 +6165,29 @@
           <a:bodyPr/>
           <a:lstStyle/>
           <a:p>
+            <a:endParaRPr lang="en-US"/>
+          </a:p>
+        </p:txBody>
+      </p:sp>
+      <p:sp>
+        <p:nvSpPr>
+          <p:cNvPr id="4" name="Slide Number Placeholder 3"/>
+          <p:cNvSpPr>
+            <a:spLocks noGrp="1"/>
+          </p:cNvSpPr>
+          <p:nvPr>
+            <p:ph type="sldNum" sz="quarter" idx="12"/>
+          </p:nvPr>
+        </p:nvSpPr>
+        <p:spPr/>
+        <p:txBody>
+          <a:bodyPr/>
+          <a:lstStyle/>
+          <a:p>
+            <a:fld id="{3C11000A-9EC0-40DA-B0AC-602B3E73336E}" type="slidenum">
+              <a:rPr lang="en-US" smtClean="0"/>
+              <a:t>26</a:t>
+            </a:fld>
             <a:endParaRPr lang="en-US"/>
           </a:p>
         </p:txBody>
@@ -4680,7 +6195,7 @@
     </p:spTree>
     <p:extLst>
       <p:ext uri="{BB962C8B-B14F-4D97-AF65-F5344CB8AC3E}">
-        <p14:creationId xmlns:p14="http://schemas.microsoft.com/office/powerpoint/2010/main" val="3760382693"/>
+        <p14:creationId xmlns:p14="http://schemas.microsoft.com/office/powerpoint/2010/main" val="750666133"/>
       </p:ext>
     </p:extLst>
   </p:cSld>
@@ -4724,7 +6239,7 @@
           <a:p>
             <a:r>
               <a:rPr lang="en-US" dirty="0" smtClean="0"/>
-              <a:t>Benchmarking</a:t>
+              <a:t>PLL</a:t>
             </a:r>
             <a:endParaRPr lang="en-US" dirty="0"/>
           </a:p>
@@ -4745,42 +6260,37 @@
           <a:bodyPr/>
           <a:lstStyle/>
           <a:p>
-            <a:r>
-              <a:rPr lang="en-US" dirty="0" smtClean="0"/>
-              <a:t>OT3 Test</a:t>
-            </a:r>
-          </a:p>
-          <a:p>
-            <a:r>
-              <a:rPr lang="en-US" dirty="0" smtClean="0"/>
-              <a:t>javAX25 Generated 200</a:t>
-            </a:r>
-          </a:p>
-          <a:p>
-            <a:r>
-              <a:rPr lang="en-US" dirty="0" smtClean="0"/>
-              <a:t>OT3 Test + Ramping Noise</a:t>
-            </a:r>
-          </a:p>
-          <a:p>
-            <a:r>
-              <a:rPr lang="en-US" dirty="0" smtClean="0"/>
-              <a:t>Track 1</a:t>
-            </a:r>
-          </a:p>
-          <a:p>
-            <a:r>
-              <a:rPr lang="en-US" dirty="0" smtClean="0"/>
-              <a:t>Track 2</a:t>
-            </a:r>
-            <a:endParaRPr lang="en-US" dirty="0"/>
+            <a:endParaRPr lang="en-US"/>
+          </a:p>
+        </p:txBody>
+      </p:sp>
+      <p:sp>
+        <p:nvSpPr>
+          <p:cNvPr id="4" name="Slide Number Placeholder 3"/>
+          <p:cNvSpPr>
+            <a:spLocks noGrp="1"/>
+          </p:cNvSpPr>
+          <p:nvPr>
+            <p:ph type="sldNum" sz="quarter" idx="12"/>
+          </p:nvPr>
+        </p:nvSpPr>
+        <p:spPr/>
+        <p:txBody>
+          <a:bodyPr/>
+          <a:lstStyle/>
+          <a:p>
+            <a:fld id="{3C11000A-9EC0-40DA-B0AC-602B3E73336E}" type="slidenum">
+              <a:rPr lang="en-US" smtClean="0"/>
+              <a:t>27</a:t>
+            </a:fld>
+            <a:endParaRPr lang="en-US"/>
           </a:p>
         </p:txBody>
       </p:sp>
     </p:spTree>
     <p:extLst>
       <p:ext uri="{BB962C8B-B14F-4D97-AF65-F5344CB8AC3E}">
-        <p14:creationId xmlns:p14="http://schemas.microsoft.com/office/powerpoint/2010/main" val="1926357504"/>
+        <p14:creationId xmlns:p14="http://schemas.microsoft.com/office/powerpoint/2010/main" val="126878189"/>
       </p:ext>
     </p:extLst>
   </p:cSld>
@@ -4823,8 +6333,8 @@
           <a:lstStyle/>
           <a:p>
             <a:r>
-              <a:rPr lang="en-US" dirty="0" smtClean="0"/>
-              <a:t>Clean Signal Example</a:t>
+              <a:rPr lang="en-US" dirty="0" err="1" smtClean="0"/>
+              <a:t>Preclocking</a:t>
             </a:r>
             <a:endParaRPr lang="en-US" dirty="0"/>
           </a:p>
@@ -4845,6 +6355,29 @@
           <a:bodyPr/>
           <a:lstStyle/>
           <a:p>
+            <a:endParaRPr lang="en-US"/>
+          </a:p>
+        </p:txBody>
+      </p:sp>
+      <p:sp>
+        <p:nvSpPr>
+          <p:cNvPr id="4" name="Slide Number Placeholder 3"/>
+          <p:cNvSpPr>
+            <a:spLocks noGrp="1"/>
+          </p:cNvSpPr>
+          <p:nvPr>
+            <p:ph type="sldNum" sz="quarter" idx="12"/>
+          </p:nvPr>
+        </p:nvSpPr>
+        <p:spPr/>
+        <p:txBody>
+          <a:bodyPr/>
+          <a:lstStyle/>
+          <a:p>
+            <a:fld id="{3C11000A-9EC0-40DA-B0AC-602B3E73336E}" type="slidenum">
+              <a:rPr lang="en-US" smtClean="0"/>
+              <a:t>28</a:t>
+            </a:fld>
             <a:endParaRPr lang="en-US"/>
           </a:p>
         </p:txBody>
@@ -4852,7 +6385,7 @@
     </p:spTree>
     <p:extLst>
       <p:ext uri="{BB962C8B-B14F-4D97-AF65-F5344CB8AC3E}">
-        <p14:creationId xmlns:p14="http://schemas.microsoft.com/office/powerpoint/2010/main" val="2124064968"/>
+        <p14:creationId xmlns:p14="http://schemas.microsoft.com/office/powerpoint/2010/main" val="3760382693"/>
       </p:ext>
     </p:extLst>
   </p:cSld>
@@ -4896,7 +6429,7 @@
           <a:p>
             <a:r>
               <a:rPr lang="en-US" dirty="0" smtClean="0"/>
-              <a:t>Noise Example</a:t>
+              <a:t>Benchmarking</a:t>
             </a:r>
             <a:endParaRPr lang="en-US" dirty="0"/>
           </a:p>
@@ -4917,6 +6450,57 @@
           <a:bodyPr/>
           <a:lstStyle/>
           <a:p>
+            <a:r>
+              <a:rPr lang="en-US" dirty="0" smtClean="0"/>
+              <a:t>OT3 Test</a:t>
+            </a:r>
+          </a:p>
+          <a:p>
+            <a:r>
+              <a:rPr lang="en-US" dirty="0" smtClean="0"/>
+              <a:t>javAX25 Generated 200</a:t>
+            </a:r>
+          </a:p>
+          <a:p>
+            <a:r>
+              <a:rPr lang="en-US" dirty="0" smtClean="0"/>
+              <a:t>OT3 Test + Ramping Noise</a:t>
+            </a:r>
+          </a:p>
+          <a:p>
+            <a:r>
+              <a:rPr lang="en-US" dirty="0" smtClean="0"/>
+              <a:t>Track 1</a:t>
+            </a:r>
+          </a:p>
+          <a:p>
+            <a:r>
+              <a:rPr lang="en-US" dirty="0" smtClean="0"/>
+              <a:t>Track 2</a:t>
+            </a:r>
+            <a:endParaRPr lang="en-US" dirty="0"/>
+          </a:p>
+        </p:txBody>
+      </p:sp>
+      <p:sp>
+        <p:nvSpPr>
+          <p:cNvPr id="4" name="Slide Number Placeholder 3"/>
+          <p:cNvSpPr>
+            <a:spLocks noGrp="1"/>
+          </p:cNvSpPr>
+          <p:nvPr>
+            <p:ph type="sldNum" sz="quarter" idx="12"/>
+          </p:nvPr>
+        </p:nvSpPr>
+        <p:spPr/>
+        <p:txBody>
+          <a:bodyPr/>
+          <a:lstStyle/>
+          <a:p>
+            <a:fld id="{3C11000A-9EC0-40DA-B0AC-602B3E73336E}" type="slidenum">
+              <a:rPr lang="en-US" smtClean="0"/>
+              <a:t>29</a:t>
+            </a:fld>
             <a:endParaRPr lang="en-US"/>
           </a:p>
         </p:txBody>
@@ -4924,7 +6508,7 @@
     </p:spTree>
     <p:extLst>
       <p:ext uri="{BB962C8B-B14F-4D97-AF65-F5344CB8AC3E}">
-        <p14:creationId xmlns:p14="http://schemas.microsoft.com/office/powerpoint/2010/main" val="98776956"/>
+        <p14:creationId xmlns:p14="http://schemas.microsoft.com/office/powerpoint/2010/main" val="1926357504"/>
       </p:ext>
     </p:extLst>
   </p:cSld>
@@ -4968,7 +6552,7 @@
           <a:p>
             <a:r>
               <a:rPr lang="en-US" dirty="0" smtClean="0"/>
-              <a:t>Bell 202</a:t>
+              <a:t>What does APRS look like?</a:t>
             </a:r>
             <a:endParaRPr lang="en-US" dirty="0"/>
           </a:p>
@@ -4976,37 +6560,87 @@
       </p:sp>
       <p:sp>
         <p:nvSpPr>
-          <p:cNvPr id="3" name="Content Placeholder 2"/>
-          <p:cNvSpPr>
-            <a:spLocks noGrp="1"/>
-          </p:cNvSpPr>
+          <p:cNvPr id="4" name="Slide Number Placeholder 3"/>
+          <p:cNvSpPr>
+            <a:spLocks noGrp="1"/>
+          </p:cNvSpPr>
+          <p:nvPr>
+            <p:ph type="sldNum" sz="quarter" idx="12"/>
+          </p:nvPr>
+        </p:nvSpPr>
+        <p:spPr/>
+        <p:txBody>
+          <a:bodyPr/>
+          <a:lstStyle/>
+          <a:p>
+            <a:fld id="{3C11000A-9EC0-40DA-B0AC-602B3E73336E}" type="slidenum">
+              <a:rPr lang="en-US" smtClean="0"/>
+              <a:t>3</a:t>
+            </a:fld>
+            <a:endParaRPr lang="en-US"/>
+          </a:p>
+        </p:txBody>
+      </p:sp>
+      <p:pic>
+        <p:nvPicPr>
+          <p:cNvPr id="2050" name="Picture 2"/>
+          <p:cNvPicPr>
+            <a:picLocks noGrp="1" noChangeAspect="1" noChangeArrowheads="1"/>
+          </p:cNvPicPr>
           <p:nvPr>
             <p:ph idx="1"/>
           </p:nvPr>
-        </p:nvSpPr>
-        <p:spPr/>
-        <p:txBody>
-          <a:bodyPr/>
-          <a:lstStyle/>
-          <a:p>
-            <a:r>
-              <a:rPr lang="en-US" dirty="0" smtClean="0"/>
-              <a:t>1200 Baud AFSK using 1200Hz and 2200Hz tones.</a:t>
-            </a:r>
-          </a:p>
-          <a:p>
-            <a:r>
-              <a:rPr lang="en-US" dirty="0" smtClean="0"/>
-              <a:t>Audio Frequency Shift Keying – using multiple tones in the audible range to encode data.</a:t>
-            </a:r>
-            <a:endParaRPr lang="en-US" dirty="0"/>
-          </a:p>
-        </p:txBody>
-      </p:sp>
+        </p:nvPicPr>
+        <p:blipFill>
+          <a:blip r:embed="rId3">
+            <a:extLst>
+              <a:ext uri="{28A0092B-C50C-407E-A947-70E740481C1C}">
+                <a14:useLocalDpi xmlns:a14="http://schemas.microsoft.com/office/drawing/2010/main" val="0"/>
+              </a:ext>
+            </a:extLst>
+          </a:blip>
+          <a:srcRect/>
+          <a:stretch>
+            <a:fillRect/>
+          </a:stretch>
+        </p:blipFill>
+        <p:spPr bwMode="auto">
+          <a:xfrm>
+            <a:off x="1185038" y="1200150"/>
+            <a:ext cx="6164323" cy="3600450"/>
+          </a:xfrm>
+          <a:prstGeom prst="rect">
+            <a:avLst/>
+          </a:prstGeom>
+          <a:noFill/>
+          <a:ln>
+            <a:noFill/>
+          </a:ln>
+          <a:extLst>
+            <a:ext uri="{909E8E84-426E-40DD-AFC4-6F175D3DCCD1}">
+              <a14:hiddenFill xmlns:a14="http://schemas.microsoft.com/office/drawing/2010/main">
+                <a:solidFill>
+                  <a:schemeClr val="accent1"/>
+                </a:solidFill>
+              </a14:hiddenFill>
+            </a:ext>
+            <a:ext uri="{91240B29-F687-4F45-9708-019B960494DF}">
+              <a14:hiddenLine xmlns:a14="http://schemas.microsoft.com/office/drawing/2010/main" w="9525">
+                <a:solidFill>
+                  <a:schemeClr val="tx1"/>
+                </a:solidFill>
+                <a:miter lim="800000"/>
+                <a:headEnd/>
+                <a:tailEnd/>
+              </a14:hiddenLine>
+            </a:ext>
+          </a:extLst>
+        </p:spPr>
+      </p:pic>
     </p:spTree>
     <p:extLst>
       <p:ext uri="{BB962C8B-B14F-4D97-AF65-F5344CB8AC3E}">
-        <p14:creationId xmlns:p14="http://schemas.microsoft.com/office/powerpoint/2010/main" val="854329189"/>
+        <p14:creationId xmlns:p14="http://schemas.microsoft.com/office/powerpoint/2010/main" val="3778174410"/>
       </p:ext>
     </p:extLst>
   </p:cSld>
@@ -5050,7 +6684,7 @@
           <a:p>
             <a:r>
               <a:rPr lang="en-US" dirty="0" smtClean="0"/>
-              <a:t>Track 1 Example</a:t>
+              <a:t>Clean Signal Example</a:t>
             </a:r>
             <a:endParaRPr lang="en-US" dirty="0"/>
           </a:p>
@@ -5071,6 +6705,29 @@
           <a:bodyPr/>
           <a:lstStyle/>
           <a:p>
+            <a:endParaRPr lang="en-US"/>
+          </a:p>
+        </p:txBody>
+      </p:sp>
+      <p:sp>
+        <p:nvSpPr>
+          <p:cNvPr id="4" name="Slide Number Placeholder 3"/>
+          <p:cNvSpPr>
+            <a:spLocks noGrp="1"/>
+          </p:cNvSpPr>
+          <p:nvPr>
+            <p:ph type="sldNum" sz="quarter" idx="12"/>
+          </p:nvPr>
+        </p:nvSpPr>
+        <p:spPr/>
+        <p:txBody>
+          <a:bodyPr/>
+          <a:lstStyle/>
+          <a:p>
+            <a:fld id="{3C11000A-9EC0-40DA-B0AC-602B3E73336E}" type="slidenum">
+              <a:rPr lang="en-US" smtClean="0"/>
+              <a:t>30</a:t>
+            </a:fld>
             <a:endParaRPr lang="en-US"/>
           </a:p>
         </p:txBody>
@@ -5078,7 +6735,7 @@
     </p:spTree>
     <p:extLst>
       <p:ext uri="{BB962C8B-B14F-4D97-AF65-F5344CB8AC3E}">
-        <p14:creationId xmlns:p14="http://schemas.microsoft.com/office/powerpoint/2010/main" val="2290770419"/>
+        <p14:creationId xmlns:p14="http://schemas.microsoft.com/office/powerpoint/2010/main" val="2124064968"/>
       </p:ext>
     </p:extLst>
   </p:cSld>
@@ -5122,7 +6779,7 @@
           <a:p>
             <a:r>
               <a:rPr lang="en-US" dirty="0" smtClean="0"/>
-              <a:t>Hardware Results - Clean</a:t>
+              <a:t>Noise Example</a:t>
             </a:r>
             <a:endParaRPr lang="en-US" dirty="0"/>
           </a:p>
@@ -5143,6 +6800,29 @@
           <a:bodyPr/>
           <a:lstStyle/>
           <a:p>
+            <a:endParaRPr lang="en-US"/>
+          </a:p>
+        </p:txBody>
+      </p:sp>
+      <p:sp>
+        <p:nvSpPr>
+          <p:cNvPr id="4" name="Slide Number Placeholder 3"/>
+          <p:cNvSpPr>
+            <a:spLocks noGrp="1"/>
+          </p:cNvSpPr>
+          <p:nvPr>
+            <p:ph type="sldNum" sz="quarter" idx="12"/>
+          </p:nvPr>
+        </p:nvSpPr>
+        <p:spPr/>
+        <p:txBody>
+          <a:bodyPr/>
+          <a:lstStyle/>
+          <a:p>
+            <a:fld id="{3C11000A-9EC0-40DA-B0AC-602B3E73336E}" type="slidenum">
+              <a:rPr lang="en-US" smtClean="0"/>
+              <a:t>31</a:t>
+            </a:fld>
             <a:endParaRPr lang="en-US"/>
           </a:p>
         </p:txBody>
@@ -5150,7 +6830,7 @@
     </p:spTree>
     <p:extLst>
       <p:ext uri="{BB962C8B-B14F-4D97-AF65-F5344CB8AC3E}">
-        <p14:creationId xmlns:p14="http://schemas.microsoft.com/office/powerpoint/2010/main" val="3679839638"/>
+        <p14:creationId xmlns:p14="http://schemas.microsoft.com/office/powerpoint/2010/main" val="98776956"/>
       </p:ext>
     </p:extLst>
   </p:cSld>
@@ -5194,7 +6874,7 @@
           <a:p>
             <a:r>
               <a:rPr lang="en-US" dirty="0" smtClean="0"/>
-              <a:t>Hardware Results - Noise</a:t>
+              <a:t>Track 1 Example</a:t>
             </a:r>
             <a:endParaRPr lang="en-US" dirty="0"/>
           </a:p>
@@ -5215,6 +6895,29 @@
           <a:bodyPr/>
           <a:lstStyle/>
           <a:p>
+            <a:endParaRPr lang="en-US"/>
+          </a:p>
+        </p:txBody>
+      </p:sp>
+      <p:sp>
+        <p:nvSpPr>
+          <p:cNvPr id="4" name="Slide Number Placeholder 3"/>
+          <p:cNvSpPr>
+            <a:spLocks noGrp="1"/>
+          </p:cNvSpPr>
+          <p:nvPr>
+            <p:ph type="sldNum" sz="quarter" idx="12"/>
+          </p:nvPr>
+        </p:nvSpPr>
+        <p:spPr/>
+        <p:txBody>
+          <a:bodyPr/>
+          <a:lstStyle/>
+          <a:p>
+            <a:fld id="{3C11000A-9EC0-40DA-B0AC-602B3E73336E}" type="slidenum">
+              <a:rPr lang="en-US" smtClean="0"/>
+              <a:t>32</a:t>
+            </a:fld>
             <a:endParaRPr lang="en-US"/>
           </a:p>
         </p:txBody>
@@ -5222,7 +6925,7 @@
     </p:spTree>
     <p:extLst>
       <p:ext uri="{BB962C8B-B14F-4D97-AF65-F5344CB8AC3E}">
-        <p14:creationId xmlns:p14="http://schemas.microsoft.com/office/powerpoint/2010/main" val="1249358574"/>
+        <p14:creationId xmlns:p14="http://schemas.microsoft.com/office/powerpoint/2010/main" val="2290770419"/>
       </p:ext>
     </p:extLst>
   </p:cSld>
@@ -5266,7 +6969,7 @@
           <a:p>
             <a:r>
               <a:rPr lang="en-US" dirty="0" smtClean="0"/>
-              <a:t>Hardware Results – Track 1</a:t>
+              <a:t>Hardware Results - Clean</a:t>
             </a:r>
             <a:endParaRPr lang="en-US" dirty="0"/>
           </a:p>
@@ -5287,6 +6990,29 @@
           <a:bodyPr/>
           <a:lstStyle/>
           <a:p>
+            <a:endParaRPr lang="en-US"/>
+          </a:p>
+        </p:txBody>
+      </p:sp>
+      <p:sp>
+        <p:nvSpPr>
+          <p:cNvPr id="4" name="Slide Number Placeholder 3"/>
+          <p:cNvSpPr>
+            <a:spLocks noGrp="1"/>
+          </p:cNvSpPr>
+          <p:nvPr>
+            <p:ph type="sldNum" sz="quarter" idx="12"/>
+          </p:nvPr>
+        </p:nvSpPr>
+        <p:spPr/>
+        <p:txBody>
+          <a:bodyPr/>
+          <a:lstStyle/>
+          <a:p>
+            <a:fld id="{3C11000A-9EC0-40DA-B0AC-602B3E73336E}" type="slidenum">
+              <a:rPr lang="en-US" smtClean="0"/>
+              <a:t>33</a:t>
+            </a:fld>
             <a:endParaRPr lang="en-US"/>
           </a:p>
         </p:txBody>
@@ -5294,7 +7020,7 @@
     </p:spTree>
     <p:extLst>
       <p:ext uri="{BB962C8B-B14F-4D97-AF65-F5344CB8AC3E}">
-        <p14:creationId xmlns:p14="http://schemas.microsoft.com/office/powerpoint/2010/main" val="1422722874"/>
+        <p14:creationId xmlns:p14="http://schemas.microsoft.com/office/powerpoint/2010/main" val="3679839638"/>
       </p:ext>
     </p:extLst>
   </p:cSld>
@@ -5338,7 +7064,7 @@
           <a:p>
             <a:r>
               <a:rPr lang="en-US" dirty="0" smtClean="0"/>
-              <a:t>Software Results - Clean</a:t>
+              <a:t>Hardware Results - Noise</a:t>
             </a:r>
             <a:endParaRPr lang="en-US" dirty="0"/>
           </a:p>
@@ -5359,6 +7085,29 @@
           <a:bodyPr/>
           <a:lstStyle/>
           <a:p>
+            <a:endParaRPr lang="en-US"/>
+          </a:p>
+        </p:txBody>
+      </p:sp>
+      <p:sp>
+        <p:nvSpPr>
+          <p:cNvPr id="4" name="Slide Number Placeholder 3"/>
+          <p:cNvSpPr>
+            <a:spLocks noGrp="1"/>
+          </p:cNvSpPr>
+          <p:nvPr>
+            <p:ph type="sldNum" sz="quarter" idx="12"/>
+          </p:nvPr>
+        </p:nvSpPr>
+        <p:spPr/>
+        <p:txBody>
+          <a:bodyPr/>
+          <a:lstStyle/>
+          <a:p>
+            <a:fld id="{3C11000A-9EC0-40DA-B0AC-602B3E73336E}" type="slidenum">
+              <a:rPr lang="en-US" smtClean="0"/>
+              <a:t>34</a:t>
+            </a:fld>
             <a:endParaRPr lang="en-US"/>
           </a:p>
         </p:txBody>
@@ -5366,7 +7115,7 @@
     </p:spTree>
     <p:extLst>
       <p:ext uri="{BB962C8B-B14F-4D97-AF65-F5344CB8AC3E}">
-        <p14:creationId xmlns:p14="http://schemas.microsoft.com/office/powerpoint/2010/main" val="1795787625"/>
+        <p14:creationId xmlns:p14="http://schemas.microsoft.com/office/powerpoint/2010/main" val="1249358574"/>
       </p:ext>
     </p:extLst>
   </p:cSld>
@@ -5410,7 +7159,7 @@
           <a:p>
             <a:r>
               <a:rPr lang="en-US" dirty="0" smtClean="0"/>
-              <a:t>Software Results - Noise</a:t>
+              <a:t>Hardware Results – Track 1</a:t>
             </a:r>
             <a:endParaRPr lang="en-US" dirty="0"/>
           </a:p>
@@ -5431,6 +7180,29 @@
           <a:bodyPr/>
           <a:lstStyle/>
           <a:p>
+            <a:endParaRPr lang="en-US"/>
+          </a:p>
+        </p:txBody>
+      </p:sp>
+      <p:sp>
+        <p:nvSpPr>
+          <p:cNvPr id="4" name="Slide Number Placeholder 3"/>
+          <p:cNvSpPr>
+            <a:spLocks noGrp="1"/>
+          </p:cNvSpPr>
+          <p:nvPr>
+            <p:ph type="sldNum" sz="quarter" idx="12"/>
+          </p:nvPr>
+        </p:nvSpPr>
+        <p:spPr/>
+        <p:txBody>
+          <a:bodyPr/>
+          <a:lstStyle/>
+          <a:p>
+            <a:fld id="{3C11000A-9EC0-40DA-B0AC-602B3E73336E}" type="slidenum">
+              <a:rPr lang="en-US" smtClean="0"/>
+              <a:t>35</a:t>
+            </a:fld>
             <a:endParaRPr lang="en-US"/>
           </a:p>
         </p:txBody>
@@ -5438,7 +7210,7 @@
     </p:spTree>
     <p:extLst>
       <p:ext uri="{BB962C8B-B14F-4D97-AF65-F5344CB8AC3E}">
-        <p14:creationId xmlns:p14="http://schemas.microsoft.com/office/powerpoint/2010/main" val="200077385"/>
+        <p14:creationId xmlns:p14="http://schemas.microsoft.com/office/powerpoint/2010/main" val="1422722874"/>
       </p:ext>
     </p:extLst>
   </p:cSld>
@@ -5482,7 +7254,7 @@
           <a:p>
             <a:r>
               <a:rPr lang="en-US" dirty="0" smtClean="0"/>
-              <a:t>Software Results – Track 1</a:t>
+              <a:t>Software Results - Clean</a:t>
             </a:r>
             <a:endParaRPr lang="en-US" dirty="0"/>
           </a:p>
@@ -5503,6 +7275,29 @@
           <a:bodyPr/>
           <a:lstStyle/>
           <a:p>
+            <a:endParaRPr lang="en-US"/>
+          </a:p>
+        </p:txBody>
+      </p:sp>
+      <p:sp>
+        <p:nvSpPr>
+          <p:cNvPr id="4" name="Slide Number Placeholder 3"/>
+          <p:cNvSpPr>
+            <a:spLocks noGrp="1"/>
+          </p:cNvSpPr>
+          <p:nvPr>
+            <p:ph type="sldNum" sz="quarter" idx="12"/>
+          </p:nvPr>
+        </p:nvSpPr>
+        <p:spPr/>
+        <p:txBody>
+          <a:bodyPr/>
+          <a:lstStyle/>
+          <a:p>
+            <a:fld id="{3C11000A-9EC0-40DA-B0AC-602B3E73336E}" type="slidenum">
+              <a:rPr lang="en-US" smtClean="0"/>
+              <a:t>36</a:t>
+            </a:fld>
             <a:endParaRPr lang="en-US"/>
           </a:p>
         </p:txBody>
@@ -5510,7 +7305,7 @@
     </p:spTree>
     <p:extLst>
       <p:ext uri="{BB962C8B-B14F-4D97-AF65-F5344CB8AC3E}">
-        <p14:creationId xmlns:p14="http://schemas.microsoft.com/office/powerpoint/2010/main" val="2666138030"/>
+        <p14:creationId xmlns:p14="http://schemas.microsoft.com/office/powerpoint/2010/main" val="1795787625"/>
       </p:ext>
     </p:extLst>
   </p:cSld>
@@ -5554,7 +7349,7 @@
           <a:p>
             <a:r>
               <a:rPr lang="en-US" dirty="0" smtClean="0"/>
-              <a:t>Hardware versus Software</a:t>
+              <a:t>Software Results - Noise</a:t>
             </a:r>
             <a:endParaRPr lang="en-US" dirty="0"/>
           </a:p>
@@ -5575,6 +7370,29 @@
           <a:bodyPr/>
           <a:lstStyle/>
           <a:p>
+            <a:endParaRPr lang="en-US"/>
+          </a:p>
+        </p:txBody>
+      </p:sp>
+      <p:sp>
+        <p:nvSpPr>
+          <p:cNvPr id="4" name="Slide Number Placeholder 3"/>
+          <p:cNvSpPr>
+            <a:spLocks noGrp="1"/>
+          </p:cNvSpPr>
+          <p:nvPr>
+            <p:ph type="sldNum" sz="quarter" idx="12"/>
+          </p:nvPr>
+        </p:nvSpPr>
+        <p:spPr/>
+        <p:txBody>
+          <a:bodyPr/>
+          <a:lstStyle/>
+          <a:p>
+            <a:fld id="{3C11000A-9EC0-40DA-B0AC-602B3E73336E}" type="slidenum">
+              <a:rPr lang="en-US" smtClean="0"/>
+              <a:t>37</a:t>
+            </a:fld>
             <a:endParaRPr lang="en-US"/>
           </a:p>
         </p:txBody>
@@ -5582,7 +7400,7 @@
     </p:spTree>
     <p:extLst>
       <p:ext uri="{BB962C8B-B14F-4D97-AF65-F5344CB8AC3E}">
-        <p14:creationId xmlns:p14="http://schemas.microsoft.com/office/powerpoint/2010/main" val="1430613194"/>
+        <p14:creationId xmlns:p14="http://schemas.microsoft.com/office/powerpoint/2010/main" val="200077385"/>
       </p:ext>
     </p:extLst>
   </p:cSld>
@@ -5626,7 +7444,7 @@
           <a:p>
             <a:r>
               <a:rPr lang="en-US" dirty="0" smtClean="0"/>
-              <a:t>Ideas for Future Work</a:t>
+              <a:t>Software Results – Track 1</a:t>
             </a:r>
             <a:endParaRPr lang="en-US" dirty="0"/>
           </a:p>
@@ -5647,6 +7465,29 @@
           <a:bodyPr/>
           <a:lstStyle/>
           <a:p>
+            <a:endParaRPr lang="en-US"/>
+          </a:p>
+        </p:txBody>
+      </p:sp>
+      <p:sp>
+        <p:nvSpPr>
+          <p:cNvPr id="4" name="Slide Number Placeholder 3"/>
+          <p:cNvSpPr>
+            <a:spLocks noGrp="1"/>
+          </p:cNvSpPr>
+          <p:nvPr>
+            <p:ph type="sldNum" sz="quarter" idx="12"/>
+          </p:nvPr>
+        </p:nvSpPr>
+        <p:spPr/>
+        <p:txBody>
+          <a:bodyPr/>
+          <a:lstStyle/>
+          <a:p>
+            <a:fld id="{3C11000A-9EC0-40DA-B0AC-602B3E73336E}" type="slidenum">
+              <a:rPr lang="en-US" smtClean="0"/>
+              <a:t>38</a:t>
+            </a:fld>
             <a:endParaRPr lang="en-US"/>
           </a:p>
         </p:txBody>
@@ -5654,7 +7495,7 @@
     </p:spTree>
     <p:extLst>
       <p:ext uri="{BB962C8B-B14F-4D97-AF65-F5344CB8AC3E}">
-        <p14:creationId xmlns:p14="http://schemas.microsoft.com/office/powerpoint/2010/main" val="2234000069"/>
+        <p14:creationId xmlns:p14="http://schemas.microsoft.com/office/powerpoint/2010/main" val="2666138030"/>
       </p:ext>
     </p:extLst>
   </p:cSld>
@@ -5697,10 +7538,10 @@
           <a:lstStyle/>
           <a:p>
             <a:r>
-              <a:rPr lang="en-US" smtClean="0"/>
-              <a:t>Conclusion</a:t>
-            </a:r>
-            <a:endParaRPr lang="en-US"/>
+              <a:rPr lang="en-US" dirty="0" smtClean="0"/>
+              <a:t>Hardware versus Software</a:t>
+            </a:r>
+            <a:endParaRPr lang="en-US" dirty="0"/>
           </a:p>
         </p:txBody>
       </p:sp>
@@ -5719,6 +7560,29 @@
           <a:bodyPr/>
           <a:lstStyle/>
           <a:p>
+            <a:endParaRPr lang="en-US"/>
+          </a:p>
+        </p:txBody>
+      </p:sp>
+      <p:sp>
+        <p:nvSpPr>
+          <p:cNvPr id="4" name="Slide Number Placeholder 3"/>
+          <p:cNvSpPr>
+            <a:spLocks noGrp="1"/>
+          </p:cNvSpPr>
+          <p:nvPr>
+            <p:ph type="sldNum" sz="quarter" idx="12"/>
+          </p:nvPr>
+        </p:nvSpPr>
+        <p:spPr/>
+        <p:txBody>
+          <a:bodyPr/>
+          <a:lstStyle/>
+          <a:p>
+            <a:fld id="{3C11000A-9EC0-40DA-B0AC-602B3E73336E}" type="slidenum">
+              <a:rPr lang="en-US" smtClean="0"/>
+              <a:t>39</a:t>
+            </a:fld>
             <a:endParaRPr lang="en-US"/>
           </a:p>
         </p:txBody>
@@ -5726,7 +7590,7 @@
     </p:spTree>
     <p:extLst>
       <p:ext uri="{BB962C8B-B14F-4D97-AF65-F5344CB8AC3E}">
-        <p14:creationId xmlns:p14="http://schemas.microsoft.com/office/powerpoint/2010/main" val="2510464877"/>
+        <p14:creationId xmlns:p14="http://schemas.microsoft.com/office/powerpoint/2010/main" val="1430613194"/>
       </p:ext>
     </p:extLst>
   </p:cSld>
@@ -5770,7 +7634,7 @@
           <a:p>
             <a:r>
               <a:rPr lang="en-US" dirty="0" smtClean="0"/>
-              <a:t>Example Signal</a:t>
+              <a:t>What does APRS look like?</a:t>
             </a:r>
             <a:endParaRPr lang="en-US" dirty="0"/>
           </a:p>
@@ -5778,7 +7642,7 @@
       </p:sp>
       <p:pic>
         <p:nvPicPr>
-          <p:cNvPr id="1028" name="Picture 4" descr="D:\Robert Campbell\Documents\GitHub\rrxthesis\images\Datasignalencodingbitstream0000.png"/>
+          <p:cNvPr id="1026" name="Picture 2"/>
           <p:cNvPicPr>
             <a:picLocks noGrp="1" noChangeAspect="1" noChangeArrowheads="1"/>
           </p:cNvPicPr>
@@ -5787,7 +7651,7 @@
           </p:nvPr>
         </p:nvPicPr>
         <p:blipFill>
-          <a:blip r:embed="rId2">
+          <a:blip r:embed="rId3">
             <a:extLst>
               <a:ext uri="{28A0092B-C50C-407E-A947-70E740481C1C}">
                 <a14:useLocalDpi xmlns:a14="http://schemas.microsoft.com/office/drawing/2010/main" val="0"/>
@@ -5801,28 +7665,254 @@
         </p:blipFill>
         <p:spPr bwMode="auto">
           <a:xfrm>
-            <a:off x="1066800" y="1600200"/>
-            <a:ext cx="6400800" cy="4800600"/>
+            <a:off x="965817" y="1200150"/>
+            <a:ext cx="6602766" cy="3600450"/>
           </a:xfrm>
           <a:prstGeom prst="rect">
             <a:avLst/>
           </a:prstGeom>
           <a:noFill/>
+          <a:ln>
+            <a:noFill/>
+          </a:ln>
           <a:extLst>
             <a:ext uri="{909E8E84-426E-40DD-AFC4-6F175D3DCCD1}">
               <a14:hiddenFill xmlns:a14="http://schemas.microsoft.com/office/drawing/2010/main">
                 <a:solidFill>
-                  <a:srgbClr val="FFFFFF"/>
+                  <a:schemeClr val="accent1"/>
                 </a:solidFill>
               </a14:hiddenFill>
+            </a:ext>
+            <a:ext uri="{91240B29-F687-4F45-9708-019B960494DF}">
+              <a14:hiddenLine xmlns:a14="http://schemas.microsoft.com/office/drawing/2010/main" w="9525">
+                <a:solidFill>
+                  <a:schemeClr val="tx1"/>
+                </a:solidFill>
+                <a:miter lim="800000"/>
+                <a:headEnd/>
+                <a:tailEnd/>
+              </a14:hiddenLine>
             </a:ext>
           </a:extLst>
         </p:spPr>
       </p:pic>
+      <p:sp>
+        <p:nvSpPr>
+          <p:cNvPr id="4" name="Slide Number Placeholder 3"/>
+          <p:cNvSpPr>
+            <a:spLocks noGrp="1"/>
+          </p:cNvSpPr>
+          <p:nvPr>
+            <p:ph type="sldNum" sz="quarter" idx="12"/>
+          </p:nvPr>
+        </p:nvSpPr>
+        <p:spPr/>
+        <p:txBody>
+          <a:bodyPr/>
+          <a:lstStyle/>
+          <a:p>
+            <a:fld id="{3C11000A-9EC0-40DA-B0AC-602B3E73336E}" type="slidenum">
+              <a:rPr lang="en-US" smtClean="0"/>
+              <a:t>4</a:t>
+            </a:fld>
+            <a:endParaRPr lang="en-US"/>
+          </a:p>
+        </p:txBody>
+      </p:sp>
     </p:spTree>
     <p:extLst>
       <p:ext uri="{BB962C8B-B14F-4D97-AF65-F5344CB8AC3E}">
-        <p14:creationId xmlns:p14="http://schemas.microsoft.com/office/powerpoint/2010/main" val="873742714"/>
+        <p14:creationId xmlns:p14="http://schemas.microsoft.com/office/powerpoint/2010/main" val="3967356869"/>
+      </p:ext>
+    </p:extLst>
+  </p:cSld>
+  <p:clrMapOvr>
+    <a:masterClrMapping/>
+  </p:clrMapOvr>
+</p:sld>
+</file>
+
+<file path=ppt/slides/slide40.xml><?xml version="1.0" encoding="utf-8"?>
+<p:sld xmlns:a="http://schemas.openxmlformats.org/drawingml/2006/main" xmlns:r="http://schemas.openxmlformats.org/officeDocument/2006/relationships" xmlns:p="http://schemas.openxmlformats.org/presentationml/2006/main">
+  <p:cSld>
+    <p:spTree>
+      <p:nvGrpSpPr>
+        <p:cNvPr id="1" name=""/>
+        <p:cNvGrpSpPr/>
+        <p:nvPr/>
+      </p:nvGrpSpPr>
+      <p:grpSpPr>
+        <a:xfrm>
+          <a:off x="0" y="0"/>
+          <a:ext cx="0" cy="0"/>
+          <a:chOff x="0" y="0"/>
+          <a:chExt cx="0" cy="0"/>
+        </a:xfrm>
+      </p:grpSpPr>
+      <p:sp>
+        <p:nvSpPr>
+          <p:cNvPr id="2" name="Title 1"/>
+          <p:cNvSpPr>
+            <a:spLocks noGrp="1"/>
+          </p:cNvSpPr>
+          <p:nvPr>
+            <p:ph type="title"/>
+          </p:nvPr>
+        </p:nvSpPr>
+        <p:spPr/>
+        <p:txBody>
+          <a:bodyPr/>
+          <a:lstStyle/>
+          <a:p>
+            <a:r>
+              <a:rPr lang="en-US" dirty="0" smtClean="0"/>
+              <a:t>Ideas for Future Work</a:t>
+            </a:r>
+            <a:endParaRPr lang="en-US" dirty="0"/>
+          </a:p>
+        </p:txBody>
+      </p:sp>
+      <p:sp>
+        <p:nvSpPr>
+          <p:cNvPr id="3" name="Content Placeholder 2"/>
+          <p:cNvSpPr>
+            <a:spLocks noGrp="1"/>
+          </p:cNvSpPr>
+          <p:nvPr>
+            <p:ph idx="1"/>
+          </p:nvPr>
+        </p:nvSpPr>
+        <p:spPr/>
+        <p:txBody>
+          <a:bodyPr/>
+          <a:lstStyle/>
+          <a:p>
+            <a:endParaRPr lang="en-US"/>
+          </a:p>
+        </p:txBody>
+      </p:sp>
+      <p:sp>
+        <p:nvSpPr>
+          <p:cNvPr id="4" name="Slide Number Placeholder 3"/>
+          <p:cNvSpPr>
+            <a:spLocks noGrp="1"/>
+          </p:cNvSpPr>
+          <p:nvPr>
+            <p:ph type="sldNum" sz="quarter" idx="12"/>
+          </p:nvPr>
+        </p:nvSpPr>
+        <p:spPr/>
+        <p:txBody>
+          <a:bodyPr/>
+          <a:lstStyle/>
+          <a:p>
+            <a:fld id="{3C11000A-9EC0-40DA-B0AC-602B3E73336E}" type="slidenum">
+              <a:rPr lang="en-US" smtClean="0"/>
+              <a:t>40</a:t>
+            </a:fld>
+            <a:endParaRPr lang="en-US"/>
+          </a:p>
+        </p:txBody>
+      </p:sp>
+    </p:spTree>
+    <p:extLst>
+      <p:ext uri="{BB962C8B-B14F-4D97-AF65-F5344CB8AC3E}">
+        <p14:creationId xmlns:p14="http://schemas.microsoft.com/office/powerpoint/2010/main" val="2234000069"/>
+      </p:ext>
+    </p:extLst>
+  </p:cSld>
+  <p:clrMapOvr>
+    <a:masterClrMapping/>
+  </p:clrMapOvr>
+</p:sld>
+</file>
+
+<file path=ppt/slides/slide41.xml><?xml version="1.0" encoding="utf-8"?>
+<p:sld xmlns:a="http://schemas.openxmlformats.org/drawingml/2006/main" xmlns:r="http://schemas.openxmlformats.org/officeDocument/2006/relationships" xmlns:p="http://schemas.openxmlformats.org/presentationml/2006/main">
+  <p:cSld>
+    <p:spTree>
+      <p:nvGrpSpPr>
+        <p:cNvPr id="1" name=""/>
+        <p:cNvGrpSpPr/>
+        <p:nvPr/>
+      </p:nvGrpSpPr>
+      <p:grpSpPr>
+        <a:xfrm>
+          <a:off x="0" y="0"/>
+          <a:ext cx="0" cy="0"/>
+          <a:chOff x="0" y="0"/>
+          <a:chExt cx="0" cy="0"/>
+        </a:xfrm>
+      </p:grpSpPr>
+      <p:sp>
+        <p:nvSpPr>
+          <p:cNvPr id="2" name="Title 1"/>
+          <p:cNvSpPr>
+            <a:spLocks noGrp="1"/>
+          </p:cNvSpPr>
+          <p:nvPr>
+            <p:ph type="title"/>
+          </p:nvPr>
+        </p:nvSpPr>
+        <p:spPr/>
+        <p:txBody>
+          <a:bodyPr/>
+          <a:lstStyle/>
+          <a:p>
+            <a:r>
+              <a:rPr lang="en-US" smtClean="0"/>
+              <a:t>Conclusion</a:t>
+            </a:r>
+            <a:endParaRPr lang="en-US"/>
+          </a:p>
+        </p:txBody>
+      </p:sp>
+      <p:sp>
+        <p:nvSpPr>
+          <p:cNvPr id="3" name="Content Placeholder 2"/>
+          <p:cNvSpPr>
+            <a:spLocks noGrp="1"/>
+          </p:cNvSpPr>
+          <p:nvPr>
+            <p:ph idx="1"/>
+          </p:nvPr>
+        </p:nvSpPr>
+        <p:spPr/>
+        <p:txBody>
+          <a:bodyPr/>
+          <a:lstStyle/>
+          <a:p>
+            <a:endParaRPr lang="en-US"/>
+          </a:p>
+        </p:txBody>
+      </p:sp>
+      <p:sp>
+        <p:nvSpPr>
+          <p:cNvPr id="4" name="Slide Number Placeholder 3"/>
+          <p:cNvSpPr>
+            <a:spLocks noGrp="1"/>
+          </p:cNvSpPr>
+          <p:nvPr>
+            <p:ph type="sldNum" sz="quarter" idx="12"/>
+          </p:nvPr>
+        </p:nvSpPr>
+        <p:spPr/>
+        <p:txBody>
+          <a:bodyPr/>
+          <a:lstStyle/>
+          <a:p>
+            <a:fld id="{3C11000A-9EC0-40DA-B0AC-602B3E73336E}" type="slidenum">
+              <a:rPr lang="en-US" smtClean="0"/>
+              <a:t>41</a:t>
+            </a:fld>
+            <a:endParaRPr lang="en-US"/>
+          </a:p>
+        </p:txBody>
+      </p:sp>
+    </p:spTree>
+    <p:extLst>
+      <p:ext uri="{BB962C8B-B14F-4D97-AF65-F5344CB8AC3E}">
+        <p14:creationId xmlns:p14="http://schemas.microsoft.com/office/powerpoint/2010/main" val="2510464877"/>
       </p:ext>
     </p:extLst>
   </p:cSld>
@@ -5866,7 +7956,7 @@
           <a:p>
             <a:r>
               <a:rPr lang="en-US" dirty="0" smtClean="0"/>
-              <a:t>It’s in the audible range</a:t>
+              <a:t>Bell 202</a:t>
             </a:r>
             <a:endParaRPr lang="en-US" dirty="0"/>
           </a:p>
@@ -5889,16 +7979,45 @@
           <a:p>
             <a:r>
               <a:rPr lang="en-US" dirty="0" smtClean="0"/>
-              <a:t>What’s it sound like?</a:t>
+              <a:t>1200 Baud AFSK using 1200Hz and 2200Hz tones.</a:t>
+            </a:r>
+          </a:p>
+          <a:p>
+            <a:r>
+              <a:rPr lang="en-US" dirty="0" smtClean="0"/>
+              <a:t>Audio Frequency Shift Keying – using multiple tones in the audible range to encode data.</a:t>
             </a:r>
             <a:endParaRPr lang="en-US" dirty="0"/>
+          </a:p>
+        </p:txBody>
+      </p:sp>
+      <p:sp>
+        <p:nvSpPr>
+          <p:cNvPr id="4" name="Slide Number Placeholder 3"/>
+          <p:cNvSpPr>
+            <a:spLocks noGrp="1"/>
+          </p:cNvSpPr>
+          <p:nvPr>
+            <p:ph type="sldNum" sz="quarter" idx="12"/>
+          </p:nvPr>
+        </p:nvSpPr>
+        <p:spPr/>
+        <p:txBody>
+          <a:bodyPr/>
+          <a:lstStyle/>
+          <a:p>
+            <a:fld id="{3C11000A-9EC0-40DA-B0AC-602B3E73336E}" type="slidenum">
+              <a:rPr lang="en-US" smtClean="0"/>
+              <a:t>5</a:t>
+            </a:fld>
+            <a:endParaRPr lang="en-US"/>
           </a:p>
         </p:txBody>
       </p:sp>
     </p:spTree>
     <p:extLst>
       <p:ext uri="{BB962C8B-B14F-4D97-AF65-F5344CB8AC3E}">
-        <p14:creationId xmlns:p14="http://schemas.microsoft.com/office/powerpoint/2010/main" val="3000226632"/>
+        <p14:creationId xmlns:p14="http://schemas.microsoft.com/office/powerpoint/2010/main" val="854329189"/>
       </p:ext>
     </p:extLst>
   </p:cSld>
@@ -5942,59 +8061,82 @@
           <a:p>
             <a:r>
               <a:rPr lang="en-US" dirty="0" smtClean="0"/>
-              <a:t>How does one demodulate this signal?</a:t>
+              <a:t>Example Signal</a:t>
             </a:r>
             <a:endParaRPr lang="en-US" dirty="0"/>
           </a:p>
         </p:txBody>
       </p:sp>
-      <p:sp>
-        <p:nvSpPr>
-          <p:cNvPr id="3" name="Content Placeholder 2"/>
-          <p:cNvSpPr>
-            <a:spLocks noGrp="1"/>
-          </p:cNvSpPr>
+      <p:pic>
+        <p:nvPicPr>
+          <p:cNvPr id="1028" name="Picture 4" descr="D:\Robert Campbell\Documents\GitHub\rrxthesis\images\Datasignalencodingbitstream0000.png"/>
+          <p:cNvPicPr>
+            <a:picLocks noGrp="1" noChangeAspect="1" noChangeArrowheads="1"/>
+          </p:cNvPicPr>
           <p:nvPr>
             <p:ph idx="1"/>
           </p:nvPr>
-        </p:nvSpPr>
-        <p:spPr/>
-        <p:txBody>
-          <a:bodyPr/>
-          <a:lstStyle/>
-          <a:p>
-            <a:r>
-              <a:rPr lang="en-US" dirty="0" smtClean="0"/>
-              <a:t>Edge Detection</a:t>
-            </a:r>
-          </a:p>
-          <a:p>
-            <a:r>
-              <a:rPr lang="en-US" dirty="0" smtClean="0"/>
-              <a:t>Correlation</a:t>
-            </a:r>
-          </a:p>
-          <a:p>
-            <a:r>
-              <a:rPr lang="en-US" dirty="0" smtClean="0"/>
-              <a:t>Filters</a:t>
-            </a:r>
-          </a:p>
-          <a:p>
-            <a:r>
-              <a:rPr lang="en-US" dirty="0" smtClean="0"/>
-              <a:t>Phase Locked Loop</a:t>
-            </a:r>
-          </a:p>
-          <a:p>
-            <a:endParaRPr lang="en-US" dirty="0"/>
+        </p:nvPicPr>
+        <p:blipFill>
+          <a:blip r:embed="rId3">
+            <a:extLst>
+              <a:ext uri="{28A0092B-C50C-407E-A947-70E740481C1C}">
+                <a14:useLocalDpi xmlns:a14="http://schemas.microsoft.com/office/drawing/2010/main" val="0"/>
+              </a:ext>
+            </a:extLst>
+          </a:blip>
+          <a:srcRect/>
+          <a:stretch>
+            <a:fillRect/>
+          </a:stretch>
+        </p:blipFill>
+        <p:spPr bwMode="auto">
+          <a:xfrm>
+            <a:off x="1600200" y="1200150"/>
+            <a:ext cx="5638800" cy="3600450"/>
+          </a:xfrm>
+          <a:prstGeom prst="rect">
+            <a:avLst/>
+          </a:prstGeom>
+          <a:noFill/>
+          <a:extLst>
+            <a:ext uri="{909E8E84-426E-40DD-AFC4-6F175D3DCCD1}">
+              <a14:hiddenFill xmlns:a14="http://schemas.microsoft.com/office/drawing/2010/main">
+                <a:solidFill>
+                  <a:srgbClr val="FFFFFF"/>
+                </a:solidFill>
+              </a14:hiddenFill>
+            </a:ext>
+          </a:extLst>
+        </p:spPr>
+      </p:pic>
+      <p:sp>
+        <p:nvSpPr>
+          <p:cNvPr id="3" name="Slide Number Placeholder 2"/>
+          <p:cNvSpPr>
+            <a:spLocks noGrp="1"/>
+          </p:cNvSpPr>
+          <p:nvPr>
+            <p:ph type="sldNum" sz="quarter" idx="12"/>
+          </p:nvPr>
+        </p:nvSpPr>
+        <p:spPr/>
+        <p:txBody>
+          <a:bodyPr/>
+          <a:lstStyle/>
+          <a:p>
+            <a:fld id="{3C11000A-9EC0-40DA-B0AC-602B3E73336E}" type="slidenum">
+              <a:rPr lang="en-US" smtClean="0"/>
+              <a:t>6</a:t>
+            </a:fld>
+            <a:endParaRPr lang="en-US"/>
           </a:p>
         </p:txBody>
       </p:sp>
     </p:spTree>
     <p:extLst>
       <p:ext uri="{BB962C8B-B14F-4D97-AF65-F5344CB8AC3E}">
-        <p14:creationId xmlns:p14="http://schemas.microsoft.com/office/powerpoint/2010/main" val="103895829"/>
+        <p14:creationId xmlns:p14="http://schemas.microsoft.com/office/powerpoint/2010/main" val="873742714"/>
       </p:ext>
     </p:extLst>
   </p:cSld>
@@ -6038,7 +8180,7 @@
           <a:p>
             <a:r>
               <a:rPr lang="en-US" dirty="0" smtClean="0"/>
-              <a:t>Edge Detection</a:t>
+              <a:t>It’s in the audible range</a:t>
             </a:r>
             <a:endParaRPr lang="en-US" dirty="0"/>
           </a:p>
@@ -6061,40 +8203,225 @@
           <a:p>
             <a:r>
               <a:rPr lang="en-US" dirty="0" smtClean="0"/>
-              <a:t>Look for rising and falling </a:t>
+              <a:t>What’s it sound like</a:t>
             </a:r>
             <a:r>
               <a:rPr lang="en-US" dirty="0" smtClean="0"/>
-              <a:t>edges</a:t>
-            </a:r>
-          </a:p>
-          <a:p>
-            <a:r>
-              <a:rPr lang="en-US" dirty="0" smtClean="0"/>
-              <a:t>Distance between consecutive “zero-crossings” is </a:t>
-            </a:r>
-            <a:r>
-              <a:rPr lang="el-GR" dirty="0" smtClean="0"/>
-              <a:t>λ</a:t>
-            </a:r>
-            <a:r>
-              <a:rPr lang="en-US" dirty="0" smtClean="0"/>
-              <a:t>/2</a:t>
-            </a:r>
+              <a:t>?</a:t>
+            </a:r>
+          </a:p>
+          <a:p>
             <a:endParaRPr lang="en-US" dirty="0"/>
           </a:p>
         </p:txBody>
       </p:sp>
+      <p:sp>
+        <p:nvSpPr>
+          <p:cNvPr id="4" name="Slide Number Placeholder 3"/>
+          <p:cNvSpPr>
+            <a:spLocks noGrp="1"/>
+          </p:cNvSpPr>
+          <p:nvPr>
+            <p:ph type="sldNum" sz="quarter" idx="12"/>
+          </p:nvPr>
+        </p:nvSpPr>
+        <p:spPr/>
+        <p:txBody>
+          <a:bodyPr/>
+          <a:lstStyle/>
+          <a:p>
+            <a:fld id="{3C11000A-9EC0-40DA-B0AC-602B3E73336E}" type="slidenum">
+              <a:rPr lang="en-US" smtClean="0"/>
+              <a:t>7</a:t>
+            </a:fld>
+            <a:endParaRPr lang="en-US"/>
+          </a:p>
+        </p:txBody>
+      </p:sp>
+      <p:pic>
+        <p:nvPicPr>
+          <p:cNvPr id="3075" name="Picture 3"/>
+          <p:cNvPicPr>
+            <a:picLocks noChangeAspect="1" noChangeArrowheads="1"/>
+          </p:cNvPicPr>
+          <p:nvPr/>
+        </p:nvPicPr>
+        <p:blipFill>
+          <a:blip r:embed="rId5">
+            <a:extLst>
+              <a:ext uri="{28A0092B-C50C-407E-A947-70E740481C1C}">
+                <a14:useLocalDpi xmlns:a14="http://schemas.microsoft.com/office/drawing/2010/main" val="0"/>
+              </a:ext>
+            </a:extLst>
+          </a:blip>
+          <a:srcRect/>
+          <a:stretch>
+            <a:fillRect/>
+          </a:stretch>
+        </p:blipFill>
+        <p:spPr bwMode="auto">
+          <a:xfrm>
+            <a:off x="685800" y="1733550"/>
+            <a:ext cx="7180263" cy="3258367"/>
+          </a:xfrm>
+          <a:prstGeom prst="rect">
+            <a:avLst/>
+          </a:prstGeom>
+          <a:noFill/>
+          <a:ln>
+            <a:noFill/>
+          </a:ln>
+          <a:extLst>
+            <a:ext uri="{909E8E84-426E-40DD-AFC4-6F175D3DCCD1}">
+              <a14:hiddenFill xmlns:a14="http://schemas.microsoft.com/office/drawing/2010/main">
+                <a:solidFill>
+                  <a:schemeClr val="accent1"/>
+                </a:solidFill>
+              </a14:hiddenFill>
+            </a:ext>
+            <a:ext uri="{91240B29-F687-4F45-9708-019B960494DF}">
+              <a14:hiddenLine xmlns:a14="http://schemas.microsoft.com/office/drawing/2010/main" w="9525">
+                <a:solidFill>
+                  <a:schemeClr val="tx1"/>
+                </a:solidFill>
+                <a:miter lim="800000"/>
+                <a:headEnd/>
+                <a:tailEnd/>
+              </a14:hiddenLine>
+            </a:ext>
+          </a:extLst>
+        </p:spPr>
+      </p:pic>
+      <p:pic>
+        <p:nvPicPr>
+          <p:cNvPr id="5" name="APRSDroidMyPacket.wav">
+            <a:hlinkClick r:id="" action="ppaction://media"/>
+          </p:cNvPr>
+          <p:cNvPicPr>
+            <a:picLocks noChangeAspect="1"/>
+          </p:cNvPicPr>
+          <p:nvPr>
+            <a:audioFile r:link="rId2"/>
+            <p:extLst>
+              <p:ext uri="{DAA4B4D4-6D71-4841-9C94-3DE7FCFB9230}">
+                <p14:media xmlns:p14="http://schemas.microsoft.com/office/powerpoint/2010/main" r:embed="rId1"/>
+              </p:ext>
+            </p:extLst>
+          </p:nvPr>
+        </p:nvPicPr>
+        <p:blipFill>
+          <a:blip r:embed="rId6"/>
+          <a:stretch>
+            <a:fillRect/>
+          </a:stretch>
+        </p:blipFill>
+        <p:spPr>
+          <a:xfrm>
+            <a:off x="7086600" y="819150"/>
+            <a:ext cx="609600" cy="609600"/>
+          </a:xfrm>
+          <a:prstGeom prst="rect">
+            <a:avLst/>
+          </a:prstGeom>
+        </p:spPr>
+      </p:pic>
     </p:spTree>
     <p:extLst>
       <p:ext uri="{BB962C8B-B14F-4D97-AF65-F5344CB8AC3E}">
-        <p14:creationId xmlns:p14="http://schemas.microsoft.com/office/powerpoint/2010/main" val="706343745"/>
+        <p14:creationId xmlns:p14="http://schemas.microsoft.com/office/powerpoint/2010/main" val="3000226632"/>
       </p:ext>
     </p:extLst>
   </p:cSld>
   <p:clrMapOvr>
     <a:masterClrMapping/>
   </p:clrMapOvr>
+  <p:timing>
+    <p:tnLst>
+      <p:par>
+        <p:cTn id="1" dur="indefinite" restart="never" nodeType="tmRoot">
+          <p:childTnLst>
+            <p:seq concurrent="1" nextAc="seek">
+              <p:cTn id="2" restart="whenNotActive" fill="hold" evtFilter="cancelBubble" nodeType="interactiveSeq">
+                <p:stCondLst>
+                  <p:cond evt="onClick" delay="0">
+                    <p:tgtEl>
+                      <p:spTgt spid="5"/>
+                    </p:tgtEl>
+                  </p:cond>
+                </p:stCondLst>
+                <p:endSync evt="end" delay="0">
+                  <p:rtn val="all"/>
+                </p:endSync>
+                <p:childTnLst>
+                  <p:par>
+                    <p:cTn id="3" fill="hold">
+                      <p:stCondLst>
+                        <p:cond delay="0"/>
+                      </p:stCondLst>
+                      <p:childTnLst>
+                        <p:par>
+                          <p:cTn id="4" fill="hold">
+                            <p:stCondLst>
+                              <p:cond delay="0"/>
+                            </p:stCondLst>
+                            <p:childTnLst>
+                              <p:par>
+                                <p:cTn id="5" presetID="1" presetClass="mediacall" presetSubtype="0" fill="hold" nodeType="clickEffect">
+                                  <p:stCondLst>
+                                    <p:cond delay="0"/>
+                                  </p:stCondLst>
+                                  <p:childTnLst>
+                                    <p:cmd type="call" cmd="playFrom(0.0)">
+                                      <p:cBhvr>
+                                        <p:cTn id="6" dur="1519" fill="hold"/>
+                                        <p:tgtEl>
+                                          <p:spTgt spid="5"/>
+                                        </p:tgtEl>
+                                      </p:cBhvr>
+                                    </p:cmd>
+                                  </p:childTnLst>
+                                </p:cTn>
+                              </p:par>
+                            </p:childTnLst>
+                          </p:cTn>
+                        </p:par>
+                      </p:childTnLst>
+                    </p:cTn>
+                  </p:par>
+                </p:childTnLst>
+              </p:cTn>
+              <p:nextCondLst>
+                <p:cond evt="onClick" delay="0">
+                  <p:tgtEl>
+                    <p:spTgt spid="5"/>
+                  </p:tgtEl>
+                </p:cond>
+              </p:nextCondLst>
+            </p:seq>
+            <p:audio>
+              <p:cMediaNode vol="80000">
+                <p:cTn id="7" fill="hold" display="0">
+                  <p:stCondLst>
+                    <p:cond delay="indefinite"/>
+                  </p:stCondLst>
+                  <p:endCondLst>
+                    <p:cond evt="onStopAudio" delay="0">
+                      <p:tgtEl>
+                        <p:sldTgt/>
+                      </p:tgtEl>
+                    </p:cond>
+                  </p:endCondLst>
+                </p:cTn>
+                <p:tgtEl>
+                  <p:spTgt spid="5"/>
+                </p:tgtEl>
+              </p:cMediaNode>
+            </p:audio>
+          </p:childTnLst>
+        </p:cTn>
+      </p:par>
+    </p:tnLst>
+  </p:timing>
 </p:sld>
 </file>
 
@@ -6132,39 +8459,90 @@
           <a:p>
             <a:r>
               <a:rPr lang="en-US" dirty="0" smtClean="0"/>
+              <a:t>How </a:t>
+            </a:r>
+            <a:r>
+              <a:rPr lang="en-US" dirty="0" smtClean="0"/>
+              <a:t>to demodulate </a:t>
+            </a:r>
+            <a:r>
+              <a:rPr lang="en-US" dirty="0" smtClean="0"/>
+              <a:t>this signal?</a:t>
+            </a:r>
+            <a:endParaRPr lang="en-US" dirty="0"/>
+          </a:p>
+        </p:txBody>
+      </p:sp>
+      <p:sp>
+        <p:nvSpPr>
+          <p:cNvPr id="3" name="Content Placeholder 2"/>
+          <p:cNvSpPr>
+            <a:spLocks noGrp="1"/>
+          </p:cNvSpPr>
+          <p:nvPr>
+            <p:ph idx="1"/>
+          </p:nvPr>
+        </p:nvSpPr>
+        <p:spPr/>
+        <p:txBody>
+          <a:bodyPr/>
+          <a:lstStyle/>
+          <a:p>
+            <a:r>
+              <a:rPr lang="en-US" dirty="0" smtClean="0"/>
+              <a:t>Edge Detection</a:t>
+            </a:r>
+          </a:p>
+          <a:p>
+            <a:r>
+              <a:rPr lang="en-US" dirty="0" smtClean="0"/>
               <a:t>Correlation</a:t>
             </a:r>
+          </a:p>
+          <a:p>
+            <a:r>
+              <a:rPr lang="en-US" dirty="0" smtClean="0"/>
+              <a:t>Filters</a:t>
+            </a:r>
+          </a:p>
+          <a:p>
+            <a:r>
+              <a:rPr lang="en-US" dirty="0" smtClean="0"/>
+              <a:t>Phase Locked Loop</a:t>
+            </a:r>
+          </a:p>
+          <a:p>
             <a:endParaRPr lang="en-US" dirty="0"/>
           </a:p>
         </p:txBody>
       </p:sp>
       <p:sp>
         <p:nvSpPr>
-          <p:cNvPr id="3" name="Content Placeholder 2"/>
-          <p:cNvSpPr>
-            <a:spLocks noGrp="1"/>
-          </p:cNvSpPr>
-          <p:nvPr>
-            <p:ph idx="1"/>
-          </p:nvPr>
-        </p:nvSpPr>
-        <p:spPr/>
-        <p:txBody>
-          <a:bodyPr/>
-          <a:lstStyle/>
-          <a:p>
-            <a:r>
-              <a:rPr lang="en-US" dirty="0" smtClean="0"/>
-              <a:t>Correlates original signal with expected signals.</a:t>
-            </a:r>
-            <a:endParaRPr lang="en-US" dirty="0"/>
+          <p:cNvPr id="4" name="Slide Number Placeholder 3"/>
+          <p:cNvSpPr>
+            <a:spLocks noGrp="1"/>
+          </p:cNvSpPr>
+          <p:nvPr>
+            <p:ph type="sldNum" sz="quarter" idx="12"/>
+          </p:nvPr>
+        </p:nvSpPr>
+        <p:spPr/>
+        <p:txBody>
+          <a:bodyPr/>
+          <a:lstStyle/>
+          <a:p>
+            <a:fld id="{3C11000A-9EC0-40DA-B0AC-602B3E73336E}" type="slidenum">
+              <a:rPr lang="en-US" smtClean="0"/>
+              <a:t>8</a:t>
+            </a:fld>
+            <a:endParaRPr lang="en-US"/>
           </a:p>
         </p:txBody>
       </p:sp>
     </p:spTree>
     <p:extLst>
       <p:ext uri="{BB962C8B-B14F-4D97-AF65-F5344CB8AC3E}">
-        <p14:creationId xmlns:p14="http://schemas.microsoft.com/office/powerpoint/2010/main" val="2028967215"/>
+        <p14:creationId xmlns:p14="http://schemas.microsoft.com/office/powerpoint/2010/main" val="103895829"/>
       </p:ext>
     </p:extLst>
   </p:cSld>
@@ -6208,7 +8586,7 @@
           <a:p>
             <a:r>
               <a:rPr lang="en-US" dirty="0" smtClean="0"/>
-              <a:t>Filters</a:t>
+              <a:t>Edge Detection</a:t>
             </a:r>
             <a:endParaRPr lang="en-US" dirty="0"/>
           </a:p>
@@ -6231,16 +8609,53 @@
           <a:p>
             <a:r>
               <a:rPr lang="en-US" dirty="0" smtClean="0"/>
-              <a:t>Filters look at signal strength of individual frequencies</a:t>
+              <a:t>Look for rising and falling edges</a:t>
+            </a:r>
+          </a:p>
+          <a:p>
+            <a:r>
+              <a:rPr lang="en-US" dirty="0" smtClean="0"/>
+              <a:t>Distance between consecutive “zero-crossings” is </a:t>
+            </a:r>
+            <a:r>
+              <a:rPr lang="el-GR" dirty="0" smtClean="0"/>
+              <a:t>λ</a:t>
+            </a:r>
+            <a:r>
+              <a:rPr lang="en-US" dirty="0" smtClean="0"/>
+              <a:t>/2</a:t>
             </a:r>
             <a:endParaRPr lang="en-US" dirty="0"/>
+          </a:p>
+        </p:txBody>
+      </p:sp>
+      <p:sp>
+        <p:nvSpPr>
+          <p:cNvPr id="4" name="Slide Number Placeholder 3"/>
+          <p:cNvSpPr>
+            <a:spLocks noGrp="1"/>
+          </p:cNvSpPr>
+          <p:nvPr>
+            <p:ph type="sldNum" sz="quarter" idx="12"/>
+          </p:nvPr>
+        </p:nvSpPr>
+        <p:spPr/>
+        <p:txBody>
+          <a:bodyPr/>
+          <a:lstStyle/>
+          <a:p>
+            <a:fld id="{3C11000A-9EC0-40DA-B0AC-602B3E73336E}" type="slidenum">
+              <a:rPr lang="en-US" smtClean="0"/>
+              <a:t>9</a:t>
+            </a:fld>
+            <a:endParaRPr lang="en-US"/>
           </a:p>
         </p:txBody>
       </p:sp>
     </p:spTree>
     <p:extLst>
       <p:ext uri="{BB962C8B-B14F-4D97-AF65-F5344CB8AC3E}">
-        <p14:creationId xmlns:p14="http://schemas.microsoft.com/office/powerpoint/2010/main" val="32162559"/>
+        <p14:creationId xmlns:p14="http://schemas.microsoft.com/office/powerpoint/2010/main" val="706343745"/>
       </p:ext>
     </p:extLst>
   </p:cSld>
@@ -6481,4 +8896,289 @@
   <a:objectDefaults/>
   <a:extraClrSchemeLst/>
 </a:theme>
+</file>
+
+<file path=ppt/theme/theme2.xml><?xml version="1.0" encoding="utf-8"?>
+<a:theme xmlns:a="http://schemas.openxmlformats.org/drawingml/2006/main" name="Office Theme">
+  <a:themeElements>
+    <a:clrScheme name="Office">
+      <a:dk1>
+        <a:sysClr val="windowText" lastClr="000000"/>
+      </a:dk1>
+      <a:lt1>
+        <a:sysClr val="window" lastClr="FFFFFF"/>
+      </a:lt1>
+      <a:dk2>
+        <a:srgbClr val="1F497D"/>
+      </a:dk2>
+      <a:lt2>
+        <a:srgbClr val="EEECE1"/>
+      </a:lt2>
+      <a:accent1>
+        <a:srgbClr val="4F81BD"/>
+      </a:accent1>
+      <a:accent2>
+        <a:srgbClr val="C0504D"/>
+      </a:accent2>
+      <a:accent3>
+        <a:srgbClr val="9BBB59"/>
+      </a:accent3>
+      <a:accent4>
+        <a:srgbClr val="8064A2"/>
+      </a:accent4>
+      <a:accent5>
+        <a:srgbClr val="4BACC6"/>
+      </a:accent5>
+      <a:accent6>
+        <a:srgbClr val="F79646"/>
+      </a:accent6>
+      <a:hlink>
+        <a:srgbClr val="0000FF"/>
+      </a:hlink>
+      <a:folHlink>
+        <a:srgbClr val="800080"/>
+      </a:folHlink>
+    </a:clrScheme>
+    <a:fontScheme name="Office">
+      <a:majorFont>
+        <a:latin typeface="Calibri"/>
+        <a:ea typeface=""/>
+        <a:cs typeface=""/>
+        <a:font script="Jpan" typeface="ＭＳ Ｐゴシック"/>
+        <a:font script="Hang" typeface="맑은 고딕"/>
+        <a:font script="Hans" typeface="宋体"/>
+        <a:font script="Hant" typeface="新細明體"/>
+        <a:font script="Arab" typeface="Times New Roman"/>
+        <a:font script="Hebr" typeface="Times New Roman"/>
+        <a:font script="Thai" typeface="Angsana New"/>
+        <a:font script="Ethi" typeface="Nyala"/>
+        <a:font script="Beng" typeface="Vrinda"/>
+        <a:font script="Gujr" typeface="Shruti"/>
+        <a:font script="Khmr" typeface="MoolBoran"/>
+        <a:font script="Knda" typeface="Tunga"/>
+        <a:font script="Guru" typeface="Raavi"/>
+        <a:font script="Cans" typeface="Euphemia"/>
+        <a:font script="Cher" typeface="Plantagenet Cherokee"/>
+        <a:font script="Yiii" typeface="Microsoft Yi Baiti"/>
+        <a:font script="Tibt" typeface="Microsoft Himalaya"/>
+        <a:font script="Thaa" typeface="MV Boli"/>
+        <a:font script="Deva" typeface="Mangal"/>
+        <a:font script="Telu" typeface="Gautami"/>
+        <a:font script="Taml" typeface="Latha"/>
+        <a:font script="Syrc" typeface="Estrangelo Edessa"/>
+        <a:font script="Orya" typeface="Kalinga"/>
+        <a:font script="Mlym" typeface="Kartika"/>
+        <a:font script="Laoo" typeface="DokChampa"/>
+        <a:font script="Sinh" typeface="Iskoola Pota"/>
+        <a:font script="Mong" typeface="Mongolian Baiti"/>
+        <a:font script="Viet" typeface="Times New Roman"/>
+        <a:font script="Uigh" typeface="Microsoft Uighur"/>
+        <a:font script="Geor" typeface="Sylfaen"/>
+      </a:majorFont>
+      <a:minorFont>
+        <a:latin typeface="Calibri"/>
+        <a:ea typeface=""/>
+        <a:cs typeface=""/>
+        <a:font script="Jpan" typeface="ＭＳ Ｐゴシック"/>
+        <a:font script="Hang" typeface="맑은 고딕"/>
+        <a:font script="Hans" typeface="宋体"/>
+        <a:font script="Hant" typeface="新細明體"/>
+        <a:font script="Arab" typeface="Arial"/>
+        <a:font script="Hebr" typeface="Arial"/>
+        <a:font script="Thai" typeface="Cordia New"/>
+        <a:font script="Ethi" typeface="Nyala"/>
+        <a:font script="Beng" typeface="Vrinda"/>
+        <a:font script="Gujr" typeface="Shruti"/>
+        <a:font script="Khmr" typeface="DaunPenh"/>
+        <a:font script="Knda" typeface="Tunga"/>
+        <a:font script="Guru" typeface="Raavi"/>
+        <a:font script="Cans" typeface="Euphemia"/>
+        <a:font script="Cher" typeface="Plantagenet Cherokee"/>
+        <a:font script="Yiii" typeface="Microsoft Yi Baiti"/>
+        <a:font script="Tibt" typeface="Microsoft Himalaya"/>
+        <a:font script="Thaa" typeface="MV Boli"/>
+        <a:font script="Deva" typeface="Mangal"/>
+        <a:font script="Telu" typeface="Gautami"/>
+        <a:font script="Taml" typeface="Latha"/>
+        <a:font script="Syrc" typeface="Estrangelo Edessa"/>
+        <a:font script="Orya" typeface="Kalinga"/>
+        <a:font script="Mlym" typeface="Kartika"/>
+        <a:font script="Laoo" typeface="DokChampa"/>
+        <a:font script="Sinh" typeface="Iskoola Pota"/>
+        <a:font script="Mong" typeface="Mongolian Baiti"/>
+        <a:font script="Viet" typeface="Arial"/>
+        <a:font script="Uigh" typeface="Microsoft Uighur"/>
+        <a:font script="Geor" typeface="Sylfaen"/>
+      </a:minorFont>
+    </a:fontScheme>
+    <a:fmtScheme name="Office">
+      <a:fillStyleLst>
+        <a:solidFill>
+          <a:schemeClr val="phClr"/>
+        </a:solidFill>
+        <a:gradFill rotWithShape="1">
+          <a:gsLst>
+            <a:gs pos="0">
+              <a:schemeClr val="phClr">
+                <a:tint val="50000"/>
+                <a:satMod val="300000"/>
+              </a:schemeClr>
+            </a:gs>
+            <a:gs pos="35000">
+              <a:schemeClr val="phClr">
+                <a:tint val="37000"/>
+                <a:satMod val="300000"/>
+              </a:schemeClr>
+            </a:gs>
+            <a:gs pos="100000">
+              <a:schemeClr val="phClr">
+                <a:tint val="15000"/>
+                <a:satMod val="350000"/>
+              </a:schemeClr>
+            </a:gs>
+          </a:gsLst>
+          <a:lin ang="16200000" scaled="1"/>
+        </a:gradFill>
+        <a:gradFill rotWithShape="1">
+          <a:gsLst>
+            <a:gs pos="0">
+              <a:schemeClr val="phClr">
+                <a:shade val="51000"/>
+                <a:satMod val="130000"/>
+              </a:schemeClr>
+            </a:gs>
+            <a:gs pos="80000">
+              <a:schemeClr val="phClr">
+                <a:shade val="93000"/>
+                <a:satMod val="130000"/>
+              </a:schemeClr>
+            </a:gs>
+            <a:gs pos="100000">
+              <a:schemeClr val="phClr">
+                <a:shade val="94000"/>
+                <a:satMod val="135000"/>
+              </a:schemeClr>
+            </a:gs>
+          </a:gsLst>
+          <a:lin ang="16200000" scaled="0"/>
+        </a:gradFill>
+      </a:fillStyleLst>
+      <a:lnStyleLst>
+        <a:ln w="9525" cap="flat" cmpd="sng" algn="ctr">
+          <a:solidFill>
+            <a:schemeClr val="phClr">
+              <a:shade val="95000"/>
+              <a:satMod val="105000"/>
+            </a:schemeClr>
+          </a:solidFill>
+          <a:prstDash val="solid"/>
+        </a:ln>
+        <a:ln w="25400" cap="flat" cmpd="sng" algn="ctr">
+          <a:solidFill>
+            <a:schemeClr val="phClr"/>
+          </a:solidFill>
+          <a:prstDash val="solid"/>
+        </a:ln>
+        <a:ln w="38100" cap="flat" cmpd="sng" algn="ctr">
+          <a:solidFill>
+            <a:schemeClr val="phClr"/>
+          </a:solidFill>
+          <a:prstDash val="solid"/>
+        </a:ln>
+      </a:lnStyleLst>
+      <a:effectStyleLst>
+        <a:effectStyle>
+          <a:effectLst>
+            <a:outerShdw blurRad="40000" dist="20000" dir="5400000" rotWithShape="0">
+              <a:srgbClr val="000000">
+                <a:alpha val="38000"/>
+              </a:srgbClr>
+            </a:outerShdw>
+          </a:effectLst>
+        </a:effectStyle>
+        <a:effectStyle>
+          <a:effectLst>
+            <a:outerShdw blurRad="40000" dist="23000" dir="5400000" rotWithShape="0">
+              <a:srgbClr val="000000">
+                <a:alpha val="35000"/>
+              </a:srgbClr>
+            </a:outerShdw>
+          </a:effectLst>
+        </a:effectStyle>
+        <a:effectStyle>
+          <a:effectLst>
+            <a:outerShdw blurRad="40000" dist="23000" dir="5400000" rotWithShape="0">
+              <a:srgbClr val="000000">
+                <a:alpha val="35000"/>
+              </a:srgbClr>
+            </a:outerShdw>
+          </a:effectLst>
+          <a:scene3d>
+            <a:camera prst="orthographicFront">
+              <a:rot lat="0" lon="0" rev="0"/>
+            </a:camera>
+            <a:lightRig rig="threePt" dir="t">
+              <a:rot lat="0" lon="0" rev="1200000"/>
+            </a:lightRig>
+          </a:scene3d>
+          <a:sp3d>
+            <a:bevelT w="63500" h="25400"/>
+          </a:sp3d>
+        </a:effectStyle>
+      </a:effectStyleLst>
+      <a:bgFillStyleLst>
+        <a:solidFill>
+          <a:schemeClr val="phClr"/>
+        </a:solidFill>
+        <a:gradFill rotWithShape="1">
+          <a:gsLst>
+            <a:gs pos="0">
+              <a:schemeClr val="phClr">
+                <a:tint val="40000"/>
+                <a:satMod val="350000"/>
+              </a:schemeClr>
+            </a:gs>
+            <a:gs pos="40000">
+              <a:schemeClr val="phClr">
+                <a:tint val="45000"/>
+                <a:shade val="99000"/>
+                <a:satMod val="350000"/>
+              </a:schemeClr>
+            </a:gs>
+            <a:gs pos="100000">
+              <a:schemeClr val="phClr">
+                <a:shade val="20000"/>
+                <a:satMod val="255000"/>
+              </a:schemeClr>
+            </a:gs>
+          </a:gsLst>
+          <a:path path="circle">
+            <a:fillToRect l="50000" t="-80000" r="50000" b="180000"/>
+          </a:path>
+        </a:gradFill>
+        <a:gradFill rotWithShape="1">
+          <a:gsLst>
+            <a:gs pos="0">
+              <a:schemeClr val="phClr">
+                <a:tint val="80000"/>
+                <a:satMod val="300000"/>
+              </a:schemeClr>
+            </a:gs>
+            <a:gs pos="100000">
+              <a:schemeClr val="phClr">
+                <a:shade val="30000"/>
+                <a:satMod val="200000"/>
+              </a:schemeClr>
+            </a:gs>
+          </a:gsLst>
+          <a:path path="circle">
+            <a:fillToRect l="50000" t="50000" r="50000" b="50000"/>
+          </a:path>
+        </a:gradFill>
+      </a:bgFillStyleLst>
+    </a:fmtScheme>
+  </a:themeElements>
+  <a:objectDefaults/>
+  <a:extraClrSchemeLst/>
+</a:theme>
 </file>
</xml_diff>

<commit_message>
Adding content to the demodulation techniques slides of presentation
</commit_message>
<xml_diff>
--- a/Thesis Defense.pptx
+++ b/Thesis Defense.pptx
@@ -5,7 +5,7 @@
     <p:sldMasterId id="2147483660" r:id="rId1"/>
   </p:sldMasterIdLst>
   <p:notesMasterIdLst>
-    <p:notesMasterId r:id="rId43"/>
+    <p:notesMasterId r:id="rId42"/>
   </p:notesMasterIdLst>
   <p:sldIdLst>
     <p:sldId id="256" r:id="rId2"/>
@@ -22,33 +22,32 @@
     <p:sldId id="265" r:id="rId13"/>
     <p:sldId id="266" r:id="rId14"/>
     <p:sldId id="267" r:id="rId15"/>
-    <p:sldId id="268" r:id="rId16"/>
-    <p:sldId id="269" r:id="rId17"/>
-    <p:sldId id="270" r:id="rId18"/>
-    <p:sldId id="271" r:id="rId19"/>
-    <p:sldId id="272" r:id="rId20"/>
-    <p:sldId id="273" r:id="rId21"/>
-    <p:sldId id="274" r:id="rId22"/>
-    <p:sldId id="275" r:id="rId23"/>
-    <p:sldId id="276" r:id="rId24"/>
-    <p:sldId id="277" r:id="rId25"/>
-    <p:sldId id="278" r:id="rId26"/>
-    <p:sldId id="279" r:id="rId27"/>
-    <p:sldId id="280" r:id="rId28"/>
-    <p:sldId id="281" r:id="rId29"/>
-    <p:sldId id="282" r:id="rId30"/>
-    <p:sldId id="283" r:id="rId31"/>
-    <p:sldId id="284" r:id="rId32"/>
-    <p:sldId id="285" r:id="rId33"/>
-    <p:sldId id="286" r:id="rId34"/>
-    <p:sldId id="287" r:id="rId35"/>
-    <p:sldId id="288" r:id="rId36"/>
-    <p:sldId id="289" r:id="rId37"/>
-    <p:sldId id="290" r:id="rId38"/>
-    <p:sldId id="291" r:id="rId39"/>
-    <p:sldId id="292" r:id="rId40"/>
-    <p:sldId id="293" r:id="rId41"/>
-    <p:sldId id="294" r:id="rId42"/>
+    <p:sldId id="270" r:id="rId16"/>
+    <p:sldId id="297" r:id="rId17"/>
+    <p:sldId id="271" r:id="rId18"/>
+    <p:sldId id="272" r:id="rId19"/>
+    <p:sldId id="273" r:id="rId20"/>
+    <p:sldId id="274" r:id="rId21"/>
+    <p:sldId id="275" r:id="rId22"/>
+    <p:sldId id="276" r:id="rId23"/>
+    <p:sldId id="277" r:id="rId24"/>
+    <p:sldId id="278" r:id="rId25"/>
+    <p:sldId id="279" r:id="rId26"/>
+    <p:sldId id="280" r:id="rId27"/>
+    <p:sldId id="281" r:id="rId28"/>
+    <p:sldId id="282" r:id="rId29"/>
+    <p:sldId id="283" r:id="rId30"/>
+    <p:sldId id="284" r:id="rId31"/>
+    <p:sldId id="285" r:id="rId32"/>
+    <p:sldId id="286" r:id="rId33"/>
+    <p:sldId id="287" r:id="rId34"/>
+    <p:sldId id="288" r:id="rId35"/>
+    <p:sldId id="289" r:id="rId36"/>
+    <p:sldId id="290" r:id="rId37"/>
+    <p:sldId id="291" r:id="rId38"/>
+    <p:sldId id="292" r:id="rId39"/>
+    <p:sldId id="293" r:id="rId40"/>
+    <p:sldId id="294" r:id="rId41"/>
   </p:sldIdLst>
   <p:sldSz cx="9144000" cy="5143500" type="screen16x9"/>
   <p:notesSz cx="6858000" cy="9144000"/>
@@ -232,7 +231,7 @@
           <a:p>
             <a:fld id="{36A1C95E-1CF8-4926-B750-D85B02FE5FAD}" type="datetimeFigureOut">
               <a:rPr lang="en-US" smtClean="0"/>
-              <a:t>4/9/2016</a:t>
+              <a:t>4/10/2016</a:t>
             </a:fld>
             <a:endParaRPr lang="en-US"/>
           </a:p>
@@ -1398,7 +1397,7 @@
           <a:p>
             <a:fld id="{DED1A555-0307-4A79-A556-98A44DB0B6FF}" type="datetime1">
               <a:rPr lang="en-US" smtClean="0"/>
-              <a:t>4/9/2016</a:t>
+              <a:t>4/10/2016</a:t>
             </a:fld>
             <a:endParaRPr lang="en-US"/>
           </a:p>
@@ -1563,7 +1562,7 @@
           <a:p>
             <a:fld id="{52D83D95-7A82-4F21-8A65-062EC056839B}" type="datetime1">
               <a:rPr lang="en-US" smtClean="0"/>
-              <a:t>4/9/2016</a:t>
+              <a:t>4/10/2016</a:t>
             </a:fld>
             <a:endParaRPr lang="en-US"/>
           </a:p>
@@ -1738,7 +1737,7 @@
           <a:p>
             <a:fld id="{BB0EDF4D-ED1D-4336-A8A7-6B82EB5D2413}" type="datetime1">
               <a:rPr lang="en-US" smtClean="0"/>
-              <a:t>4/9/2016</a:t>
+              <a:t>4/10/2016</a:t>
             </a:fld>
             <a:endParaRPr lang="en-US"/>
           </a:p>
@@ -1903,7 +1902,7 @@
           <a:p>
             <a:fld id="{71352417-BB1A-494E-A4DA-135265FCC881}" type="datetime1">
               <a:rPr lang="en-US" smtClean="0"/>
-              <a:t>4/9/2016</a:t>
+              <a:t>4/10/2016</a:t>
             </a:fld>
             <a:endParaRPr lang="en-US"/>
           </a:p>
@@ -2144,7 +2143,7 @@
           <a:p>
             <a:fld id="{6F117249-023D-4B77-8123-C8FFD9D02F0B}" type="datetime1">
               <a:rPr lang="en-US" smtClean="0"/>
-              <a:t>4/9/2016</a:t>
+              <a:t>4/10/2016</a:t>
             </a:fld>
             <a:endParaRPr lang="en-US"/>
           </a:p>
@@ -2427,7 +2426,7 @@
           <a:p>
             <a:fld id="{45642988-BB84-4807-9E77-175CE5CECDE0}" type="datetime1">
               <a:rPr lang="en-US" smtClean="0"/>
-              <a:t>4/9/2016</a:t>
+              <a:t>4/10/2016</a:t>
             </a:fld>
             <a:endParaRPr lang="en-US"/>
           </a:p>
@@ -2856,7 +2855,7 @@
           <a:p>
             <a:fld id="{6D96F54B-A69F-4859-ADA4-B2253D584FB6}" type="datetime1">
               <a:rPr lang="en-US" smtClean="0"/>
-              <a:t>4/9/2016</a:t>
+              <a:t>4/10/2016</a:t>
             </a:fld>
             <a:endParaRPr lang="en-US"/>
           </a:p>
@@ -2969,7 +2968,7 @@
           <a:p>
             <a:fld id="{B70C02B0-0B73-49BF-B56F-7F628100337A}" type="datetime1">
               <a:rPr lang="en-US" smtClean="0"/>
-              <a:t>4/9/2016</a:t>
+              <a:t>4/10/2016</a:t>
             </a:fld>
             <a:endParaRPr lang="en-US"/>
           </a:p>
@@ -3059,7 +3058,7 @@
           <a:p>
             <a:fld id="{61AC1934-F2BC-46DA-BF21-8FEDF0D97A28}" type="datetime1">
               <a:rPr lang="en-US" smtClean="0"/>
-              <a:t>4/9/2016</a:t>
+              <a:t>4/10/2016</a:t>
             </a:fld>
             <a:endParaRPr lang="en-US"/>
           </a:p>
@@ -3248,7 +3247,7 @@
           <a:p>
             <a:fld id="{059CEC1F-F11C-4127-80E5-4FA9DF92B5D8}" type="datetime1">
               <a:rPr lang="en-US" smtClean="0"/>
-              <a:t>4/9/2016</a:t>
+              <a:t>4/10/2016</a:t>
             </a:fld>
             <a:endParaRPr lang="en-US"/>
           </a:p>
@@ -3566,7 +3565,7 @@
           <a:p>
             <a:fld id="{265B60AB-6060-4DC1-97F7-58A23AAF3FD2}" type="datetime1">
               <a:rPr lang="en-US" smtClean="0"/>
-              <a:t>4/9/2016</a:t>
+              <a:t>4/10/2016</a:t>
             </a:fld>
             <a:endParaRPr lang="en-US"/>
           </a:p>
@@ -3945,7 +3944,7 @@
           <a:p>
             <a:fld id="{B236E3DE-3988-44CB-9697-C84D864E0643}" type="datetime1">
               <a:rPr lang="en-US" smtClean="0"/>
-              <a:t>4/9/2016</a:t>
+              <a:t>4/10/2016</a:t>
             </a:fld>
             <a:endParaRPr lang="en-US"/>
           </a:p>
@@ -4435,8 +4434,17 @@
           <a:p>
             <a:r>
               <a:rPr lang="en-US" dirty="0" smtClean="0"/>
-              <a:t>Correlates original signal with expected signals.</a:t>
-            </a:r>
+              <a:t>Correlates original signal with expected signals</a:t>
+            </a:r>
+            <a:r>
+              <a:rPr lang="en-US" dirty="0" smtClean="0"/>
+              <a:t>.</a:t>
+            </a:r>
+          </a:p>
+          <a:p>
+            <a:endParaRPr lang="en-US" dirty="0"/>
+          </a:p>
+          <a:p>
             <a:endParaRPr lang="en-US" dirty="0"/>
           </a:p>
         </p:txBody>
@@ -4464,6 +4472,60 @@
           </a:p>
         </p:txBody>
       </p:sp>
+      <p:pic>
+        <p:nvPicPr>
+          <p:cNvPr id="1026" name="Picture 2"/>
+          <p:cNvPicPr>
+            <a:picLocks noChangeAspect="1" noChangeArrowheads="1"/>
+          </p:cNvPicPr>
+          <p:nvPr/>
+        </p:nvPicPr>
+        <p:blipFill>
+          <a:blip r:embed="rId2">
+            <a:extLst>
+              <a:ext uri="{28A0092B-C50C-407E-A947-70E740481C1C}">
+                <a14:useLocalDpi xmlns:a14="http://schemas.microsoft.com/office/drawing/2010/main" val="0"/>
+              </a:ext>
+            </a:extLst>
+          </a:blip>
+          <a:srcRect/>
+          <a:stretch>
+            <a:fillRect/>
+          </a:stretch>
+        </p:blipFill>
+        <p:spPr bwMode="auto">
+          <a:xfrm>
+            <a:off x="1143000" y="2038350"/>
+            <a:ext cx="6143625" cy="2333625"/>
+          </a:xfrm>
+          <a:prstGeom prst="rect">
+            <a:avLst/>
+          </a:prstGeom>
+          <a:noFill/>
+          <a:ln>
+            <a:noFill/>
+          </a:ln>
+          <a:extLst>
+            <a:ext uri="{909E8E84-426E-40DD-AFC4-6F175D3DCCD1}">
+              <a14:hiddenFill xmlns:a14="http://schemas.microsoft.com/office/drawing/2010/main">
+                <a:solidFill>
+                  <a:schemeClr val="accent1"/>
+                </a:solidFill>
+              </a14:hiddenFill>
+            </a:ext>
+            <a:ext uri="{91240B29-F687-4F45-9708-019B960494DF}">
+              <a14:hiddenLine xmlns:a14="http://schemas.microsoft.com/office/drawing/2010/main" w="9525">
+                <a:solidFill>
+                  <a:schemeClr val="tx1"/>
+                </a:solidFill>
+                <a:miter lim="800000"/>
+                <a:headEnd/>
+                <a:tailEnd/>
+              </a14:hiddenLine>
+            </a:ext>
+          </a:extLst>
+        </p:spPr>
+      </p:pic>
     </p:spTree>
     <p:extLst>
       <p:ext uri="{BB962C8B-B14F-4D97-AF65-F5344CB8AC3E}">
@@ -4534,8 +4596,17 @@
           <a:p>
             <a:r>
               <a:rPr lang="en-US" dirty="0" smtClean="0"/>
-              <a:t>Filters look at signal strength of individual frequencies</a:t>
-            </a:r>
+              <a:t>Filters look at signal strength of individual </a:t>
+            </a:r>
+            <a:r>
+              <a:rPr lang="en-US" dirty="0" smtClean="0"/>
+              <a:t>frequencies.</a:t>
+            </a:r>
+          </a:p>
+          <a:p>
+            <a:endParaRPr lang="en-US" dirty="0"/>
+          </a:p>
+          <a:p>
             <a:endParaRPr lang="en-US" dirty="0"/>
           </a:p>
         </p:txBody>
@@ -4563,6 +4634,60 @@
           </a:p>
         </p:txBody>
       </p:sp>
+      <p:pic>
+        <p:nvPicPr>
+          <p:cNvPr id="2050" name="Picture 2"/>
+          <p:cNvPicPr>
+            <a:picLocks noChangeAspect="1" noChangeArrowheads="1"/>
+          </p:cNvPicPr>
+          <p:nvPr/>
+        </p:nvPicPr>
+        <p:blipFill>
+          <a:blip r:embed="rId2">
+            <a:extLst>
+              <a:ext uri="{28A0092B-C50C-407E-A947-70E740481C1C}">
+                <a14:useLocalDpi xmlns:a14="http://schemas.microsoft.com/office/drawing/2010/main" val="0"/>
+              </a:ext>
+            </a:extLst>
+          </a:blip>
+          <a:srcRect/>
+          <a:stretch>
+            <a:fillRect/>
+          </a:stretch>
+        </p:blipFill>
+        <p:spPr bwMode="auto">
+          <a:xfrm>
+            <a:off x="1581150" y="2571750"/>
+            <a:ext cx="5981700" cy="1800225"/>
+          </a:xfrm>
+          <a:prstGeom prst="rect">
+            <a:avLst/>
+          </a:prstGeom>
+          <a:noFill/>
+          <a:ln>
+            <a:noFill/>
+          </a:ln>
+          <a:extLst>
+            <a:ext uri="{909E8E84-426E-40DD-AFC4-6F175D3DCCD1}">
+              <a14:hiddenFill xmlns:a14="http://schemas.microsoft.com/office/drawing/2010/main">
+                <a:solidFill>
+                  <a:schemeClr val="accent1"/>
+                </a:solidFill>
+              </a14:hiddenFill>
+            </a:ext>
+            <a:ext uri="{91240B29-F687-4F45-9708-019B960494DF}">
+              <a14:hiddenLine xmlns:a14="http://schemas.microsoft.com/office/drawing/2010/main" w="9525">
+                <a:solidFill>
+                  <a:schemeClr val="tx1"/>
+                </a:solidFill>
+                <a:miter lim="800000"/>
+                <a:headEnd/>
+                <a:tailEnd/>
+              </a14:hiddenLine>
+            </a:ext>
+          </a:extLst>
+        </p:spPr>
+      </p:pic>
     </p:spTree>
     <p:extLst>
       <p:ext uri="{BB962C8B-B14F-4D97-AF65-F5344CB8AC3E}">
@@ -4632,10 +4757,21 @@
           <a:lstStyle/>
           <a:p>
             <a:r>
-              <a:rPr lang="en-US" smtClean="0"/>
-              <a:t> </a:t>
-            </a:r>
-            <a:endParaRPr lang="en-US"/>
+              <a:rPr lang="en-US" dirty="0" smtClean="0"/>
+              <a:t>Phase lock is acquired on the original signal.</a:t>
+            </a:r>
+          </a:p>
+          <a:p>
+            <a:r>
+              <a:rPr lang="en-US" dirty="0" smtClean="0"/>
+              <a:t>As long as the VCO is locked the signal is known.</a:t>
+            </a:r>
+          </a:p>
+          <a:p>
+            <a:endParaRPr lang="en-US" dirty="0"/>
+          </a:p>
+          <a:p>
+            <a:endParaRPr lang="en-US" dirty="0"/>
           </a:p>
         </p:txBody>
       </p:sp>
@@ -4662,6 +4798,60 @@
           </a:p>
         </p:txBody>
       </p:sp>
+      <p:pic>
+        <p:nvPicPr>
+          <p:cNvPr id="3074" name="Picture 2"/>
+          <p:cNvPicPr>
+            <a:picLocks noChangeAspect="1" noChangeArrowheads="1"/>
+          </p:cNvPicPr>
+          <p:nvPr/>
+        </p:nvPicPr>
+        <p:blipFill>
+          <a:blip r:embed="rId2">
+            <a:extLst>
+              <a:ext uri="{28A0092B-C50C-407E-A947-70E740481C1C}">
+                <a14:useLocalDpi xmlns:a14="http://schemas.microsoft.com/office/drawing/2010/main" val="0"/>
+              </a:ext>
+            </a:extLst>
+          </a:blip>
+          <a:srcRect/>
+          <a:stretch>
+            <a:fillRect/>
+          </a:stretch>
+        </p:blipFill>
+        <p:spPr bwMode="auto">
+          <a:xfrm>
+            <a:off x="381000" y="3067050"/>
+            <a:ext cx="7877175" cy="1562100"/>
+          </a:xfrm>
+          <a:prstGeom prst="rect">
+            <a:avLst/>
+          </a:prstGeom>
+          <a:noFill/>
+          <a:ln>
+            <a:noFill/>
+          </a:ln>
+          <a:extLst>
+            <a:ext uri="{909E8E84-426E-40DD-AFC4-6F175D3DCCD1}">
+              <a14:hiddenFill xmlns:a14="http://schemas.microsoft.com/office/drawing/2010/main">
+                <a:solidFill>
+                  <a:schemeClr val="accent1"/>
+                </a:solidFill>
+              </a14:hiddenFill>
+            </a:ext>
+            <a:ext uri="{91240B29-F687-4F45-9708-019B960494DF}">
+              <a14:hiddenLine xmlns:a14="http://schemas.microsoft.com/office/drawing/2010/main" w="9525">
+                <a:solidFill>
+                  <a:schemeClr val="tx1"/>
+                </a:solidFill>
+                <a:miter lim="800000"/>
+                <a:headEnd/>
+                <a:tailEnd/>
+              </a14:hiddenLine>
+            </a:ext>
+          </a:extLst>
+        </p:spPr>
+      </p:pic>
     </p:spTree>
     <p:extLst>
       <p:ext uri="{BB962C8B-B14F-4D97-AF65-F5344CB8AC3E}">
@@ -4744,6 +4934,12 @@
           <a:p>
             <a:r>
               <a:rPr lang="en-US" dirty="0" smtClean="0"/>
+              <a:t>Radio Integrated</a:t>
+            </a:r>
+          </a:p>
+          <a:p>
+            <a:r>
+              <a:rPr lang="en-US" dirty="0" smtClean="0"/>
               <a:t>Software</a:t>
             </a:r>
             <a:endParaRPr lang="en-US" dirty="0"/>
@@ -4820,28 +5016,12 @@
           <a:p>
             <a:r>
               <a:rPr lang="en-US" dirty="0" smtClean="0"/>
-              <a:t>TNC Example: PK-232</a:t>
-            </a:r>
-            <a:endParaRPr lang="en-US" dirty="0"/>
-          </a:p>
-        </p:txBody>
-      </p:sp>
-      <p:sp>
-        <p:nvSpPr>
-          <p:cNvPr id="3" name="Content Placeholder 2"/>
-          <p:cNvSpPr>
-            <a:spLocks noGrp="1"/>
-          </p:cNvSpPr>
-          <p:nvPr>
-            <p:ph idx="1"/>
-          </p:nvPr>
-        </p:nvSpPr>
-        <p:spPr/>
-        <p:txBody>
-          <a:bodyPr/>
-          <a:lstStyle/>
-          <a:p>
-            <a:endParaRPr lang="en-US"/>
+              <a:t>TNC Example</a:t>
+            </a:r>
+            <a:r>
+              <a:rPr lang="en-US" dirty="0"/>
+              <a:t>s</a:t>
+            </a:r>
           </a:p>
         </p:txBody>
       </p:sp>
@@ -4868,6 +5048,49 @@
           </a:p>
         </p:txBody>
       </p:sp>
+      <p:pic>
+        <p:nvPicPr>
+          <p:cNvPr id="1026" name="Picture 2" descr="D:\Robert Campbell\Documents\GitHub\rrxthesis\images\Kantronics-KAM-Plus.jpg"/>
+          <p:cNvPicPr>
+            <a:picLocks noGrp="1" noChangeAspect="1" noChangeArrowheads="1"/>
+          </p:cNvPicPr>
+          <p:nvPr>
+            <p:ph idx="1"/>
+          </p:nvPr>
+        </p:nvPicPr>
+        <p:blipFill>
+          <a:blip r:embed="rId2">
+            <a:extLst>
+              <a:ext uri="{28A0092B-C50C-407E-A947-70E740481C1C}">
+                <a14:useLocalDpi xmlns:a14="http://schemas.microsoft.com/office/drawing/2010/main" val="0"/>
+              </a:ext>
+            </a:extLst>
+          </a:blip>
+          <a:srcRect/>
+          <a:stretch>
+            <a:fillRect/>
+          </a:stretch>
+        </p:blipFill>
+        <p:spPr bwMode="auto">
+          <a:xfrm>
+            <a:off x="2667000" y="1162050"/>
+            <a:ext cx="3771900" cy="3771900"/>
+          </a:xfrm>
+          <a:prstGeom prst="rect">
+            <a:avLst/>
+          </a:prstGeom>
+          <a:noFill/>
+          <a:extLst>
+            <a:ext uri="{909E8E84-426E-40DD-AFC4-6F175D3DCCD1}">
+              <a14:hiddenFill xmlns:a14="http://schemas.microsoft.com/office/drawing/2010/main">
+                <a:solidFill>
+                  <a:srgbClr val="FFFFFF"/>
+                </a:solidFill>
+              </a14:hiddenFill>
+            </a:ext>
+          </a:extLst>
+        </p:spPr>
+      </p:pic>
     </p:spTree>
     <p:extLst>
       <p:ext uri="{BB962C8B-B14F-4D97-AF65-F5344CB8AC3E}">
@@ -4915,28 +5138,9 @@
           <a:p>
             <a:r>
               <a:rPr lang="en-US" dirty="0" smtClean="0"/>
-              <a:t>TNC Example: MFJ-1278</a:t>
+              <a:t>Argent Data Open Trackers</a:t>
             </a:r>
             <a:endParaRPr lang="en-US" dirty="0"/>
-          </a:p>
-        </p:txBody>
-      </p:sp>
-      <p:sp>
-        <p:nvSpPr>
-          <p:cNvPr id="3" name="Content Placeholder 2"/>
-          <p:cNvSpPr>
-            <a:spLocks noGrp="1"/>
-          </p:cNvSpPr>
-          <p:nvPr>
-            <p:ph idx="1"/>
-          </p:nvPr>
-        </p:nvSpPr>
-        <p:spPr/>
-        <p:txBody>
-          <a:bodyPr/>
-          <a:lstStyle/>
-          <a:p>
-            <a:endParaRPr lang="en-US"/>
           </a:p>
         </p:txBody>
       </p:sp>
@@ -4963,10 +5167,53 @@
           </a:p>
         </p:txBody>
       </p:sp>
+      <p:pic>
+        <p:nvPicPr>
+          <p:cNvPr id="3074" name="Picture 2" descr="D:\Robert Campbell\Documents\GitHub\rrxthesis\images\Ot3m-termblk.jpg"/>
+          <p:cNvPicPr>
+            <a:picLocks noGrp="1" noChangeAspect="1" noChangeArrowheads="1"/>
+          </p:cNvPicPr>
+          <p:nvPr>
+            <p:ph idx="1"/>
+          </p:nvPr>
+        </p:nvPicPr>
+        <p:blipFill>
+          <a:blip r:embed="rId2">
+            <a:extLst>
+              <a:ext uri="{28A0092B-C50C-407E-A947-70E740481C1C}">
+                <a14:useLocalDpi xmlns:a14="http://schemas.microsoft.com/office/drawing/2010/main" val="0"/>
+              </a:ext>
+            </a:extLst>
+          </a:blip>
+          <a:srcRect/>
+          <a:stretch>
+            <a:fillRect/>
+          </a:stretch>
+        </p:blipFill>
+        <p:spPr bwMode="auto">
+          <a:xfrm>
+            <a:off x="2197100" y="1468755"/>
+            <a:ext cx="4140200" cy="3063240"/>
+          </a:xfrm>
+          <a:prstGeom prst="rect">
+            <a:avLst/>
+          </a:prstGeom>
+          <a:noFill/>
+          <a:extLst>
+            <a:ext uri="{909E8E84-426E-40DD-AFC4-6F175D3DCCD1}">
+              <a14:hiddenFill xmlns:a14="http://schemas.microsoft.com/office/drawing/2010/main">
+                <a:solidFill>
+                  <a:srgbClr val="FFFFFF"/>
+                </a:solidFill>
+              </a14:hiddenFill>
+            </a:ext>
+          </a:extLst>
+        </p:spPr>
+      </p:pic>
     </p:spTree>
     <p:extLst>
       <p:ext uri="{BB962C8B-B14F-4D97-AF65-F5344CB8AC3E}">
-        <p14:creationId xmlns:p14="http://schemas.microsoft.com/office/powerpoint/2010/main" val="1292577241"/>
+        <p14:creationId xmlns:p14="http://schemas.microsoft.com/office/powerpoint/2010/main" val="1457167290"/>
       </p:ext>
     </p:extLst>
   </p:cSld>
@@ -5010,36 +5257,9 @@
           <a:p>
             <a:r>
               <a:rPr lang="en-US" dirty="0" smtClean="0"/>
-              <a:t>TNC Example: </a:t>
-            </a:r>
-            <a:r>
-              <a:rPr lang="en-US" dirty="0" err="1" smtClean="0"/>
-              <a:t>Kantronics</a:t>
-            </a:r>
-            <a:r>
-              <a:rPr lang="en-US" dirty="0" smtClean="0"/>
-              <a:t> KAM</a:t>
+              <a:t>Radio Integrated APRS</a:t>
             </a:r>
             <a:endParaRPr lang="en-US" dirty="0"/>
-          </a:p>
-        </p:txBody>
-      </p:sp>
-      <p:sp>
-        <p:nvSpPr>
-          <p:cNvPr id="3" name="Content Placeholder 2"/>
-          <p:cNvSpPr>
-            <a:spLocks noGrp="1"/>
-          </p:cNvSpPr>
-          <p:nvPr>
-            <p:ph idx="1"/>
-          </p:nvPr>
-        </p:nvSpPr>
-        <p:spPr/>
-        <p:txBody>
-          <a:bodyPr/>
-          <a:lstStyle/>
-          <a:p>
-            <a:endParaRPr lang="en-US"/>
           </a:p>
         </p:txBody>
       </p:sp>
@@ -5066,10 +5286,53 @@
           </a:p>
         </p:txBody>
       </p:sp>
+      <p:pic>
+        <p:nvPicPr>
+          <p:cNvPr id="4098" name="Picture 2" descr="D:\Robert Campbell\Documents\GitHub\rrxthesis\images\FTM-350US_F.jpg"/>
+          <p:cNvPicPr>
+            <a:picLocks noGrp="1" noChangeAspect="1" noChangeArrowheads="1"/>
+          </p:cNvPicPr>
+          <p:nvPr>
+            <p:ph idx="1"/>
+          </p:nvPr>
+        </p:nvPicPr>
+        <p:blipFill>
+          <a:blip r:embed="rId2" cstate="print">
+            <a:extLst>
+              <a:ext uri="{28A0092B-C50C-407E-A947-70E740481C1C}">
+                <a14:useLocalDpi xmlns:a14="http://schemas.microsoft.com/office/drawing/2010/main" val="0"/>
+              </a:ext>
+            </a:extLst>
+          </a:blip>
+          <a:srcRect/>
+          <a:stretch>
+            <a:fillRect/>
+          </a:stretch>
+        </p:blipFill>
+        <p:spPr bwMode="auto">
+          <a:xfrm>
+            <a:off x="2016919" y="1200150"/>
+            <a:ext cx="4500562" cy="3600450"/>
+          </a:xfrm>
+          <a:prstGeom prst="rect">
+            <a:avLst/>
+          </a:prstGeom>
+          <a:noFill/>
+          <a:extLst>
+            <a:ext uri="{909E8E84-426E-40DD-AFC4-6F175D3DCCD1}">
+              <a14:hiddenFill xmlns:a14="http://schemas.microsoft.com/office/drawing/2010/main">
+                <a:solidFill>
+                  <a:srgbClr val="FFFFFF"/>
+                </a:solidFill>
+              </a14:hiddenFill>
+            </a:ext>
+          </a:extLst>
+        </p:spPr>
+      </p:pic>
     </p:spTree>
     <p:extLst>
       <p:ext uri="{BB962C8B-B14F-4D97-AF65-F5344CB8AC3E}">
-        <p14:creationId xmlns:p14="http://schemas.microsoft.com/office/powerpoint/2010/main" val="1895688388"/>
+        <p14:creationId xmlns:p14="http://schemas.microsoft.com/office/powerpoint/2010/main" val="2863511908"/>
       </p:ext>
     </p:extLst>
   </p:cSld>
@@ -5113,32 +5376,9 @@
           <a:p>
             <a:r>
               <a:rPr lang="en-US" dirty="0" smtClean="0"/>
-              <a:t>APRS </a:t>
-            </a:r>
-            <a:r>
-              <a:rPr lang="en-US" smtClean="0"/>
-              <a:t>Open Trackers</a:t>
+              <a:t>AGWPE</a:t>
             </a:r>
             <a:endParaRPr lang="en-US" dirty="0"/>
-          </a:p>
-        </p:txBody>
-      </p:sp>
-      <p:sp>
-        <p:nvSpPr>
-          <p:cNvPr id="3" name="Content Placeholder 2"/>
-          <p:cNvSpPr>
-            <a:spLocks noGrp="1"/>
-          </p:cNvSpPr>
-          <p:nvPr>
-            <p:ph idx="1"/>
-          </p:nvPr>
-        </p:nvSpPr>
-        <p:spPr/>
-        <p:txBody>
-          <a:bodyPr/>
-          <a:lstStyle/>
-          <a:p>
-            <a:endParaRPr lang="en-US"/>
           </a:p>
         </p:txBody>
       </p:sp>
@@ -5165,10 +5405,66 @@
           </a:p>
         </p:txBody>
       </p:sp>
+      <p:pic>
+        <p:nvPicPr>
+          <p:cNvPr id="5" name="Picture 2"/>
+          <p:cNvPicPr>
+            <a:picLocks noGrp="1" noChangeAspect="1" noChangeArrowheads="1"/>
+          </p:cNvPicPr>
+          <p:nvPr>
+            <p:ph idx="1"/>
+          </p:nvPr>
+        </p:nvPicPr>
+        <p:blipFill>
+          <a:blip r:embed="rId2">
+            <a:extLst>
+              <a:ext uri="{28A0092B-C50C-407E-A947-70E740481C1C}">
+                <a14:useLocalDpi xmlns:a14="http://schemas.microsoft.com/office/drawing/2010/main" val="0"/>
+              </a:ext>
+            </a:extLst>
+          </a:blip>
+          <a:srcRect/>
+          <a:stretch>
+            <a:fillRect/>
+          </a:stretch>
+        </p:blipFill>
+        <p:spPr bwMode="auto">
+          <a:xfrm>
+            <a:off x="1185038" y="1200150"/>
+            <a:ext cx="6164323" cy="3600450"/>
+          </a:xfrm>
+          <a:prstGeom prst="rect">
+            <a:avLst/>
+          </a:prstGeom>
+          <a:noFill/>
+          <a:ln>
+            <a:noFill/>
+          </a:ln>
+          <a:extLst>
+            <a:ext uri="{909E8E84-426E-40DD-AFC4-6F175D3DCCD1}">
+              <a14:hiddenFill xmlns:a14="http://schemas.microsoft.com/office/drawing/2010/main">
+                <a:solidFill>
+                  <a:schemeClr val="accent1"/>
+                </a:solidFill>
+              </a14:hiddenFill>
+            </a:ext>
+            <a:ext uri="{91240B29-F687-4F45-9708-019B960494DF}">
+              <a14:hiddenLine xmlns:a14="http://schemas.microsoft.com/office/drawing/2010/main" w="9525">
+                <a:solidFill>
+                  <a:schemeClr val="tx1"/>
+                </a:solidFill>
+                <a:miter lim="800000"/>
+                <a:headEnd/>
+                <a:tailEnd/>
+              </a14:hiddenLine>
+            </a:ext>
+          </a:extLst>
+        </p:spPr>
+      </p:pic>
     </p:spTree>
     <p:extLst>
       <p:ext uri="{BB962C8B-B14F-4D97-AF65-F5344CB8AC3E}">
-        <p14:creationId xmlns:p14="http://schemas.microsoft.com/office/powerpoint/2010/main" val="1457167290"/>
+        <p14:creationId xmlns:p14="http://schemas.microsoft.com/office/powerpoint/2010/main" val="913351117"/>
       </p:ext>
     </p:extLst>
   </p:cSld>
@@ -5212,28 +5508,13 @@
           <a:p>
             <a:r>
               <a:rPr lang="en-US" dirty="0" smtClean="0"/>
-              <a:t>AGWPE</a:t>
+              <a:t>javAX25 in </a:t>
+            </a:r>
+            <a:r>
+              <a:rPr lang="en-US" dirty="0" err="1" smtClean="0"/>
+              <a:t>APRSdroid</a:t>
             </a:r>
             <a:endParaRPr lang="en-US" dirty="0"/>
-          </a:p>
-        </p:txBody>
-      </p:sp>
-      <p:sp>
-        <p:nvSpPr>
-          <p:cNvPr id="3" name="Content Placeholder 2"/>
-          <p:cNvSpPr>
-            <a:spLocks noGrp="1"/>
-          </p:cNvSpPr>
-          <p:nvPr>
-            <p:ph idx="1"/>
-          </p:nvPr>
-        </p:nvSpPr>
-        <p:spPr/>
-        <p:txBody>
-          <a:bodyPr/>
-          <a:lstStyle/>
-          <a:p>
-            <a:endParaRPr lang="en-US"/>
           </a:p>
         </p:txBody>
       </p:sp>
@@ -5260,10 +5541,53 @@
           </a:p>
         </p:txBody>
       </p:sp>
+      <p:pic>
+        <p:nvPicPr>
+          <p:cNvPr id="5122" name="Picture 2" descr="D:\Robert Campbell\Documents\GitHub\rrxthesis\images\APRSDroidScreenShot.png"/>
+          <p:cNvPicPr>
+            <a:picLocks noGrp="1" noChangeAspect="1" noChangeArrowheads="1"/>
+          </p:cNvPicPr>
+          <p:nvPr>
+            <p:ph idx="1"/>
+          </p:nvPr>
+        </p:nvPicPr>
+        <p:blipFill>
+          <a:blip r:embed="rId2" cstate="print">
+            <a:extLst>
+              <a:ext uri="{28A0092B-C50C-407E-A947-70E740481C1C}">
+                <a14:useLocalDpi xmlns:a14="http://schemas.microsoft.com/office/drawing/2010/main" val="0"/>
+              </a:ext>
+            </a:extLst>
+          </a:blip>
+          <a:srcRect/>
+          <a:stretch>
+            <a:fillRect/>
+          </a:stretch>
+        </p:blipFill>
+        <p:spPr bwMode="auto">
+          <a:xfrm>
+            <a:off x="3254573" y="1200150"/>
+            <a:ext cx="2025253" cy="3600450"/>
+          </a:xfrm>
+          <a:prstGeom prst="rect">
+            <a:avLst/>
+          </a:prstGeom>
+          <a:noFill/>
+          <a:extLst>
+            <a:ext uri="{909E8E84-426E-40DD-AFC4-6F175D3DCCD1}">
+              <a14:hiddenFill xmlns:a14="http://schemas.microsoft.com/office/drawing/2010/main">
+                <a:solidFill>
+                  <a:srgbClr val="FFFFFF"/>
+                </a:solidFill>
+              </a14:hiddenFill>
+            </a:ext>
+          </a:extLst>
+        </p:spPr>
+      </p:pic>
     </p:spTree>
     <p:extLst>
       <p:ext uri="{BB962C8B-B14F-4D97-AF65-F5344CB8AC3E}">
-        <p14:creationId xmlns:p14="http://schemas.microsoft.com/office/powerpoint/2010/main" val="913351117"/>
+        <p14:creationId xmlns:p14="http://schemas.microsoft.com/office/powerpoint/2010/main" val="1035780179"/>
       </p:ext>
     </p:extLst>
   </p:cSld>
@@ -5307,7 +5631,7 @@
           <a:p>
             <a:r>
               <a:rPr lang="en-US" dirty="0" smtClean="0"/>
-              <a:t>javAX25</a:t>
+              <a:t>Challenges</a:t>
             </a:r>
             <a:endParaRPr lang="en-US" dirty="0"/>
           </a:p>
@@ -5328,7 +5652,23 @@
           <a:bodyPr/>
           <a:lstStyle/>
           <a:p>
-            <a:endParaRPr lang="en-US"/>
+            <a:r>
+              <a:rPr lang="en-US" dirty="0" smtClean="0"/>
+              <a:t>DC Offset</a:t>
+            </a:r>
+          </a:p>
+          <a:p>
+            <a:r>
+              <a:rPr lang="en-US" dirty="0" smtClean="0"/>
+              <a:t>Noise</a:t>
+            </a:r>
+          </a:p>
+          <a:p>
+            <a:r>
+              <a:rPr lang="en-US" dirty="0" smtClean="0"/>
+              <a:t>Emphasis</a:t>
+            </a:r>
+            <a:endParaRPr lang="en-US" dirty="0"/>
           </a:p>
         </p:txBody>
       </p:sp>
@@ -5358,7 +5698,7 @@
     </p:spTree>
     <p:extLst>
       <p:ext uri="{BB962C8B-B14F-4D97-AF65-F5344CB8AC3E}">
-        <p14:creationId xmlns:p14="http://schemas.microsoft.com/office/powerpoint/2010/main" val="1035780179"/>
+        <p14:creationId xmlns:p14="http://schemas.microsoft.com/office/powerpoint/2010/main" val="2519101358"/>
       </p:ext>
     </p:extLst>
   </p:cSld>
@@ -5437,15 +5777,7 @@
           <a:p>
             <a:r>
               <a:rPr lang="en-US" dirty="0" smtClean="0"/>
-              <a:t>Encoded </a:t>
-            </a:r>
-            <a:r>
-              <a:rPr lang="en-US" dirty="0" smtClean="0"/>
-              <a:t>into the </a:t>
-            </a:r>
-            <a:r>
-              <a:rPr lang="en-US" dirty="0" smtClean="0"/>
-              <a:t>Radio Using Bell 202</a:t>
+              <a:t>Encoded into the Radio Using Bell 202</a:t>
             </a:r>
             <a:endParaRPr lang="en-US" dirty="0"/>
           </a:p>
@@ -5521,42 +5853,7 @@
           <a:p>
             <a:r>
               <a:rPr lang="en-US" dirty="0" smtClean="0"/>
-              <a:t>Challenges</a:t>
-            </a:r>
-            <a:endParaRPr lang="en-US" dirty="0"/>
-          </a:p>
-        </p:txBody>
-      </p:sp>
-      <p:sp>
-        <p:nvSpPr>
-          <p:cNvPr id="3" name="Content Placeholder 2"/>
-          <p:cNvSpPr>
-            <a:spLocks noGrp="1"/>
-          </p:cNvSpPr>
-          <p:nvPr>
-            <p:ph idx="1"/>
-          </p:nvPr>
-        </p:nvSpPr>
-        <p:spPr/>
-        <p:txBody>
-          <a:bodyPr/>
-          <a:lstStyle/>
-          <a:p>
-            <a:r>
-              <a:rPr lang="en-US" dirty="0" smtClean="0"/>
               <a:t>DC Offset</a:t>
-            </a:r>
-          </a:p>
-          <a:p>
-            <a:r>
-              <a:rPr lang="en-US" dirty="0" smtClean="0"/>
-              <a:t>Noise</a:t>
-            </a:r>
-          </a:p>
-          <a:p>
-            <a:r>
-              <a:rPr lang="en-US" dirty="0" smtClean="0"/>
-              <a:t>Emphasis</a:t>
             </a:r>
             <a:endParaRPr lang="en-US" dirty="0"/>
           </a:p>
@@ -5585,10 +5882,53 @@
           </a:p>
         </p:txBody>
       </p:sp>
+      <p:pic>
+        <p:nvPicPr>
+          <p:cNvPr id="6146" name="Picture 2" descr="D:\Robert Campbell\Documents\GitHub\rrxthesis\images\EffectsofaDCOffsetonaSignal.png"/>
+          <p:cNvPicPr>
+            <a:picLocks noGrp="1" noChangeAspect="1" noChangeArrowheads="1"/>
+          </p:cNvPicPr>
+          <p:nvPr>
+            <p:ph idx="1"/>
+          </p:nvPr>
+        </p:nvPicPr>
+        <p:blipFill>
+          <a:blip r:embed="rId2" cstate="print">
+            <a:extLst>
+              <a:ext uri="{28A0092B-C50C-407E-A947-70E740481C1C}">
+                <a14:useLocalDpi xmlns:a14="http://schemas.microsoft.com/office/drawing/2010/main" val="0"/>
+              </a:ext>
+            </a:extLst>
+          </a:blip>
+          <a:srcRect/>
+          <a:stretch>
+            <a:fillRect/>
+          </a:stretch>
+        </p:blipFill>
+        <p:spPr bwMode="auto">
+          <a:xfrm>
+            <a:off x="1866900" y="1200150"/>
+            <a:ext cx="4800600" cy="3600450"/>
+          </a:xfrm>
+          <a:prstGeom prst="rect">
+            <a:avLst/>
+          </a:prstGeom>
+          <a:noFill/>
+          <a:extLst>
+            <a:ext uri="{909E8E84-426E-40DD-AFC4-6F175D3DCCD1}">
+              <a14:hiddenFill xmlns:a14="http://schemas.microsoft.com/office/drawing/2010/main">
+                <a:solidFill>
+                  <a:srgbClr val="FFFFFF"/>
+                </a:solidFill>
+              </a14:hiddenFill>
+            </a:ext>
+          </a:extLst>
+        </p:spPr>
+      </p:pic>
     </p:spTree>
     <p:extLst>
       <p:ext uri="{BB962C8B-B14F-4D97-AF65-F5344CB8AC3E}">
-        <p14:creationId xmlns:p14="http://schemas.microsoft.com/office/powerpoint/2010/main" val="2519101358"/>
+        <p14:creationId xmlns:p14="http://schemas.microsoft.com/office/powerpoint/2010/main" val="441966729"/>
       </p:ext>
     </p:extLst>
   </p:cSld>
@@ -5632,28 +5972,9 @@
           <a:p>
             <a:r>
               <a:rPr lang="en-US" dirty="0" smtClean="0"/>
-              <a:t>DC Offset</a:t>
+              <a:t>Noise</a:t>
             </a:r>
             <a:endParaRPr lang="en-US" dirty="0"/>
-          </a:p>
-        </p:txBody>
-      </p:sp>
-      <p:sp>
-        <p:nvSpPr>
-          <p:cNvPr id="3" name="Content Placeholder 2"/>
-          <p:cNvSpPr>
-            <a:spLocks noGrp="1"/>
-          </p:cNvSpPr>
-          <p:nvPr>
-            <p:ph idx="1"/>
-          </p:nvPr>
-        </p:nvSpPr>
-        <p:spPr/>
-        <p:txBody>
-          <a:bodyPr/>
-          <a:lstStyle/>
-          <a:p>
-            <a:endParaRPr lang="en-US"/>
           </a:p>
         </p:txBody>
       </p:sp>
@@ -5680,10 +6001,53 @@
           </a:p>
         </p:txBody>
       </p:sp>
+      <p:pic>
+        <p:nvPicPr>
+          <p:cNvPr id="7170" name="Picture 2" descr="D:\Robert Campbell\Documents\GitHub\rrxthesis\images\EffectsofAddingNoisetoaSignal.png"/>
+          <p:cNvPicPr>
+            <a:picLocks noGrp="1" noChangeAspect="1" noChangeArrowheads="1"/>
+          </p:cNvPicPr>
+          <p:nvPr>
+            <p:ph idx="1"/>
+          </p:nvPr>
+        </p:nvPicPr>
+        <p:blipFill>
+          <a:blip r:embed="rId2" cstate="print">
+            <a:extLst>
+              <a:ext uri="{28A0092B-C50C-407E-A947-70E740481C1C}">
+                <a14:useLocalDpi xmlns:a14="http://schemas.microsoft.com/office/drawing/2010/main" val="0"/>
+              </a:ext>
+            </a:extLst>
+          </a:blip>
+          <a:srcRect/>
+          <a:stretch>
+            <a:fillRect/>
+          </a:stretch>
+        </p:blipFill>
+        <p:spPr bwMode="auto">
+          <a:xfrm>
+            <a:off x="1866900" y="1200150"/>
+            <a:ext cx="4800600" cy="3600450"/>
+          </a:xfrm>
+          <a:prstGeom prst="rect">
+            <a:avLst/>
+          </a:prstGeom>
+          <a:noFill/>
+          <a:extLst>
+            <a:ext uri="{909E8E84-426E-40DD-AFC4-6F175D3DCCD1}">
+              <a14:hiddenFill xmlns:a14="http://schemas.microsoft.com/office/drawing/2010/main">
+                <a:solidFill>
+                  <a:srgbClr val="FFFFFF"/>
+                </a:solidFill>
+              </a14:hiddenFill>
+            </a:ext>
+          </a:extLst>
+        </p:spPr>
+      </p:pic>
     </p:spTree>
     <p:extLst>
       <p:ext uri="{BB962C8B-B14F-4D97-AF65-F5344CB8AC3E}">
-        <p14:creationId xmlns:p14="http://schemas.microsoft.com/office/powerpoint/2010/main" val="441966729"/>
+        <p14:creationId xmlns:p14="http://schemas.microsoft.com/office/powerpoint/2010/main" val="1283167432"/>
       </p:ext>
     </p:extLst>
   </p:cSld>
@@ -5727,28 +6091,9 @@
           <a:p>
             <a:r>
               <a:rPr lang="en-US" dirty="0" smtClean="0"/>
-              <a:t>Noise</a:t>
+              <a:t>Emphasis</a:t>
             </a:r>
             <a:endParaRPr lang="en-US" dirty="0"/>
-          </a:p>
-        </p:txBody>
-      </p:sp>
-      <p:sp>
-        <p:nvSpPr>
-          <p:cNvPr id="3" name="Content Placeholder 2"/>
-          <p:cNvSpPr>
-            <a:spLocks noGrp="1"/>
-          </p:cNvSpPr>
-          <p:nvPr>
-            <p:ph idx="1"/>
-          </p:nvPr>
-        </p:nvSpPr>
-        <p:spPr/>
-        <p:txBody>
-          <a:bodyPr/>
-          <a:lstStyle/>
-          <a:p>
-            <a:endParaRPr lang="en-US"/>
           </a:p>
         </p:txBody>
       </p:sp>
@@ -5775,10 +6120,53 @@
           </a:p>
         </p:txBody>
       </p:sp>
+      <p:pic>
+        <p:nvPicPr>
+          <p:cNvPr id="8194" name="Picture 2" descr="D:\Robert Campbell\Documents\GitHub\rrxthesis\images\DeemphasizedSignalthatwasnotPreemphasized.png"/>
+          <p:cNvPicPr>
+            <a:picLocks noGrp="1" noChangeAspect="1" noChangeArrowheads="1"/>
+          </p:cNvPicPr>
+          <p:nvPr>
+            <p:ph idx="1"/>
+          </p:nvPr>
+        </p:nvPicPr>
+        <p:blipFill>
+          <a:blip r:embed="rId2" cstate="print">
+            <a:extLst>
+              <a:ext uri="{28A0092B-C50C-407E-A947-70E740481C1C}">
+                <a14:useLocalDpi xmlns:a14="http://schemas.microsoft.com/office/drawing/2010/main" val="0"/>
+              </a:ext>
+            </a:extLst>
+          </a:blip>
+          <a:srcRect/>
+          <a:stretch>
+            <a:fillRect/>
+          </a:stretch>
+        </p:blipFill>
+        <p:spPr bwMode="auto">
+          <a:xfrm>
+            <a:off x="1866900" y="1200150"/>
+            <a:ext cx="4800600" cy="3600450"/>
+          </a:xfrm>
+          <a:prstGeom prst="rect">
+            <a:avLst/>
+          </a:prstGeom>
+          <a:noFill/>
+          <a:extLst>
+            <a:ext uri="{909E8E84-426E-40DD-AFC4-6F175D3DCCD1}">
+              <a14:hiddenFill xmlns:a14="http://schemas.microsoft.com/office/drawing/2010/main">
+                <a:solidFill>
+                  <a:srgbClr val="FFFFFF"/>
+                </a:solidFill>
+              </a14:hiddenFill>
+            </a:ext>
+          </a:extLst>
+        </p:spPr>
+      </p:pic>
     </p:spTree>
     <p:extLst>
       <p:ext uri="{BB962C8B-B14F-4D97-AF65-F5344CB8AC3E}">
-        <p14:creationId xmlns:p14="http://schemas.microsoft.com/office/powerpoint/2010/main" val="1283167432"/>
+        <p14:creationId xmlns:p14="http://schemas.microsoft.com/office/powerpoint/2010/main" val="2340361777"/>
       </p:ext>
     </p:extLst>
   </p:cSld>
@@ -5822,7 +6210,7 @@
           <a:p>
             <a:r>
               <a:rPr lang="en-US" dirty="0" smtClean="0"/>
-              <a:t>Emphasis</a:t>
+              <a:t>Algorithms Implemented</a:t>
             </a:r>
             <a:endParaRPr lang="en-US" dirty="0"/>
           </a:p>
@@ -5843,7 +6231,33 @@
           <a:bodyPr/>
           <a:lstStyle/>
           <a:p>
-            <a:endParaRPr lang="en-US"/>
+            <a:r>
+              <a:rPr lang="en-US" dirty="0" smtClean="0"/>
+              <a:t>Zero Crossing</a:t>
+            </a:r>
+          </a:p>
+          <a:p>
+            <a:r>
+              <a:rPr lang="en-US" dirty="0" err="1" smtClean="0"/>
+              <a:t>Goertzel</a:t>
+            </a:r>
+            <a:r>
+              <a:rPr lang="en-US" dirty="0" smtClean="0"/>
+              <a:t> (DFT / Filtering)</a:t>
+            </a:r>
+          </a:p>
+          <a:p>
+            <a:r>
+              <a:rPr lang="en-US" dirty="0" smtClean="0"/>
+              <a:t>PLL</a:t>
+            </a:r>
+          </a:p>
+          <a:p>
+            <a:r>
+              <a:rPr lang="en-US" dirty="0" err="1" smtClean="0"/>
+              <a:t>Preclocking</a:t>
+            </a:r>
+            <a:endParaRPr lang="en-US" dirty="0"/>
           </a:p>
         </p:txBody>
       </p:sp>
@@ -5873,7 +6287,7 @@
     </p:spTree>
     <p:extLst>
       <p:ext uri="{BB962C8B-B14F-4D97-AF65-F5344CB8AC3E}">
-        <p14:creationId xmlns:p14="http://schemas.microsoft.com/office/powerpoint/2010/main" val="2340361777"/>
+        <p14:creationId xmlns:p14="http://schemas.microsoft.com/office/powerpoint/2010/main" val="2589421091"/>
       </p:ext>
     </p:extLst>
   </p:cSld>
@@ -5916,8 +6330,12 @@
           <a:lstStyle/>
           <a:p>
             <a:r>
+              <a:rPr lang="en-US" dirty="0"/>
+              <a:t>Zero </a:t>
+            </a:r>
+            <a:r>
               <a:rPr lang="en-US" dirty="0" smtClean="0"/>
-              <a:t>Algorithms Implemented</a:t>
+              <a:t>Crossing</a:t>
             </a:r>
             <a:endParaRPr lang="en-US" dirty="0"/>
           </a:p>
@@ -5938,33 +6356,7 @@
           <a:bodyPr/>
           <a:lstStyle/>
           <a:p>
-            <a:r>
-              <a:rPr lang="en-US" dirty="0" smtClean="0"/>
-              <a:t>Zero Crossing</a:t>
-            </a:r>
-          </a:p>
-          <a:p>
-            <a:r>
-              <a:rPr lang="en-US" dirty="0" err="1" smtClean="0"/>
-              <a:t>Goertzel</a:t>
-            </a:r>
-            <a:r>
-              <a:rPr lang="en-US" dirty="0" smtClean="0"/>
-              <a:t> (DFT / Filtering)</a:t>
-            </a:r>
-          </a:p>
-          <a:p>
-            <a:r>
-              <a:rPr lang="en-US" dirty="0" smtClean="0"/>
-              <a:t>PLL</a:t>
-            </a:r>
-          </a:p>
-          <a:p>
-            <a:r>
-              <a:rPr lang="en-US" dirty="0" err="1" smtClean="0"/>
-              <a:t>Preclocking</a:t>
-            </a:r>
-            <a:endParaRPr lang="en-US" dirty="0"/>
+            <a:endParaRPr lang="en-US"/>
           </a:p>
         </p:txBody>
       </p:sp>
@@ -5994,7 +6386,7 @@
     </p:spTree>
     <p:extLst>
       <p:ext uri="{BB962C8B-B14F-4D97-AF65-F5344CB8AC3E}">
-        <p14:creationId xmlns:p14="http://schemas.microsoft.com/office/powerpoint/2010/main" val="2589421091"/>
+        <p14:creationId xmlns:p14="http://schemas.microsoft.com/office/powerpoint/2010/main" val="3143651293"/>
       </p:ext>
     </p:extLst>
   </p:cSld>
@@ -6037,12 +6429,17 @@
           <a:lstStyle/>
           <a:p>
             <a:r>
+              <a:rPr lang="en-US" dirty="0" err="1"/>
+              <a:t>Goertzel</a:t>
+            </a:r>
+            <a:r>
               <a:rPr lang="en-US" dirty="0"/>
-              <a:t>Zero Crossing</a:t>
-            </a:r>
-            <a:br>
-              <a:rPr lang="en-US" dirty="0"/>
-            </a:br>
+              <a:t> (DFT / Filtering</a:t>
+            </a:r>
+            <a:r>
+              <a:rPr lang="en-US" dirty="0" smtClean="0"/>
+              <a:t>)</a:t>
+            </a:r>
             <a:endParaRPr lang="en-US" dirty="0"/>
           </a:p>
         </p:txBody>
@@ -6092,7 +6489,7 @@
     </p:spTree>
     <p:extLst>
       <p:ext uri="{BB962C8B-B14F-4D97-AF65-F5344CB8AC3E}">
-        <p14:creationId xmlns:p14="http://schemas.microsoft.com/office/powerpoint/2010/main" val="3143651293"/>
+        <p14:creationId xmlns:p14="http://schemas.microsoft.com/office/powerpoint/2010/main" val="750666133"/>
       </p:ext>
     </p:extLst>
   </p:cSld>
@@ -6135,16 +6532,8 @@
           <a:lstStyle/>
           <a:p>
             <a:r>
-              <a:rPr lang="en-US" dirty="0" err="1"/>
-              <a:t>Goertzel</a:t>
-            </a:r>
-            <a:r>
-              <a:rPr lang="en-US" dirty="0"/>
-              <a:t> (DFT / Filtering</a:t>
-            </a:r>
-            <a:r>
               <a:rPr lang="en-US" dirty="0" smtClean="0"/>
-              <a:t>)</a:t>
+              <a:t>PLL</a:t>
             </a:r>
             <a:endParaRPr lang="en-US" dirty="0"/>
           </a:p>
@@ -6195,7 +6584,7 @@
     </p:spTree>
     <p:extLst>
       <p:ext uri="{BB962C8B-B14F-4D97-AF65-F5344CB8AC3E}">
-        <p14:creationId xmlns:p14="http://schemas.microsoft.com/office/powerpoint/2010/main" val="750666133"/>
+        <p14:creationId xmlns:p14="http://schemas.microsoft.com/office/powerpoint/2010/main" val="126878189"/>
       </p:ext>
     </p:extLst>
   </p:cSld>
@@ -6238,8 +6627,8 @@
           <a:lstStyle/>
           <a:p>
             <a:r>
-              <a:rPr lang="en-US" dirty="0" smtClean="0"/>
-              <a:t>PLL</a:t>
+              <a:rPr lang="en-US" dirty="0" err="1" smtClean="0"/>
+              <a:t>Preclocking</a:t>
             </a:r>
             <a:endParaRPr lang="en-US" dirty="0"/>
           </a:p>
@@ -6290,7 +6679,7 @@
     </p:spTree>
     <p:extLst>
       <p:ext uri="{BB962C8B-B14F-4D97-AF65-F5344CB8AC3E}">
-        <p14:creationId xmlns:p14="http://schemas.microsoft.com/office/powerpoint/2010/main" val="126878189"/>
+        <p14:creationId xmlns:p14="http://schemas.microsoft.com/office/powerpoint/2010/main" val="3760382693"/>
       </p:ext>
     </p:extLst>
   </p:cSld>
@@ -6333,8 +6722,8 @@
           <a:lstStyle/>
           <a:p>
             <a:r>
-              <a:rPr lang="en-US" dirty="0" err="1" smtClean="0"/>
-              <a:t>Preclocking</a:t>
+              <a:rPr lang="en-US" dirty="0" smtClean="0"/>
+              <a:t>Benchmarking</a:t>
             </a:r>
             <a:endParaRPr lang="en-US" dirty="0"/>
           </a:p>
@@ -6355,7 +6744,35 @@
           <a:bodyPr/>
           <a:lstStyle/>
           <a:p>
-            <a:endParaRPr lang="en-US"/>
+            <a:r>
+              <a:rPr lang="en-US" dirty="0" smtClean="0"/>
+              <a:t>OT3 Test</a:t>
+            </a:r>
+          </a:p>
+          <a:p>
+            <a:r>
+              <a:rPr lang="en-US" dirty="0" smtClean="0"/>
+              <a:t>javAX25 Generated 200</a:t>
+            </a:r>
+          </a:p>
+          <a:p>
+            <a:r>
+              <a:rPr lang="en-US" dirty="0" smtClean="0"/>
+              <a:t>OT3 Test + Ramping Noise</a:t>
+            </a:r>
+          </a:p>
+          <a:p>
+            <a:r>
+              <a:rPr lang="en-US" dirty="0" smtClean="0"/>
+              <a:t>Track 1</a:t>
+            </a:r>
+          </a:p>
+          <a:p>
+            <a:r>
+              <a:rPr lang="en-US" dirty="0" smtClean="0"/>
+              <a:t>Track 2</a:t>
+            </a:r>
+            <a:endParaRPr lang="en-US" dirty="0"/>
           </a:p>
         </p:txBody>
       </p:sp>
@@ -6385,7 +6802,7 @@
     </p:spTree>
     <p:extLst>
       <p:ext uri="{BB962C8B-B14F-4D97-AF65-F5344CB8AC3E}">
-        <p14:creationId xmlns:p14="http://schemas.microsoft.com/office/powerpoint/2010/main" val="3760382693"/>
+        <p14:creationId xmlns:p14="http://schemas.microsoft.com/office/powerpoint/2010/main" val="1926357504"/>
       </p:ext>
     </p:extLst>
   </p:cSld>
@@ -6429,7 +6846,7 @@
           <a:p>
             <a:r>
               <a:rPr lang="en-US" dirty="0" smtClean="0"/>
-              <a:t>Benchmarking</a:t>
+              <a:t>Clean Signal Example</a:t>
             </a:r>
             <a:endParaRPr lang="en-US" dirty="0"/>
           </a:p>
@@ -6450,35 +6867,7 @@
           <a:bodyPr/>
           <a:lstStyle/>
           <a:p>
-            <a:r>
-              <a:rPr lang="en-US" dirty="0" smtClean="0"/>
-              <a:t>OT3 Test</a:t>
-            </a:r>
-          </a:p>
-          <a:p>
-            <a:r>
-              <a:rPr lang="en-US" dirty="0" smtClean="0"/>
-              <a:t>javAX25 Generated 200</a:t>
-            </a:r>
-          </a:p>
-          <a:p>
-            <a:r>
-              <a:rPr lang="en-US" dirty="0" smtClean="0"/>
-              <a:t>OT3 Test + Ramping Noise</a:t>
-            </a:r>
-          </a:p>
-          <a:p>
-            <a:r>
-              <a:rPr lang="en-US" dirty="0" smtClean="0"/>
-              <a:t>Track 1</a:t>
-            </a:r>
-          </a:p>
-          <a:p>
-            <a:r>
-              <a:rPr lang="en-US" dirty="0" smtClean="0"/>
-              <a:t>Track 2</a:t>
-            </a:r>
-            <a:endParaRPr lang="en-US" dirty="0"/>
+            <a:endParaRPr lang="en-US"/>
           </a:p>
         </p:txBody>
       </p:sp>
@@ -6508,7 +6897,7 @@
     </p:spTree>
     <p:extLst>
       <p:ext uri="{BB962C8B-B14F-4D97-AF65-F5344CB8AC3E}">
-        <p14:creationId xmlns:p14="http://schemas.microsoft.com/office/powerpoint/2010/main" val="1926357504"/>
+        <p14:creationId xmlns:p14="http://schemas.microsoft.com/office/powerpoint/2010/main" val="2124064968"/>
       </p:ext>
     </p:extLst>
   </p:cSld>
@@ -6684,7 +7073,7 @@
           <a:p>
             <a:r>
               <a:rPr lang="en-US" dirty="0" smtClean="0"/>
-              <a:t>Clean Signal Example</a:t>
+              <a:t>Noise Example</a:t>
             </a:r>
             <a:endParaRPr lang="en-US" dirty="0"/>
           </a:p>
@@ -6735,7 +7124,7 @@
     </p:spTree>
     <p:extLst>
       <p:ext uri="{BB962C8B-B14F-4D97-AF65-F5344CB8AC3E}">
-        <p14:creationId xmlns:p14="http://schemas.microsoft.com/office/powerpoint/2010/main" val="2124064968"/>
+        <p14:creationId xmlns:p14="http://schemas.microsoft.com/office/powerpoint/2010/main" val="98776956"/>
       </p:ext>
     </p:extLst>
   </p:cSld>
@@ -6779,7 +7168,7 @@
           <a:p>
             <a:r>
               <a:rPr lang="en-US" dirty="0" smtClean="0"/>
-              <a:t>Noise Example</a:t>
+              <a:t>Track 1 Example</a:t>
             </a:r>
             <a:endParaRPr lang="en-US" dirty="0"/>
           </a:p>
@@ -6830,7 +7219,7 @@
     </p:spTree>
     <p:extLst>
       <p:ext uri="{BB962C8B-B14F-4D97-AF65-F5344CB8AC3E}">
-        <p14:creationId xmlns:p14="http://schemas.microsoft.com/office/powerpoint/2010/main" val="98776956"/>
+        <p14:creationId xmlns:p14="http://schemas.microsoft.com/office/powerpoint/2010/main" val="2290770419"/>
       </p:ext>
     </p:extLst>
   </p:cSld>
@@ -6874,7 +7263,7 @@
           <a:p>
             <a:r>
               <a:rPr lang="en-US" dirty="0" smtClean="0"/>
-              <a:t>Track 1 Example</a:t>
+              <a:t>Hardware Results - Clean</a:t>
             </a:r>
             <a:endParaRPr lang="en-US" dirty="0"/>
           </a:p>
@@ -6925,7 +7314,7 @@
     </p:spTree>
     <p:extLst>
       <p:ext uri="{BB962C8B-B14F-4D97-AF65-F5344CB8AC3E}">
-        <p14:creationId xmlns:p14="http://schemas.microsoft.com/office/powerpoint/2010/main" val="2290770419"/>
+        <p14:creationId xmlns:p14="http://schemas.microsoft.com/office/powerpoint/2010/main" val="3679839638"/>
       </p:ext>
     </p:extLst>
   </p:cSld>
@@ -6969,7 +7358,7 @@
           <a:p>
             <a:r>
               <a:rPr lang="en-US" dirty="0" smtClean="0"/>
-              <a:t>Hardware Results - Clean</a:t>
+              <a:t>Hardware Results - Noise</a:t>
             </a:r>
             <a:endParaRPr lang="en-US" dirty="0"/>
           </a:p>
@@ -7020,7 +7409,7 @@
     </p:spTree>
     <p:extLst>
       <p:ext uri="{BB962C8B-B14F-4D97-AF65-F5344CB8AC3E}">
-        <p14:creationId xmlns:p14="http://schemas.microsoft.com/office/powerpoint/2010/main" val="3679839638"/>
+        <p14:creationId xmlns:p14="http://schemas.microsoft.com/office/powerpoint/2010/main" val="1249358574"/>
       </p:ext>
     </p:extLst>
   </p:cSld>
@@ -7064,7 +7453,7 @@
           <a:p>
             <a:r>
               <a:rPr lang="en-US" dirty="0" smtClean="0"/>
-              <a:t>Hardware Results - Noise</a:t>
+              <a:t>Hardware Results – Track 1</a:t>
             </a:r>
             <a:endParaRPr lang="en-US" dirty="0"/>
           </a:p>
@@ -7115,7 +7504,7 @@
     </p:spTree>
     <p:extLst>
       <p:ext uri="{BB962C8B-B14F-4D97-AF65-F5344CB8AC3E}">
-        <p14:creationId xmlns:p14="http://schemas.microsoft.com/office/powerpoint/2010/main" val="1249358574"/>
+        <p14:creationId xmlns:p14="http://schemas.microsoft.com/office/powerpoint/2010/main" val="1422722874"/>
       </p:ext>
     </p:extLst>
   </p:cSld>
@@ -7159,7 +7548,7 @@
           <a:p>
             <a:r>
               <a:rPr lang="en-US" dirty="0" smtClean="0"/>
-              <a:t>Hardware Results – Track 1</a:t>
+              <a:t>Software Results - Clean</a:t>
             </a:r>
             <a:endParaRPr lang="en-US" dirty="0"/>
           </a:p>
@@ -7210,7 +7599,7 @@
     </p:spTree>
     <p:extLst>
       <p:ext uri="{BB962C8B-B14F-4D97-AF65-F5344CB8AC3E}">
-        <p14:creationId xmlns:p14="http://schemas.microsoft.com/office/powerpoint/2010/main" val="1422722874"/>
+        <p14:creationId xmlns:p14="http://schemas.microsoft.com/office/powerpoint/2010/main" val="1795787625"/>
       </p:ext>
     </p:extLst>
   </p:cSld>
@@ -7254,7 +7643,7 @@
           <a:p>
             <a:r>
               <a:rPr lang="en-US" dirty="0" smtClean="0"/>
-              <a:t>Software Results - Clean</a:t>
+              <a:t>Software Results - Noise</a:t>
             </a:r>
             <a:endParaRPr lang="en-US" dirty="0"/>
           </a:p>
@@ -7305,7 +7694,7 @@
     </p:spTree>
     <p:extLst>
       <p:ext uri="{BB962C8B-B14F-4D97-AF65-F5344CB8AC3E}">
-        <p14:creationId xmlns:p14="http://schemas.microsoft.com/office/powerpoint/2010/main" val="1795787625"/>
+        <p14:creationId xmlns:p14="http://schemas.microsoft.com/office/powerpoint/2010/main" val="200077385"/>
       </p:ext>
     </p:extLst>
   </p:cSld>
@@ -7349,7 +7738,7 @@
           <a:p>
             <a:r>
               <a:rPr lang="en-US" dirty="0" smtClean="0"/>
-              <a:t>Software Results - Noise</a:t>
+              <a:t>Software Results – Track 1</a:t>
             </a:r>
             <a:endParaRPr lang="en-US" dirty="0"/>
           </a:p>
@@ -7400,7 +7789,7 @@
     </p:spTree>
     <p:extLst>
       <p:ext uri="{BB962C8B-B14F-4D97-AF65-F5344CB8AC3E}">
-        <p14:creationId xmlns:p14="http://schemas.microsoft.com/office/powerpoint/2010/main" val="200077385"/>
+        <p14:creationId xmlns:p14="http://schemas.microsoft.com/office/powerpoint/2010/main" val="2666138030"/>
       </p:ext>
     </p:extLst>
   </p:cSld>
@@ -7444,7 +7833,7 @@
           <a:p>
             <a:r>
               <a:rPr lang="en-US" dirty="0" smtClean="0"/>
-              <a:t>Software Results – Track 1</a:t>
+              <a:t>Hardware versus Software</a:t>
             </a:r>
             <a:endParaRPr lang="en-US" dirty="0"/>
           </a:p>
@@ -7495,7 +7884,7 @@
     </p:spTree>
     <p:extLst>
       <p:ext uri="{BB962C8B-B14F-4D97-AF65-F5344CB8AC3E}">
-        <p14:creationId xmlns:p14="http://schemas.microsoft.com/office/powerpoint/2010/main" val="2666138030"/>
+        <p14:creationId xmlns:p14="http://schemas.microsoft.com/office/powerpoint/2010/main" val="1430613194"/>
       </p:ext>
     </p:extLst>
   </p:cSld>
@@ -7539,7 +7928,7 @@
           <a:p>
             <a:r>
               <a:rPr lang="en-US" dirty="0" smtClean="0"/>
-              <a:t>Hardware versus Software</a:t>
+              <a:t>Ideas for Future Work</a:t>
             </a:r>
             <a:endParaRPr lang="en-US" dirty="0"/>
           </a:p>
@@ -7590,7 +7979,7 @@
     </p:spTree>
     <p:extLst>
       <p:ext uri="{BB962C8B-B14F-4D97-AF65-F5344CB8AC3E}">
-        <p14:creationId xmlns:p14="http://schemas.microsoft.com/office/powerpoint/2010/main" val="1430613194"/>
+        <p14:creationId xmlns:p14="http://schemas.microsoft.com/office/powerpoint/2010/main" val="2234000069"/>
       </p:ext>
     </p:extLst>
   </p:cSld>
@@ -7765,10 +8154,10 @@
           <a:lstStyle/>
           <a:p>
             <a:r>
-              <a:rPr lang="en-US" dirty="0" smtClean="0"/>
-              <a:t>Ideas for Future Work</a:t>
-            </a:r>
-            <a:endParaRPr lang="en-US" dirty="0"/>
+              <a:rPr lang="en-US" smtClean="0"/>
+              <a:t>Conclusion</a:t>
+            </a:r>
+            <a:endParaRPr lang="en-US"/>
           </a:p>
         </p:txBody>
       </p:sp>
@@ -7809,101 +8198,6 @@
             <a:fld id="{3C11000A-9EC0-40DA-B0AC-602B3E73336E}" type="slidenum">
               <a:rPr lang="en-US" smtClean="0"/>
               <a:t>40</a:t>
-            </a:fld>
-            <a:endParaRPr lang="en-US"/>
-          </a:p>
-        </p:txBody>
-      </p:sp>
-    </p:spTree>
-    <p:extLst>
-      <p:ext uri="{BB962C8B-B14F-4D97-AF65-F5344CB8AC3E}">
-        <p14:creationId xmlns:p14="http://schemas.microsoft.com/office/powerpoint/2010/main" val="2234000069"/>
-      </p:ext>
-    </p:extLst>
-  </p:cSld>
-  <p:clrMapOvr>
-    <a:masterClrMapping/>
-  </p:clrMapOvr>
-</p:sld>
-</file>
-
-<file path=ppt/slides/slide41.xml><?xml version="1.0" encoding="utf-8"?>
-<p:sld xmlns:a="http://schemas.openxmlformats.org/drawingml/2006/main" xmlns:r="http://schemas.openxmlformats.org/officeDocument/2006/relationships" xmlns:p="http://schemas.openxmlformats.org/presentationml/2006/main">
-  <p:cSld>
-    <p:spTree>
-      <p:nvGrpSpPr>
-        <p:cNvPr id="1" name=""/>
-        <p:cNvGrpSpPr/>
-        <p:nvPr/>
-      </p:nvGrpSpPr>
-      <p:grpSpPr>
-        <a:xfrm>
-          <a:off x="0" y="0"/>
-          <a:ext cx="0" cy="0"/>
-          <a:chOff x="0" y="0"/>
-          <a:chExt cx="0" cy="0"/>
-        </a:xfrm>
-      </p:grpSpPr>
-      <p:sp>
-        <p:nvSpPr>
-          <p:cNvPr id="2" name="Title 1"/>
-          <p:cNvSpPr>
-            <a:spLocks noGrp="1"/>
-          </p:cNvSpPr>
-          <p:nvPr>
-            <p:ph type="title"/>
-          </p:nvPr>
-        </p:nvSpPr>
-        <p:spPr/>
-        <p:txBody>
-          <a:bodyPr/>
-          <a:lstStyle/>
-          <a:p>
-            <a:r>
-              <a:rPr lang="en-US" smtClean="0"/>
-              <a:t>Conclusion</a:t>
-            </a:r>
-            <a:endParaRPr lang="en-US"/>
-          </a:p>
-        </p:txBody>
-      </p:sp>
-      <p:sp>
-        <p:nvSpPr>
-          <p:cNvPr id="3" name="Content Placeholder 2"/>
-          <p:cNvSpPr>
-            <a:spLocks noGrp="1"/>
-          </p:cNvSpPr>
-          <p:nvPr>
-            <p:ph idx="1"/>
-          </p:nvPr>
-        </p:nvSpPr>
-        <p:spPr/>
-        <p:txBody>
-          <a:bodyPr/>
-          <a:lstStyle/>
-          <a:p>
-            <a:endParaRPr lang="en-US"/>
-          </a:p>
-        </p:txBody>
-      </p:sp>
-      <p:sp>
-        <p:nvSpPr>
-          <p:cNvPr id="4" name="Slide Number Placeholder 3"/>
-          <p:cNvSpPr>
-            <a:spLocks noGrp="1"/>
-          </p:cNvSpPr>
-          <p:nvPr>
-            <p:ph type="sldNum" sz="quarter" idx="12"/>
-          </p:nvPr>
-        </p:nvSpPr>
-        <p:spPr/>
-        <p:txBody>
-          <a:bodyPr/>
-          <a:lstStyle/>
-          <a:p>
-            <a:fld id="{3C11000A-9EC0-40DA-B0AC-602B3E73336E}" type="slidenum">
-              <a:rPr lang="en-US" smtClean="0"/>
-              <a:t>41</a:t>
             </a:fld>
             <a:endParaRPr lang="en-US"/>
           </a:p>
@@ -8093,7 +8387,7 @@
         <p:spPr bwMode="auto">
           <a:xfrm>
             <a:off x="1600200" y="1200150"/>
-            <a:ext cx="5638800" cy="3600450"/>
+            <a:ext cx="5029200" cy="3600450"/>
           </a:xfrm>
           <a:prstGeom prst="rect">
             <a:avLst/>
@@ -8203,11 +8497,7 @@
           <a:p>
             <a:r>
               <a:rPr lang="en-US" dirty="0" smtClean="0"/>
-              <a:t>What’s it sound like</a:t>
-            </a:r>
-            <a:r>
-              <a:rPr lang="en-US" dirty="0" smtClean="0"/>
-              <a:t>?</a:t>
+              <a:t>What’s it sound like?</a:t>
             </a:r>
           </a:p>
           <a:p>
@@ -8459,15 +8749,7 @@
           <a:p>
             <a:r>
               <a:rPr lang="en-US" dirty="0" smtClean="0"/>
-              <a:t>How </a:t>
-            </a:r>
-            <a:r>
-              <a:rPr lang="en-US" dirty="0" smtClean="0"/>
-              <a:t>to demodulate </a:t>
-            </a:r>
-            <a:r>
-              <a:rPr lang="en-US" dirty="0" smtClean="0"/>
-              <a:t>this signal?</a:t>
+              <a:t>How to demodulate this signal?</a:t>
             </a:r>
             <a:endParaRPr lang="en-US" dirty="0"/>
           </a:p>

</xml_diff>

<commit_message>
Simplifying code segments in presentation slides
</commit_message>
<xml_diff>
--- a/Thesis Defense.pptx
+++ b/Thesis Defense.pptx
@@ -728,11 +728,11 @@
           <c:showBubbleSize val="0"/>
         </c:dLbls>
         <c:smooth val="0"/>
-        <c:axId val="-2074790720"/>
-        <c:axId val="-2074790176"/>
+        <c:axId val="307007632"/>
+        <c:axId val="307005280"/>
       </c:lineChart>
       <c:catAx>
-        <c:axId val="-2074790720"/>
+        <c:axId val="307007632"/>
         <c:scaling>
           <c:orientation val="minMax"/>
         </c:scaling>
@@ -742,7 +742,7 @@
         <c:majorTickMark val="out"/>
         <c:minorTickMark val="none"/>
         <c:tickLblPos val="none"/>
-        <c:crossAx val="-2074790176"/>
+        <c:crossAx val="307005280"/>
         <c:crosses val="autoZero"/>
         <c:auto val="1"/>
         <c:lblAlgn val="ctr"/>
@@ -750,7 +750,7 @@
         <c:noMultiLvlLbl val="0"/>
       </c:catAx>
       <c:valAx>
-        <c:axId val="-2074790176"/>
+        <c:axId val="307005280"/>
         <c:scaling>
           <c:orientation val="minMax"/>
           <c:max val="1"/>
@@ -762,7 +762,7 @@
         <c:majorTickMark val="out"/>
         <c:minorTickMark val="none"/>
         <c:tickLblPos val="nextTo"/>
-        <c:crossAx val="-2074790720"/>
+        <c:crossAx val="307007632"/>
         <c:crosses val="autoZero"/>
         <c:crossBetween val="between"/>
       </c:valAx>
@@ -1346,11 +1346,11 @@
           <c:showBubbleSize val="0"/>
         </c:dLbls>
         <c:smooth val="0"/>
-        <c:axId val="-2074784736"/>
-        <c:axId val="-2074783104"/>
+        <c:axId val="308861064"/>
+        <c:axId val="308859104"/>
       </c:lineChart>
       <c:catAx>
-        <c:axId val="-2074784736"/>
+        <c:axId val="308861064"/>
         <c:scaling>
           <c:orientation val="minMax"/>
         </c:scaling>
@@ -1360,7 +1360,7 @@
         <c:majorTickMark val="out"/>
         <c:minorTickMark val="none"/>
         <c:tickLblPos val="none"/>
-        <c:crossAx val="-2074783104"/>
+        <c:crossAx val="308859104"/>
         <c:crosses val="autoZero"/>
         <c:auto val="1"/>
         <c:lblAlgn val="ctr"/>
@@ -1368,7 +1368,7 @@
         <c:noMultiLvlLbl val="0"/>
       </c:catAx>
       <c:valAx>
-        <c:axId val="-2074783104"/>
+        <c:axId val="308859104"/>
         <c:scaling>
           <c:orientation val="minMax"/>
           <c:max val="1"/>
@@ -1380,7 +1380,7 @@
         <c:majorTickMark val="out"/>
         <c:minorTickMark val="none"/>
         <c:tickLblPos val="nextTo"/>
-        <c:crossAx val="-2074784736"/>
+        <c:crossAx val="308861064"/>
         <c:crosses val="autoZero"/>
         <c:crossBetween val="between"/>
       </c:valAx>
@@ -1725,7 +1725,7 @@
           <a:p>
             <a:fld id="{36A1C95E-1CF8-4926-B750-D85B02FE5FAD}" type="datetimeFigureOut">
               <a:rPr lang="en-US" smtClean="0"/>
-              <a:t>4/11/2016</a:t>
+              <a:t>5/1/2016</a:t>
             </a:fld>
             <a:endParaRPr lang="en-US"/>
           </a:p>
@@ -4718,7 +4718,7 @@
           <a:p>
             <a:fld id="{DED1A555-0307-4A79-A556-98A44DB0B6FF}" type="datetime1">
               <a:rPr lang="en-US" smtClean="0"/>
-              <a:t>4/11/2016</a:t>
+              <a:t>5/1/2016</a:t>
             </a:fld>
             <a:endParaRPr lang="en-US"/>
           </a:p>
@@ -4883,7 +4883,7 @@
           <a:p>
             <a:fld id="{52D83D95-7A82-4F21-8A65-062EC056839B}" type="datetime1">
               <a:rPr lang="en-US" smtClean="0"/>
-              <a:t>4/11/2016</a:t>
+              <a:t>5/1/2016</a:t>
             </a:fld>
             <a:endParaRPr lang="en-US"/>
           </a:p>
@@ -5058,7 +5058,7 @@
           <a:p>
             <a:fld id="{BB0EDF4D-ED1D-4336-A8A7-6B82EB5D2413}" type="datetime1">
               <a:rPr lang="en-US" smtClean="0"/>
-              <a:t>4/11/2016</a:t>
+              <a:t>5/1/2016</a:t>
             </a:fld>
             <a:endParaRPr lang="en-US"/>
           </a:p>
@@ -5223,7 +5223,7 @@
           <a:p>
             <a:fld id="{71352417-BB1A-494E-A4DA-135265FCC881}" type="datetime1">
               <a:rPr lang="en-US" smtClean="0"/>
-              <a:t>4/11/2016</a:t>
+              <a:t>5/1/2016</a:t>
             </a:fld>
             <a:endParaRPr lang="en-US"/>
           </a:p>
@@ -5464,7 +5464,7 @@
           <a:p>
             <a:fld id="{6F117249-023D-4B77-8123-C8FFD9D02F0B}" type="datetime1">
               <a:rPr lang="en-US" smtClean="0"/>
-              <a:t>4/11/2016</a:t>
+              <a:t>5/1/2016</a:t>
             </a:fld>
             <a:endParaRPr lang="en-US"/>
           </a:p>
@@ -5747,7 +5747,7 @@
           <a:p>
             <a:fld id="{45642988-BB84-4807-9E77-175CE5CECDE0}" type="datetime1">
               <a:rPr lang="en-US" smtClean="0"/>
-              <a:t>4/11/2016</a:t>
+              <a:t>5/1/2016</a:t>
             </a:fld>
             <a:endParaRPr lang="en-US"/>
           </a:p>
@@ -6176,7 +6176,7 @@
           <a:p>
             <a:fld id="{6D96F54B-A69F-4859-ADA4-B2253D584FB6}" type="datetime1">
               <a:rPr lang="en-US" smtClean="0"/>
-              <a:t>4/11/2016</a:t>
+              <a:t>5/1/2016</a:t>
             </a:fld>
             <a:endParaRPr lang="en-US"/>
           </a:p>
@@ -6289,7 +6289,7 @@
           <a:p>
             <a:fld id="{B70C02B0-0B73-49BF-B56F-7F628100337A}" type="datetime1">
               <a:rPr lang="en-US" smtClean="0"/>
-              <a:t>4/11/2016</a:t>
+              <a:t>5/1/2016</a:t>
             </a:fld>
             <a:endParaRPr lang="en-US"/>
           </a:p>
@@ -6379,7 +6379,7 @@
           <a:p>
             <a:fld id="{61AC1934-F2BC-46DA-BF21-8FEDF0D97A28}" type="datetime1">
               <a:rPr lang="en-US" smtClean="0"/>
-              <a:t>4/11/2016</a:t>
+              <a:t>5/1/2016</a:t>
             </a:fld>
             <a:endParaRPr lang="en-US"/>
           </a:p>
@@ -6568,7 +6568,7 @@
           <a:p>
             <a:fld id="{059CEC1F-F11C-4127-80E5-4FA9DF92B5D8}" type="datetime1">
               <a:rPr lang="en-US" smtClean="0"/>
-              <a:t>4/11/2016</a:t>
+              <a:t>5/1/2016</a:t>
             </a:fld>
             <a:endParaRPr lang="en-US"/>
           </a:p>
@@ -6886,7 +6886,7 @@
           <a:p>
             <a:fld id="{265B60AB-6060-4DC1-97F7-58A23AAF3FD2}" type="datetime1">
               <a:rPr lang="en-US" smtClean="0"/>
-              <a:t>4/11/2016</a:t>
+              <a:t>5/1/2016</a:t>
             </a:fld>
             <a:endParaRPr lang="en-US"/>
           </a:p>
@@ -7265,7 +7265,7 @@
           <a:p>
             <a:fld id="{B236E3DE-3988-44CB-9697-C84D864E0643}" type="datetime1">
               <a:rPr lang="en-US" smtClean="0"/>
-              <a:t>4/11/2016</a:t>
+              <a:t>5/1/2016</a:t>
             </a:fld>
             <a:endParaRPr lang="en-US"/>
           </a:p>
@@ -10570,7 +10570,7 @@
               <a:t>handleZeroCrossing</a:t>
             </a:r>
             <a:r>
-              <a:rPr lang="en-US" sz="1800" dirty="0">
+              <a:rPr lang="en-US" sz="1800" dirty="0" smtClean="0">
                 <a:solidFill>
                   <a:srgbClr val="000000"/>
                 </a:solidFill>
@@ -10588,13 +10588,22 @@
               <a:buNone/>
             </a:pPr>
             <a:r>
-              <a:rPr lang="en-US" sz="1800" dirty="0" err="1">
+              <a:rPr lang="en-US" sz="1800" dirty="0" err="1" smtClean="0">
                 <a:solidFill>
                   <a:srgbClr val="0000C0"/>
                 </a:solidFill>
                 <a:latin typeface="Courier New"/>
               </a:rPr>
-              <a:t>samplesSinceLastXing</a:t>
+              <a:t>isSignalHigh</a:t>
+            </a:r>
+            <a:r>
+              <a:rPr lang="en-US" sz="1800" dirty="0" smtClean="0">
+                <a:solidFill>
+                  <a:srgbClr val="000000"/>
+                </a:solidFill>
+                <a:latin typeface="Courier New"/>
+              </a:rPr>
+              <a:t> </a:t>
             </a:r>
             <a:r>
               <a:rPr lang="en-US" sz="1800" dirty="0">
@@ -10603,34 +10612,7 @@
                 </a:solidFill>
                 <a:latin typeface="Courier New"/>
               </a:rPr>
-              <a:t> = 0;</a:t>
-            </a:r>
-          </a:p>
-          <a:p>
-            <a:pPr marL="457200" lvl="1" indent="0">
-              <a:spcBef>
-                <a:spcPts val="0"/>
-              </a:spcBef>
-              <a:buClrTx/>
-              <a:buNone/>
-            </a:pPr>
-            <a:r>
-              <a:rPr lang="en-US" sz="1800" dirty="0" err="1">
-                <a:solidFill>
-                  <a:srgbClr val="0000C0"/>
-                </a:solidFill>
-                <a:latin typeface="Courier New"/>
-              </a:rPr>
-              <a:t>isSignalHigh</a:t>
-            </a:r>
-            <a:r>
-              <a:rPr lang="en-US" sz="1800" dirty="0">
-                <a:solidFill>
-                  <a:srgbClr val="000000"/>
-                </a:solidFill>
-                <a:latin typeface="Courier New"/>
-              </a:rPr>
-              <a:t> = !</a:t>
+              <a:t>= !</a:t>
             </a:r>
             <a:r>
               <a:rPr lang="en-US" sz="1800" dirty="0" err="1">
@@ -10775,10 +10757,15 @@
             <p:ph idx="1"/>
           </p:nvPr>
         </p:nvSpPr>
-        <p:spPr/>
+        <p:spPr>
+          <a:xfrm>
+            <a:off x="457200" y="1200150"/>
+            <a:ext cx="7620000" cy="3600450"/>
+          </a:xfrm>
+        </p:spPr>
         <p:txBody>
           <a:bodyPr>
-            <a:normAutofit fontScale="70000" lnSpcReduction="20000"/>
+            <a:normAutofit fontScale="85000" lnSpcReduction="10000"/>
           </a:bodyPr>
           <a:lstStyle/>
           <a:p>
@@ -10821,19 +10808,37 @@
                 </a:solidFill>
                 <a:latin typeface="Courier New"/>
               </a:rPr>
-              <a:t> (!</a:t>
-            </a:r>
-            <a:r>
-              <a:rPr lang="en-US" sz="2400" b="1" dirty="0" err="1">
+              <a:t> </a:t>
+            </a:r>
+            <a:r>
+              <a:rPr lang="en-US" sz="2400" b="1" dirty="0" smtClean="0">
+                <a:solidFill>
+                  <a:srgbClr val="000000"/>
+                </a:solidFill>
+                <a:latin typeface="Courier New"/>
+              </a:rPr>
+              <a:t>((!</a:t>
+            </a:r>
+            <a:r>
+              <a:rPr lang="en-US" sz="2400" b="1" dirty="0" err="1" smtClean="0">
                 <a:solidFill>
                   <a:srgbClr val="0000C0"/>
                 </a:solidFill>
                 <a:latin typeface="Courier New"/>
               </a:rPr>
-              <a:t>isSignalHigh</a:t>
-            </a:r>
-            <a:r>
-              <a:rPr lang="en-US" sz="2400" b="1" dirty="0">
+              <a:t>was</a:t>
+            </a:r>
+            <a:r>
+              <a:rPr lang="en-US" sz="2400" b="1" dirty="0" err="1" smtClean="0">
+                <a:solidFill>
+                  <a:srgbClr val="0000C0"/>
+                </a:solidFill>
+                <a:latin typeface="Courier New"/>
+              </a:rPr>
+              <a:t>SignalHigh</a:t>
+            </a:r>
+            <a:r>
+              <a:rPr lang="en-US" sz="2400" b="1" dirty="0" smtClean="0">
                 <a:solidFill>
                   <a:srgbClr val="0000C0"/>
                 </a:solidFill>
@@ -10851,22 +10856,22 @@
               <a:t>&amp;&amp; </a:t>
             </a:r>
             <a:r>
-              <a:rPr lang="en-US" sz="2400" dirty="0" err="1">
+              <a:rPr lang="en-US" sz="2400" dirty="0" smtClean="0">
                 <a:solidFill>
                   <a:srgbClr val="0000C0"/>
                 </a:solidFill>
                 <a:latin typeface="Courier New"/>
               </a:rPr>
-              <a:t>samples</a:t>
-            </a:r>
-            <a:r>
-              <a:rPr lang="en-US" sz="2400" dirty="0" err="1">
+              <a:t>sample</a:t>
+            </a:r>
+            <a:r>
+              <a:rPr lang="en-US" sz="2400" dirty="0" smtClean="0">
                 <a:solidFill>
                   <a:srgbClr val="000000"/>
                 </a:solidFill>
                 <a:latin typeface="Courier New"/>
               </a:rPr>
-              <a:t>.get</a:t>
+              <a:t> </a:t>
             </a:r>
             <a:r>
               <a:rPr lang="en-US" sz="2400" dirty="0">
@@ -10875,34 +10880,7 @@
                 </a:solidFill>
                 <a:latin typeface="Courier New"/>
               </a:rPr>
-              <a:t>(</a:t>
-            </a:r>
-            <a:r>
-              <a:rPr lang="en-US" sz="2400" dirty="0" err="1">
-                <a:solidFill>
-                  <a:srgbClr val="0000C0"/>
-                </a:solidFill>
-                <a:latin typeface="Courier New"/>
-              </a:rPr>
-              <a:t>samples</a:t>
-            </a:r>
-            <a:r>
-              <a:rPr lang="en-US" sz="2400" dirty="0" err="1">
-                <a:solidFill>
-                  <a:srgbClr val="000000"/>
-                </a:solidFill>
-                <a:latin typeface="Courier New"/>
-              </a:rPr>
-              <a:t>.size</a:t>
-            </a:r>
-            <a:r>
-              <a:rPr lang="en-US" sz="2400" dirty="0">
-                <a:solidFill>
-                  <a:srgbClr val="000000"/>
-                </a:solidFill>
-                <a:latin typeface="Courier New"/>
-              </a:rPr>
-              <a:t>() - 1) &gt; </a:t>
+              <a:t>&gt; </a:t>
             </a:r>
             <a:r>
               <a:rPr lang="en-US" sz="2400" dirty="0" err="1">
@@ -10932,6 +10910,132 @@
               <a:t>+ </a:t>
             </a:r>
             <a:r>
+              <a:rPr lang="en-US" sz="2400" dirty="0" err="1" smtClean="0">
+                <a:solidFill>
+                  <a:srgbClr val="0000C0"/>
+                </a:solidFill>
+                <a:latin typeface="Courier New"/>
+              </a:rPr>
+              <a:t>zeroCrossingThreshold</a:t>
+            </a:r>
+            <a:r>
+              <a:rPr lang="en-US" sz="2400" dirty="0" smtClean="0">
+                <a:latin typeface="Courier New"/>
+              </a:rPr>
+              <a:t>)||</a:t>
+            </a:r>
+          </a:p>
+          <a:p>
+            <a:pPr marL="114300" indent="0">
+              <a:buNone/>
+            </a:pPr>
+            <a:r>
+              <a:rPr lang="en-US" sz="2400" dirty="0">
+                <a:solidFill>
+                  <a:srgbClr val="3F7F5F"/>
+                </a:solidFill>
+                <a:latin typeface="Courier New"/>
+              </a:rPr>
+              <a:t>//going high to low</a:t>
+            </a:r>
+          </a:p>
+          <a:p>
+            <a:pPr marL="114300" indent="0">
+              <a:buNone/>
+            </a:pPr>
+            <a:r>
+              <a:rPr lang="en-US" sz="2400" b="1" dirty="0" smtClean="0">
+                <a:solidFill>
+                  <a:srgbClr val="000000"/>
+                </a:solidFill>
+                <a:latin typeface="Courier New"/>
+              </a:rPr>
+              <a:t>(</a:t>
+            </a:r>
+            <a:r>
+              <a:rPr lang="en-US" sz="2400" b="1" dirty="0" err="1" smtClean="0">
+                <a:solidFill>
+                  <a:srgbClr val="0000C0"/>
+                </a:solidFill>
+                <a:latin typeface="Courier New"/>
+              </a:rPr>
+              <a:t>wasSignalHigh</a:t>
+            </a:r>
+            <a:r>
+              <a:rPr lang="en-US" sz="2400" b="1" dirty="0" smtClean="0">
+                <a:solidFill>
+                  <a:srgbClr val="0000C0"/>
+                </a:solidFill>
+                <a:latin typeface="Courier New"/>
+              </a:rPr>
+              <a:t> </a:t>
+            </a:r>
+            <a:r>
+              <a:rPr lang="en-US" sz="2400" dirty="0">
+                <a:solidFill>
+                  <a:srgbClr val="000000"/>
+                </a:solidFill>
+                <a:latin typeface="Courier New"/>
+              </a:rPr>
+              <a:t>&amp;&amp; </a:t>
+            </a:r>
+            <a:r>
+              <a:rPr lang="en-US" sz="2400" dirty="0">
+                <a:solidFill>
+                  <a:srgbClr val="0000C0"/>
+                </a:solidFill>
+                <a:latin typeface="Courier New"/>
+              </a:rPr>
+              <a:t>sample </a:t>
+            </a:r>
+            <a:r>
+              <a:rPr lang="en-US" sz="2400" dirty="0">
+                <a:solidFill>
+                  <a:srgbClr val="000000"/>
+                </a:solidFill>
+                <a:latin typeface="Courier New"/>
+              </a:rPr>
+              <a:t>&lt; </a:t>
+            </a:r>
+            <a:endParaRPr lang="en-US" sz="2400" dirty="0" smtClean="0">
+              <a:solidFill>
+                <a:srgbClr val="000000"/>
+              </a:solidFill>
+              <a:latin typeface="Courier New"/>
+            </a:endParaRPr>
+          </a:p>
+          <a:p>
+            <a:pPr marL="114300" indent="0">
+              <a:buNone/>
+            </a:pPr>
+            <a:r>
+              <a:rPr lang="en-US" sz="2400" dirty="0" err="1" smtClean="0">
+                <a:solidFill>
+                  <a:srgbClr val="0000C0"/>
+                </a:solidFill>
+                <a:latin typeface="Courier New"/>
+              </a:rPr>
+              <a:t>averageValueInHistory</a:t>
+            </a:r>
+            <a:r>
+              <a:rPr lang="en-US" sz="2400" dirty="0" smtClean="0">
+                <a:solidFill>
+                  <a:srgbClr val="0000C0"/>
+                </a:solidFill>
+                <a:latin typeface="Courier New"/>
+              </a:rPr>
+              <a:t> </a:t>
+            </a:r>
+            <a:r>
+              <a:rPr lang="en-US" sz="2400" dirty="0">
+                <a:solidFill>
+                  <a:srgbClr val="000000"/>
+                </a:solidFill>
+                <a:latin typeface="Courier New"/>
+              </a:rPr>
+              <a:t>- </a:t>
+            </a:r>
+            <a:r>
               <a:rPr lang="en-US" sz="2400" dirty="0" err="1">
                 <a:solidFill>
                   <a:srgbClr val="0000C0"/>
@@ -10941,27 +11045,59 @@
               <a:t>zeroCrossingThreshold</a:t>
             </a:r>
             <a:r>
+              <a:rPr lang="en-US" sz="2400" dirty="0" smtClean="0">
+                <a:solidFill>
+                  <a:srgbClr val="000000"/>
+                </a:solidFill>
+                <a:latin typeface="Courier New"/>
+              </a:rPr>
+              <a:t>))</a:t>
+            </a:r>
+          </a:p>
+          <a:p>
+            <a:pPr marL="114300" indent="0">
+              <a:buNone/>
+            </a:pPr>
+            <a:r>
+              <a:rPr lang="en-US" sz="2400" dirty="0" smtClean="0">
+                <a:solidFill>
+                  <a:srgbClr val="000000"/>
+                </a:solidFill>
+                <a:latin typeface="Courier New"/>
+              </a:rPr>
+              <a:t>{</a:t>
+            </a:r>
+          </a:p>
+          <a:p>
+            <a:pPr marL="114300" indent="0">
+              <a:buNone/>
+            </a:pPr>
+            <a:r>
+              <a:rPr lang="en-US" sz="2400" b="1" dirty="0">
+                <a:solidFill>
+                  <a:srgbClr val="000000"/>
+                </a:solidFill>
+                <a:latin typeface="Courier New"/>
+              </a:rPr>
+              <a:t>	</a:t>
+            </a:r>
+            <a:r>
+              <a:rPr lang="en-US" sz="2400" dirty="0" err="1">
+                <a:solidFill>
+                  <a:srgbClr val="000000"/>
+                </a:solidFill>
+                <a:latin typeface="Courier New"/>
+              </a:rPr>
+              <a:t>handleZeroCrossing</a:t>
+            </a:r>
+            <a:r>
               <a:rPr lang="en-US" sz="2400" dirty="0">
                 <a:solidFill>
                   <a:srgbClr val="000000"/>
                 </a:solidFill>
                 <a:latin typeface="Courier New"/>
               </a:rPr>
-              <a:t>) {</a:t>
-            </a:r>
-          </a:p>
-          <a:p>
-            <a:pPr marL="114300" indent="0">
-              <a:buNone/>
-            </a:pPr>
-            <a:r>
-              <a:rPr lang="en-US" sz="2400" dirty="0">
-                <a:solidFill>
-                  <a:srgbClr val="3F7F5F"/>
-                </a:solidFill>
-                <a:latin typeface="Courier New"/>
-              </a:rPr>
-              <a:t>// Its going high!</a:t>
+              <a:t>();</a:t>
             </a:r>
           </a:p>
           <a:p>
@@ -10984,7 +11120,7 @@
                 </a:solidFill>
                 <a:latin typeface="Courier New"/>
               </a:rPr>
-              <a:t>isSignalHigh</a:t>
+              <a:t>wasSignalHigh</a:t>
             </a:r>
             <a:r>
               <a:rPr lang="en-US" sz="2400" dirty="0">
@@ -10993,19 +11129,19 @@
                 </a:solidFill>
                 <a:latin typeface="Courier New"/>
               </a:rPr>
-              <a:t> = </a:t>
-            </a:r>
-            <a:r>
-              <a:rPr lang="en-US" sz="2400" b="1" dirty="0">
+              <a:t> = !</a:t>
+            </a:r>
+            <a:r>
+              <a:rPr lang="en-US" sz="2400" dirty="0" err="1">
                 <a:solidFill>
-                  <a:srgbClr val="7F0055"/>
+                  <a:srgbClr val="0000C0"/>
                 </a:solidFill>
                 <a:latin typeface="Courier New"/>
               </a:rPr>
-              <a:t>true</a:t>
-            </a:r>
-            <a:r>
-              <a:rPr lang="en-US" sz="2400" b="1" dirty="0">
+              <a:t>wasSignalHigh</a:t>
+            </a:r>
+            <a:r>
+              <a:rPr lang="en-US" sz="2400" b="1" dirty="0" smtClean="0">
                 <a:solidFill>
                   <a:srgbClr val="000000"/>
                 </a:solidFill>
@@ -11013,45 +11149,19 @@
               </a:rPr>
               <a:t>;</a:t>
             </a:r>
+            <a:endParaRPr lang="en-US" sz="2400" dirty="0">
+              <a:solidFill>
+                <a:srgbClr val="000000"/>
+              </a:solidFill>
+              <a:latin typeface="Courier New"/>
+            </a:endParaRPr>
           </a:p>
           <a:p>
             <a:pPr marL="114300" indent="0">
               <a:buNone/>
             </a:pPr>
             <a:r>
-              <a:rPr lang="en-US" sz="2400" b="1" dirty="0">
-                <a:solidFill>
-                  <a:srgbClr val="000000"/>
-                </a:solidFill>
-                <a:latin typeface="Courier New"/>
-              </a:rPr>
-              <a:t>	</a:t>
-            </a:r>
-            <a:r>
-              <a:rPr lang="en-US" sz="2400" dirty="0" err="1">
-                <a:solidFill>
-                  <a:srgbClr val="000000"/>
-                </a:solidFill>
-                <a:latin typeface="Courier New"/>
-              </a:rPr>
-              <a:t>handleZeroCrossing</a:t>
-            </a:r>
-            <a:r>
-              <a:rPr lang="en-US" sz="2400" dirty="0">
-                <a:solidFill>
-                  <a:srgbClr val="000000"/>
-                </a:solidFill>
-                <a:latin typeface="Courier New"/>
-              </a:rPr>
-              <a:t>();</a:t>
-            </a:r>
-          </a:p>
-          <a:p>
-            <a:pPr marL="114300" indent="0">
-              <a:buNone/>
-            </a:pPr>
-            <a:r>
-              <a:rPr lang="en-US" sz="2400" dirty="0">
+              <a:rPr lang="en-US" sz="2400" dirty="0" smtClean="0">
                 <a:solidFill>
                   <a:srgbClr val="000000"/>
                 </a:solidFill>
@@ -11059,285 +11169,6 @@
               </a:rPr>
               <a:t>}</a:t>
             </a:r>
-          </a:p>
-          <a:p>
-            <a:pPr marL="114300" indent="0">
-              <a:buNone/>
-            </a:pPr>
-            <a:r>
-              <a:rPr lang="en-US" sz="2400" dirty="0">
-                <a:solidFill>
-                  <a:srgbClr val="3F7F5F"/>
-                </a:solidFill>
-                <a:latin typeface="Courier New"/>
-              </a:rPr>
-              <a:t>//going high to low</a:t>
-            </a:r>
-          </a:p>
-          <a:p>
-            <a:pPr marL="114300" indent="0">
-              <a:buNone/>
-            </a:pPr>
-            <a:r>
-              <a:rPr lang="en-US" sz="2400" b="1" dirty="0">
-                <a:solidFill>
-                  <a:srgbClr val="7F0055"/>
-                </a:solidFill>
-                <a:latin typeface="Courier New"/>
-              </a:rPr>
-              <a:t>if</a:t>
-            </a:r>
-            <a:r>
-              <a:rPr lang="en-US" sz="2400" b="1" dirty="0">
-                <a:solidFill>
-                  <a:srgbClr val="000000"/>
-                </a:solidFill>
-                <a:latin typeface="Courier New"/>
-              </a:rPr>
-              <a:t> (</a:t>
-            </a:r>
-            <a:r>
-              <a:rPr lang="en-US" sz="2400" b="1" dirty="0" err="1">
-                <a:solidFill>
-                  <a:srgbClr val="0000C0"/>
-                </a:solidFill>
-                <a:latin typeface="Courier New"/>
-              </a:rPr>
-              <a:t>isSignalHigh</a:t>
-            </a:r>
-            <a:r>
-              <a:rPr lang="en-US" sz="2400" b="1" dirty="0">
-                <a:solidFill>
-                  <a:srgbClr val="0000C0"/>
-                </a:solidFill>
-                <a:latin typeface="Courier New"/>
-              </a:rPr>
-              <a:t> </a:t>
-            </a:r>
-            <a:r>
-              <a:rPr lang="en-US" sz="2400" dirty="0">
-                <a:solidFill>
-                  <a:srgbClr val="000000"/>
-                </a:solidFill>
-                <a:latin typeface="Courier New"/>
-              </a:rPr>
-              <a:t>&amp;&amp; </a:t>
-            </a:r>
-            <a:r>
-              <a:rPr lang="en-US" sz="2400" dirty="0" err="1">
-                <a:solidFill>
-                  <a:srgbClr val="0000C0"/>
-                </a:solidFill>
-                <a:latin typeface="Courier New"/>
-              </a:rPr>
-              <a:t>samples</a:t>
-            </a:r>
-            <a:r>
-              <a:rPr lang="en-US" sz="2400" dirty="0" err="1">
-                <a:solidFill>
-                  <a:srgbClr val="000000"/>
-                </a:solidFill>
-                <a:latin typeface="Courier New"/>
-              </a:rPr>
-              <a:t>.get</a:t>
-            </a:r>
-            <a:r>
-              <a:rPr lang="en-US" sz="2400" dirty="0">
-                <a:solidFill>
-                  <a:srgbClr val="000000"/>
-                </a:solidFill>
-                <a:latin typeface="Courier New"/>
-              </a:rPr>
-              <a:t>(</a:t>
-            </a:r>
-            <a:r>
-              <a:rPr lang="en-US" sz="2400" dirty="0" err="1">
-                <a:solidFill>
-                  <a:srgbClr val="0000C0"/>
-                </a:solidFill>
-                <a:latin typeface="Courier New"/>
-              </a:rPr>
-              <a:t>samples</a:t>
-            </a:r>
-            <a:r>
-              <a:rPr lang="en-US" sz="2400" dirty="0" err="1">
-                <a:solidFill>
-                  <a:srgbClr val="000000"/>
-                </a:solidFill>
-                <a:latin typeface="Courier New"/>
-              </a:rPr>
-              <a:t>.size</a:t>
-            </a:r>
-            <a:r>
-              <a:rPr lang="en-US" sz="2400" dirty="0">
-                <a:solidFill>
-                  <a:srgbClr val="000000"/>
-                </a:solidFill>
-                <a:latin typeface="Courier New"/>
-              </a:rPr>
-              <a:t>() - 1) &lt; </a:t>
-            </a:r>
-            <a:r>
-              <a:rPr lang="en-US" sz="2400" dirty="0" err="1">
-                <a:solidFill>
-                  <a:srgbClr val="0000C0"/>
-                </a:solidFill>
-                <a:latin typeface="Courier New"/>
-              </a:rPr>
-              <a:t>averageValueInHistory</a:t>
-            </a:r>
-            <a:r>
-              <a:rPr lang="en-US" sz="2400" dirty="0">
-                <a:solidFill>
-                  <a:srgbClr val="0000C0"/>
-                </a:solidFill>
-                <a:latin typeface="Courier New"/>
-              </a:rPr>
-              <a:t> </a:t>
-            </a:r>
-            <a:r>
-              <a:rPr lang="en-US" sz="2400" dirty="0">
-                <a:solidFill>
-                  <a:srgbClr val="000000"/>
-                </a:solidFill>
-                <a:latin typeface="Courier New"/>
-              </a:rPr>
-              <a:t>- </a:t>
-            </a:r>
-            <a:r>
-              <a:rPr lang="en-US" sz="2400" dirty="0" err="1">
-                <a:solidFill>
-                  <a:srgbClr val="0000C0"/>
-                </a:solidFill>
-                <a:latin typeface="Courier New"/>
-              </a:rPr>
-              <a:t>zeroCrossingThreshold</a:t>
-            </a:r>
-            <a:r>
-              <a:rPr lang="en-US" sz="2400" dirty="0">
-                <a:solidFill>
-                  <a:srgbClr val="000000"/>
-                </a:solidFill>
-                <a:latin typeface="Courier New"/>
-              </a:rPr>
-              <a:t>) {</a:t>
-            </a:r>
-          </a:p>
-          <a:p>
-            <a:pPr marL="114300" indent="0">
-              <a:buNone/>
-            </a:pPr>
-            <a:r>
-              <a:rPr lang="en-US" sz="2400" dirty="0">
-                <a:solidFill>
-                  <a:srgbClr val="3F7F5F"/>
-                </a:solidFill>
-                <a:latin typeface="Courier New"/>
-              </a:rPr>
-              <a:t>	// Its going low!!</a:t>
-            </a:r>
-          </a:p>
-          <a:p>
-            <a:pPr marL="114300" indent="0">
-              <a:buNone/>
-            </a:pPr>
-            <a:r>
-              <a:rPr lang="en-US" sz="2400" dirty="0">
-                <a:solidFill>
-                  <a:srgbClr val="0000C0"/>
-                </a:solidFill>
-                <a:latin typeface="Courier New"/>
-              </a:rPr>
-              <a:t>	</a:t>
-            </a:r>
-            <a:r>
-              <a:rPr lang="en-US" sz="2400" dirty="0" err="1">
-                <a:solidFill>
-                  <a:srgbClr val="0000C0"/>
-                </a:solidFill>
-                <a:latin typeface="Courier New"/>
-              </a:rPr>
-              <a:t>isSignalHigh</a:t>
-            </a:r>
-            <a:r>
-              <a:rPr lang="en-US" sz="2400" dirty="0">
-                <a:solidFill>
-                  <a:srgbClr val="000000"/>
-                </a:solidFill>
-                <a:latin typeface="Courier New"/>
-              </a:rPr>
-              <a:t> = </a:t>
-            </a:r>
-            <a:r>
-              <a:rPr lang="en-US" sz="2400" b="1" dirty="0">
-                <a:solidFill>
-                  <a:srgbClr val="7F0055"/>
-                </a:solidFill>
-                <a:latin typeface="Courier New"/>
-              </a:rPr>
-              <a:t>false</a:t>
-            </a:r>
-            <a:r>
-              <a:rPr lang="en-US" sz="2400" b="1" dirty="0">
-                <a:solidFill>
-                  <a:srgbClr val="000000"/>
-                </a:solidFill>
-                <a:latin typeface="Courier New"/>
-              </a:rPr>
-              <a:t>;</a:t>
-            </a:r>
-          </a:p>
-          <a:p>
-            <a:pPr marL="114300" indent="0">
-              <a:buNone/>
-            </a:pPr>
-            <a:r>
-              <a:rPr lang="en-US" sz="2400" b="1" dirty="0">
-                <a:solidFill>
-                  <a:srgbClr val="000000"/>
-                </a:solidFill>
-                <a:latin typeface="Courier New"/>
-              </a:rPr>
-              <a:t>	</a:t>
-            </a:r>
-            <a:r>
-              <a:rPr lang="en-US" sz="2400" dirty="0" err="1">
-                <a:solidFill>
-                  <a:srgbClr val="000000"/>
-                </a:solidFill>
-                <a:latin typeface="Courier New"/>
-              </a:rPr>
-              <a:t>handleZeroCrossing</a:t>
-            </a:r>
-            <a:r>
-              <a:rPr lang="en-US" sz="2400" dirty="0">
-                <a:solidFill>
-                  <a:srgbClr val="000000"/>
-                </a:solidFill>
-                <a:latin typeface="Courier New"/>
-              </a:rPr>
-              <a:t>();</a:t>
-            </a:r>
-          </a:p>
-          <a:p>
-            <a:pPr marL="114300" indent="0">
-              <a:buNone/>
-            </a:pPr>
-            <a:r>
-              <a:rPr lang="en-US" sz="2400" dirty="0">
-                <a:solidFill>
-                  <a:srgbClr val="000000"/>
-                </a:solidFill>
-                <a:latin typeface="Courier New"/>
-              </a:rPr>
-              <a:t>}</a:t>
-            </a:r>
-            <a:endParaRPr lang="en-US" sz="2400" dirty="0"/>
-          </a:p>
-          <a:p>
-            <a:pPr marL="114300" indent="0">
-              <a:buNone/>
-            </a:pPr>
             <a:endParaRPr lang="en-US" dirty="0"/>
           </a:p>
         </p:txBody>
@@ -11915,7 +11746,7 @@
         <p:spPr/>
         <p:txBody>
           <a:bodyPr>
-            <a:normAutofit fontScale="62500" lnSpcReduction="20000"/>
+            <a:normAutofit fontScale="70000" lnSpcReduction="20000"/>
           </a:bodyPr>
           <a:lstStyle/>
           <a:p>
@@ -12353,7 +12184,10 @@
             <a:pPr marL="114300" indent="0">
               <a:buNone/>
             </a:pPr>
-            <a:endParaRPr lang="en-US" sz="2400" dirty="0">
+            <a:endParaRPr lang="en-US" sz="2400" b="1" dirty="0" smtClean="0">
+              <a:solidFill>
+                <a:srgbClr val="7F0055"/>
+              </a:solidFill>
               <a:latin typeface="Courier New"/>
             </a:endParaRPr>
           </a:p>
@@ -12362,14 +12196,64 @@
               <a:buNone/>
             </a:pPr>
             <a:r>
-              <a:rPr lang="en-US" sz="2400" b="1" dirty="0" err="1" smtClean="0">
+              <a:rPr lang="en-US" sz="2400" b="1" dirty="0" smtClean="0">
                 <a:solidFill>
                   <a:srgbClr val="7F0055"/>
                 </a:solidFill>
                 <a:latin typeface="Courier New"/>
               </a:rPr>
-              <a:t>int</a:t>
-            </a:r>
+              <a:t>if</a:t>
+            </a:r>
+            <a:r>
+              <a:rPr lang="en-US" sz="2400" b="1" dirty="0" smtClean="0">
+                <a:solidFill>
+                  <a:srgbClr val="000000"/>
+                </a:solidFill>
+                <a:latin typeface="Courier New"/>
+              </a:rPr>
+              <a:t> ((</a:t>
+            </a:r>
+            <a:r>
+              <a:rPr lang="en-US" sz="2400" b="1" dirty="0">
+                <a:solidFill>
+                  <a:srgbClr val="000000"/>
+                </a:solidFill>
+                <a:latin typeface="Courier New"/>
+              </a:rPr>
+              <a:t>output &gt; 0 &amp;&amp; !</a:t>
+            </a:r>
+            <a:r>
+              <a:rPr lang="en-US" sz="2400" b="1" dirty="0" err="1">
+                <a:solidFill>
+                  <a:srgbClr val="0000C0"/>
+                </a:solidFill>
+                <a:latin typeface="Courier New"/>
+              </a:rPr>
+              <a:t>lastGreaterThanZero</a:t>
+            </a:r>
+            <a:r>
+              <a:rPr lang="en-US" sz="2400" b="1" dirty="0">
+                <a:solidFill>
+                  <a:srgbClr val="000000"/>
+                </a:solidFill>
+                <a:latin typeface="Courier New"/>
+              </a:rPr>
+              <a:t>) </a:t>
+            </a:r>
+            <a:r>
+              <a:rPr lang="en-US" sz="2400" b="1" dirty="0" smtClean="0">
+                <a:solidFill>
+                  <a:srgbClr val="000000"/>
+                </a:solidFill>
+                <a:latin typeface="Courier New"/>
+              </a:rPr>
+              <a:t>||</a:t>
+            </a:r>
+          </a:p>
+          <a:p>
+            <a:pPr marL="114300" indent="0">
+              <a:buNone/>
+            </a:pPr>
             <a:r>
               <a:rPr lang="en-US" sz="2400" b="1" dirty="0" smtClean="0">
                 <a:solidFill>
@@ -12386,93 +12270,7 @@
                 </a:solidFill>
                 <a:latin typeface="Courier New"/>
               </a:rPr>
-              <a:t>bits = </a:t>
-            </a:r>
-            <a:r>
-              <a:rPr lang="en-US" sz="2400" b="1" dirty="0" err="1">
-                <a:solidFill>
-                  <a:srgbClr val="000000"/>
-                </a:solidFill>
-                <a:latin typeface="Courier New"/>
-              </a:rPr>
-              <a:t>Math.</a:t>
-            </a:r>
-            <a:r>
-              <a:rPr lang="en-US" sz="2400" b="1" i="1" dirty="0" err="1">
-                <a:solidFill>
-                  <a:srgbClr val="000000"/>
-                </a:solidFill>
-                <a:latin typeface="Courier New"/>
-              </a:rPr>
-              <a:t>round</a:t>
-            </a:r>
-            <a:r>
-              <a:rPr lang="en-US" sz="2400" b="1" i="1" dirty="0">
-                <a:solidFill>
-                  <a:srgbClr val="000000"/>
-                </a:solidFill>
-                <a:latin typeface="Courier New"/>
-              </a:rPr>
-              <a:t>(</a:t>
-            </a:r>
-            <a:r>
-              <a:rPr lang="en-US" sz="2400" b="1" i="1" dirty="0" err="1">
-                <a:solidFill>
-                  <a:srgbClr val="0000C0"/>
-                </a:solidFill>
-                <a:latin typeface="Courier New"/>
-              </a:rPr>
-              <a:t>samplesSinceLastTransition</a:t>
-            </a:r>
-            <a:r>
-              <a:rPr lang="en-US" sz="2400" b="1" i="1" dirty="0">
-                <a:solidFill>
-                  <a:srgbClr val="000000"/>
-                </a:solidFill>
-                <a:latin typeface="Courier New"/>
-              </a:rPr>
-              <a:t> / </a:t>
-            </a:r>
-            <a:r>
-              <a:rPr lang="en-US" sz="2400" b="1" i="1" dirty="0" err="1">
-                <a:solidFill>
-                  <a:srgbClr val="0000C0"/>
-                </a:solidFill>
-                <a:latin typeface="Courier New"/>
-              </a:rPr>
-              <a:t>samplesPerBit</a:t>
-            </a:r>
-            <a:r>
-              <a:rPr lang="en-US" sz="2400" b="1" i="1" dirty="0">
-                <a:solidFill>
-                  <a:srgbClr val="000000"/>
-                </a:solidFill>
-                <a:latin typeface="Courier New"/>
-              </a:rPr>
-              <a:t>);</a:t>
-            </a:r>
-          </a:p>
-          <a:p>
-            <a:pPr marL="114300" indent="0">
-              <a:buNone/>
-            </a:pPr>
-            <a:r>
-              <a:rPr lang="en-US" sz="2400" b="1" dirty="0">
-                <a:solidFill>
-                  <a:srgbClr val="7F0055"/>
-                </a:solidFill>
-                <a:latin typeface="Courier New"/>
-              </a:rPr>
-              <a:t>if</a:t>
-            </a:r>
-            <a:r>
-              <a:rPr lang="en-US" sz="2400" b="1" dirty="0">
-                <a:solidFill>
-                  <a:srgbClr val="000000"/>
-                </a:solidFill>
-                <a:latin typeface="Courier New"/>
-              </a:rPr>
-              <a:t> ((bits &gt; 0) &amp;&amp; ((output &gt; 0 &amp;&amp; !</a:t>
+              <a:t>(output &lt; 0 &amp;&amp; </a:t>
             </a:r>
             <a:r>
               <a:rPr lang="en-US" sz="2400" b="1" dirty="0" err="1">
@@ -12484,31 +12282,13 @@
               <a:t>lastGreaterThanZero</a:t>
             </a:r>
             <a:r>
-              <a:rPr lang="en-US" sz="2400" b="1" dirty="0">
+              <a:rPr lang="en-US" sz="2400" b="1" dirty="0" smtClean="0">
                 <a:solidFill>
                   <a:srgbClr val="000000"/>
                 </a:solidFill>
                 <a:latin typeface="Courier New"/>
               </a:rPr>
-              <a:t>) || (output &lt; 0 &amp;&amp; </a:t>
-            </a:r>
-            <a:r>
-              <a:rPr lang="en-US" sz="2400" b="1" dirty="0" err="1">
-                <a:solidFill>
-                  <a:srgbClr val="0000C0"/>
-                </a:solidFill>
-                <a:latin typeface="Courier New"/>
-              </a:rPr>
-              <a:t>lastGreaterThanZero</a:t>
-            </a:r>
-            <a:r>
-              <a:rPr lang="en-US" sz="2400" b="1" dirty="0">
-                <a:solidFill>
-                  <a:srgbClr val="000000"/>
-                </a:solidFill>
-                <a:latin typeface="Courier New"/>
-              </a:rPr>
-              <a:t>))) </a:t>
+              <a:t>)) </a:t>
             </a:r>
             <a:r>
               <a:rPr lang="en-US" sz="2400" b="1" dirty="0" smtClean="0">
@@ -12531,7 +12311,7 @@
                 </a:solidFill>
                 <a:latin typeface="Courier New"/>
               </a:rPr>
-              <a:t>handleDemodulatedBits</a:t>
+              <a:t>handleFrequencyChange</a:t>
             </a:r>
             <a:r>
               <a:rPr lang="en-US" dirty="0" smtClean="0">
@@ -12540,40 +12320,14 @@
                 </a:solidFill>
                 <a:latin typeface="Courier New"/>
               </a:rPr>
-              <a:t>(bits</a:t>
-            </a:r>
-            <a:r>
-              <a:rPr lang="en-US" dirty="0">
-                <a:solidFill>
-                  <a:srgbClr val="000000"/>
-                </a:solidFill>
-                <a:latin typeface="Courier New"/>
-              </a:rPr>
-              <a:t>);</a:t>
-            </a:r>
-          </a:p>
-          <a:p>
-            <a:pPr marL="411480" lvl="1" indent="0">
-              <a:buNone/>
-            </a:pPr>
-            <a:r>
-              <a:rPr lang="en-US" dirty="0" err="1">
-                <a:solidFill>
-                  <a:srgbClr val="0000C0"/>
-                </a:solidFill>
-                <a:latin typeface="Courier New"/>
-              </a:rPr>
-              <a:t>samplesSinceLastTransition</a:t>
-            </a:r>
-            <a:r>
-              <a:rPr lang="en-US" dirty="0">
-                <a:solidFill>
-                  <a:srgbClr val="000000"/>
-                </a:solidFill>
-                <a:latin typeface="Courier New"/>
-              </a:rPr>
-              <a:t> = 0;</a:t>
-            </a:r>
+              <a:t>()</a:t>
+            </a:r>
+            <a:endParaRPr lang="en-US" dirty="0">
+              <a:solidFill>
+                <a:srgbClr val="000000"/>
+              </a:solidFill>
+              <a:latin typeface="Courier New"/>
+            </a:endParaRPr>
           </a:p>
           <a:p>
             <a:pPr marL="114300" indent="0">
@@ -13301,11 +13055,7 @@
           <a:p>
             <a:r>
               <a:rPr lang="en-US" dirty="0" smtClean="0"/>
-              <a:t>The Big </a:t>
-            </a:r>
-            <a:r>
-              <a:rPr lang="en-US" dirty="0" smtClean="0"/>
-              <a:t>Tables-O-Data</a:t>
+              <a:t>The Big Tables-O-Data</a:t>
             </a:r>
             <a:endParaRPr lang="en-US" dirty="0"/>
           </a:p>

</xml_diff>

<commit_message>
updated  picture and presentation comments
</commit_message>
<xml_diff>
--- a/Thesis Defense.pptx
+++ b/Thesis Defense.pptx
@@ -728,11 +728,11 @@
           <c:showBubbleSize val="0"/>
         </c:dLbls>
         <c:smooth val="0"/>
-        <c:axId val="307007632"/>
-        <c:axId val="307005280"/>
+        <c:axId val="257165552"/>
+        <c:axId val="257881264"/>
       </c:lineChart>
       <c:catAx>
-        <c:axId val="307007632"/>
+        <c:axId val="257165552"/>
         <c:scaling>
           <c:orientation val="minMax"/>
         </c:scaling>
@@ -742,7 +742,7 @@
         <c:majorTickMark val="out"/>
         <c:minorTickMark val="none"/>
         <c:tickLblPos val="none"/>
-        <c:crossAx val="307005280"/>
+        <c:crossAx val="257881264"/>
         <c:crosses val="autoZero"/>
         <c:auto val="1"/>
         <c:lblAlgn val="ctr"/>
@@ -750,7 +750,7 @@
         <c:noMultiLvlLbl val="0"/>
       </c:catAx>
       <c:valAx>
-        <c:axId val="307005280"/>
+        <c:axId val="257881264"/>
         <c:scaling>
           <c:orientation val="minMax"/>
           <c:max val="1"/>
@@ -762,7 +762,7 @@
         <c:majorTickMark val="out"/>
         <c:minorTickMark val="none"/>
         <c:tickLblPos val="nextTo"/>
-        <c:crossAx val="307007632"/>
+        <c:crossAx val="257165552"/>
         <c:crosses val="autoZero"/>
         <c:crossBetween val="between"/>
       </c:valAx>
@@ -1346,11 +1346,11 @@
           <c:showBubbleSize val="0"/>
         </c:dLbls>
         <c:smooth val="0"/>
-        <c:axId val="308861064"/>
-        <c:axId val="308859104"/>
+        <c:axId val="257878912"/>
+        <c:axId val="257883224"/>
       </c:lineChart>
       <c:catAx>
-        <c:axId val="308861064"/>
+        <c:axId val="257878912"/>
         <c:scaling>
           <c:orientation val="minMax"/>
         </c:scaling>
@@ -1360,7 +1360,7 @@
         <c:majorTickMark val="out"/>
         <c:minorTickMark val="none"/>
         <c:tickLblPos val="none"/>
-        <c:crossAx val="308859104"/>
+        <c:crossAx val="257883224"/>
         <c:crosses val="autoZero"/>
         <c:auto val="1"/>
         <c:lblAlgn val="ctr"/>
@@ -1368,7 +1368,7 @@
         <c:noMultiLvlLbl val="0"/>
       </c:catAx>
       <c:valAx>
-        <c:axId val="308859104"/>
+        <c:axId val="257883224"/>
         <c:scaling>
           <c:orientation val="minMax"/>
           <c:max val="1"/>
@@ -1380,7 +1380,7 @@
         <c:majorTickMark val="out"/>
         <c:minorTickMark val="none"/>
         <c:tickLblPos val="nextTo"/>
-        <c:crossAx val="308861064"/>
+        <c:crossAx val="257878912"/>
         <c:crosses val="autoZero"/>
         <c:crossBetween val="between"/>
       </c:valAx>
@@ -3779,7 +3779,24 @@
           <a:p>
             <a:r>
               <a:rPr lang="en-US" baseline="0" dirty="0" smtClean="0"/>
-              <a:t>Some quote about just finding some ways that didn’t make it better. Software is limitless and there are many ways left to try.</a:t>
+              <a:t>Some quote about just finding some ways that didn’t make it better. Software is limitless and there are many ways left to try</a:t>
+            </a:r>
+            <a:r>
+              <a:rPr lang="en-US" baseline="0" dirty="0" smtClean="0"/>
+              <a:t>.</a:t>
+            </a:r>
+          </a:p>
+          <a:p>
+            <a:endParaRPr lang="en-US" baseline="0" dirty="0" smtClean="0"/>
+          </a:p>
+          <a:p>
+            <a:r>
+              <a:rPr lang="en-US" dirty="0" smtClean="0"/>
+              <a:t>Software is a good cost </a:t>
+            </a:r>
+            <a:r>
+              <a:rPr lang="en-US" smtClean="0"/>
+              <a:t>effective alternative!</a:t>
             </a:r>
             <a:endParaRPr lang="en-US" dirty="0" smtClean="0"/>
           </a:p>
@@ -10826,16 +10843,7 @@
                 </a:solidFill>
                 <a:latin typeface="Courier New"/>
               </a:rPr>
-              <a:t>was</a:t>
-            </a:r>
-            <a:r>
-              <a:rPr lang="en-US" sz="2400" b="1" dirty="0" err="1" smtClean="0">
-                <a:solidFill>
-                  <a:srgbClr val="0000C0"/>
-                </a:solidFill>
-                <a:latin typeface="Courier New"/>
-              </a:rPr>
-              <a:t>SignalHigh</a:t>
+              <a:t>wasSignalHigh</a:t>
             </a:r>
             <a:r>
               <a:rPr lang="en-US" sz="2400" b="1" dirty="0" smtClean="0">
@@ -12288,16 +12296,7 @@
                 </a:solidFill>
                 <a:latin typeface="Courier New"/>
               </a:rPr>
-              <a:t>)) </a:t>
-            </a:r>
-            <a:r>
-              <a:rPr lang="en-US" sz="2400" b="1" dirty="0" smtClean="0">
-                <a:solidFill>
-                  <a:srgbClr val="000000"/>
-                </a:solidFill>
-                <a:latin typeface="Courier New"/>
-              </a:rPr>
-              <a:t>{</a:t>
+              <a:t>)) {</a:t>
             </a:r>
           </a:p>
           <a:p>
@@ -27986,9 +27985,9 @@
       </p:sp>
       <p:pic>
         <p:nvPicPr>
-          <p:cNvPr id="8194" name="Picture 2" descr="D:\Robert Campbell\Documents\GitHub\rrxthesis\images\PerformanceofAllHardwareonOT3TestwithNoise.png"/>
+          <p:cNvPr id="5" name="Content Placeholder 4"/>
           <p:cNvPicPr>
-            <a:picLocks noGrp="1" noChangeAspect="1" noChangeArrowheads="1"/>
+            <a:picLocks noGrp="1" noChangeAspect="1"/>
           </p:cNvPicPr>
           <p:nvPr>
             <p:ph idx="1"/>
@@ -28002,29 +28001,15 @@
               </a:ext>
             </a:extLst>
           </a:blip>
-          <a:srcRect/>
           <a:stretch>
             <a:fillRect/>
           </a:stretch>
         </p:blipFill>
-        <p:spPr bwMode="auto">
+        <p:spPr>
           <a:xfrm>
             <a:off x="1866900" y="1200150"/>
             <a:ext cx="4800600" cy="3600450"/>
           </a:xfrm>
-          <a:prstGeom prst="rect">
-            <a:avLst/>
-          </a:prstGeom>
-          <a:noFill/>
-          <a:extLst>
-            <a:ext uri="{909E8E84-426E-40DD-AFC4-6F175D3DCCD1}">
-              <a14:hiddenFill xmlns:a14="http://schemas.microsoft.com/office/drawing/2010/main">
-                <a:solidFill>
-                  <a:srgbClr val="FFFFFF"/>
-                </a:solidFill>
-              </a14:hiddenFill>
-            </a:ext>
-          </a:extLst>
         </p:spPr>
       </p:pic>
     </p:spTree>
@@ -28546,9 +28531,9 @@
       </p:sp>
       <p:pic>
         <p:nvPicPr>
-          <p:cNvPr id="11266" name="Picture 2" descr="D:\Robert Campbell\Documents\GitHub\rrxthesis\images\SoftwarePerformanceonNoisyOT3wNoFilter.png"/>
+          <p:cNvPr id="5" name="Content Placeholder 4"/>
           <p:cNvPicPr>
-            <a:picLocks noGrp="1" noChangeAspect="1" noChangeArrowheads="1"/>
+            <a:picLocks noGrp="1" noChangeAspect="1"/>
           </p:cNvPicPr>
           <p:nvPr>
             <p:ph sz="half" idx="1"/>
@@ -28562,36 +28547,22 @@
               </a:ext>
             </a:extLst>
           </a:blip>
-          <a:srcRect/>
           <a:stretch>
             <a:fillRect/>
           </a:stretch>
         </p:blipFill>
-        <p:spPr bwMode="auto">
+        <p:spPr>
           <a:xfrm>
             <a:off x="457200" y="1501775"/>
             <a:ext cx="3657600" cy="2743199"/>
           </a:xfrm>
-          <a:prstGeom prst="rect">
-            <a:avLst/>
-          </a:prstGeom>
-          <a:noFill/>
-          <a:extLst>
-            <a:ext uri="{909E8E84-426E-40DD-AFC4-6F175D3DCCD1}">
-              <a14:hiddenFill xmlns:a14="http://schemas.microsoft.com/office/drawing/2010/main">
-                <a:solidFill>
-                  <a:srgbClr val="FFFFFF"/>
-                </a:solidFill>
-              </a14:hiddenFill>
-            </a:ext>
-          </a:extLst>
         </p:spPr>
       </p:pic>
       <p:pic>
         <p:nvPicPr>
-          <p:cNvPr id="11267" name="Picture 3" descr="D:\Robert Campbell\Documents\GitHub\rrxthesis\images\SoftwarePerformanceonNoisyOT3wBandpassFilter.png"/>
+          <p:cNvPr id="7" name="Content Placeholder 6"/>
           <p:cNvPicPr>
-            <a:picLocks noGrp="1" noChangeAspect="1" noChangeArrowheads="1"/>
+            <a:picLocks noGrp="1" noChangeAspect="1"/>
           </p:cNvPicPr>
           <p:nvPr>
             <p:ph sz="half" idx="2"/>
@@ -28605,29 +28576,15 @@
               </a:ext>
             </a:extLst>
           </a:blip>
-          <a:srcRect/>
           <a:stretch>
             <a:fillRect/>
           </a:stretch>
         </p:blipFill>
-        <p:spPr bwMode="auto">
+        <p:spPr>
           <a:xfrm>
             <a:off x="4419600" y="1501775"/>
             <a:ext cx="3657600" cy="2743199"/>
           </a:xfrm>
-          <a:prstGeom prst="rect">
-            <a:avLst/>
-          </a:prstGeom>
-          <a:noFill/>
-          <a:extLst>
-            <a:ext uri="{909E8E84-426E-40DD-AFC4-6F175D3DCCD1}">
-              <a14:hiddenFill xmlns:a14="http://schemas.microsoft.com/office/drawing/2010/main">
-                <a:solidFill>
-                  <a:srgbClr val="FFFFFF"/>
-                </a:solidFill>
-              </a14:hiddenFill>
-            </a:ext>
-          </a:extLst>
         </p:spPr>
       </p:pic>
     </p:spTree>
@@ -28884,9 +28841,9 @@
       </p:sp>
       <p:pic>
         <p:nvPicPr>
-          <p:cNvPr id="13314" name="Picture 2" descr="D:\Robert Campbell\Documents\GitHub\rrxthesis\images\BestSoftwareversusBestHardware.png"/>
+          <p:cNvPr id="5" name="Content Placeholder 4"/>
           <p:cNvPicPr>
-            <a:picLocks noGrp="1" noChangeAspect="1" noChangeArrowheads="1"/>
+            <a:picLocks noGrp="1" noChangeAspect="1"/>
           </p:cNvPicPr>
           <p:nvPr>
             <p:ph idx="1"/>
@@ -28900,29 +28857,15 @@
               </a:ext>
             </a:extLst>
           </a:blip>
-          <a:srcRect/>
           <a:stretch>
             <a:fillRect/>
           </a:stretch>
         </p:blipFill>
-        <p:spPr bwMode="auto">
+        <p:spPr>
           <a:xfrm>
             <a:off x="1866900" y="1200150"/>
             <a:ext cx="4800600" cy="3600450"/>
           </a:xfrm>
-          <a:prstGeom prst="rect">
-            <a:avLst/>
-          </a:prstGeom>
-          <a:noFill/>
-          <a:extLst>
-            <a:ext uri="{909E8E84-426E-40DD-AFC4-6F175D3DCCD1}">
-              <a14:hiddenFill xmlns:a14="http://schemas.microsoft.com/office/drawing/2010/main">
-                <a:solidFill>
-                  <a:srgbClr val="FFFFFF"/>
-                </a:solidFill>
-              </a14:hiddenFill>
-            </a:ext>
-          </a:extLst>
         </p:spPr>
       </p:pic>
     </p:spTree>

</xml_diff>

<commit_message>
Some updates to powerpoint and Laptop Levels
</commit_message>
<xml_diff>
--- a/Thesis Defense.pptx
+++ b/Thesis Defense.pptx
@@ -728,11 +728,11 @@
           <c:showBubbleSize val="0"/>
         </c:dLbls>
         <c:smooth val="0"/>
-        <c:axId val="257165552"/>
-        <c:axId val="257881264"/>
+        <c:axId val="298536816"/>
+        <c:axId val="298534072"/>
       </c:lineChart>
       <c:catAx>
-        <c:axId val="257165552"/>
+        <c:axId val="298536816"/>
         <c:scaling>
           <c:orientation val="minMax"/>
         </c:scaling>
@@ -742,7 +742,7 @@
         <c:majorTickMark val="out"/>
         <c:minorTickMark val="none"/>
         <c:tickLblPos val="none"/>
-        <c:crossAx val="257881264"/>
+        <c:crossAx val="298534072"/>
         <c:crosses val="autoZero"/>
         <c:auto val="1"/>
         <c:lblAlgn val="ctr"/>
@@ -750,7 +750,7 @@
         <c:noMultiLvlLbl val="0"/>
       </c:catAx>
       <c:valAx>
-        <c:axId val="257881264"/>
+        <c:axId val="298534072"/>
         <c:scaling>
           <c:orientation val="minMax"/>
           <c:max val="1"/>
@@ -762,7 +762,7 @@
         <c:majorTickMark val="out"/>
         <c:minorTickMark val="none"/>
         <c:tickLblPos val="nextTo"/>
-        <c:crossAx val="257165552"/>
+        <c:crossAx val="298536816"/>
         <c:crosses val="autoZero"/>
         <c:crossBetween val="between"/>
       </c:valAx>
@@ -1346,11 +1346,11 @@
           <c:showBubbleSize val="0"/>
         </c:dLbls>
         <c:smooth val="0"/>
-        <c:axId val="257878912"/>
-        <c:axId val="257883224"/>
+        <c:axId val="298534464"/>
+        <c:axId val="298535248"/>
       </c:lineChart>
       <c:catAx>
-        <c:axId val="257878912"/>
+        <c:axId val="298534464"/>
         <c:scaling>
           <c:orientation val="minMax"/>
         </c:scaling>
@@ -1360,7 +1360,7 @@
         <c:majorTickMark val="out"/>
         <c:minorTickMark val="none"/>
         <c:tickLblPos val="none"/>
-        <c:crossAx val="257883224"/>
+        <c:crossAx val="298535248"/>
         <c:crosses val="autoZero"/>
         <c:auto val="1"/>
         <c:lblAlgn val="ctr"/>
@@ -1368,7 +1368,7 @@
         <c:noMultiLvlLbl val="0"/>
       </c:catAx>
       <c:valAx>
-        <c:axId val="257883224"/>
+        <c:axId val="298535248"/>
         <c:scaling>
           <c:orientation val="minMax"/>
           <c:max val="1"/>
@@ -1380,7 +1380,7 @@
         <c:majorTickMark val="out"/>
         <c:minorTickMark val="none"/>
         <c:tickLblPos val="nextTo"/>
-        <c:crossAx val="257878912"/>
+        <c:crossAx val="298534464"/>
         <c:crosses val="autoZero"/>
         <c:crossBetween val="between"/>
       </c:valAx>
@@ -1725,7 +1725,7 @@
           <a:p>
             <a:fld id="{36A1C95E-1CF8-4926-B750-D85B02FE5FAD}" type="datetimeFigureOut">
               <a:rPr lang="en-US" smtClean="0"/>
-              <a:t>5/1/2016</a:t>
+              <a:t>6/11/2016</a:t>
             </a:fld>
             <a:endParaRPr lang="en-US"/>
           </a:p>
@@ -3483,13 +3483,9 @@
             </a:r>
             <a:r>
               <a:rPr lang="en-US" baseline="0" dirty="0" smtClean="0"/>
-              <a:t> the </a:t>
-            </a:r>
-            <a:r>
-              <a:rPr lang="en-US" baseline="0" smtClean="0"/>
-              <a:t>hardware results came from</a:t>
-            </a:r>
-            <a:endParaRPr lang="en-US"/>
+              <a:t> the hardware results came from</a:t>
+            </a:r>
+            <a:endParaRPr lang="en-US" dirty="0"/>
           </a:p>
         </p:txBody>
       </p:sp>
@@ -3875,20 +3871,20 @@
           <a:p>
             <a:r>
               <a:rPr lang="en-US" baseline="0" dirty="0" smtClean="0"/>
-              <a:t>Some quote about just finding some ways that didn’t make it better. Software is limitless and there are many ways left to try</a:t>
+              <a:t>Some quote about just finding some ways that didn’t make it better. Software is limitless and there are many ways left to try.</a:t>
+            </a:r>
+          </a:p>
+          <a:p>
+            <a:endParaRPr lang="en-US" baseline="0" dirty="0" smtClean="0"/>
+          </a:p>
+          <a:p>
+            <a:r>
+              <a:rPr lang="en-US" dirty="0" smtClean="0"/>
+              <a:t>Software is a good cost effective alternative! Hardware</a:t>
             </a:r>
             <a:r>
               <a:rPr lang="en-US" baseline="0" dirty="0" smtClean="0"/>
-              <a:t>.</a:t>
-            </a:r>
-          </a:p>
-          <a:p>
-            <a:endParaRPr lang="en-US" baseline="0" dirty="0" smtClean="0"/>
-          </a:p>
-          <a:p>
-            <a:r>
-              <a:rPr lang="en-US" dirty="0" smtClean="0"/>
-              <a:t>Software is a good cost effective alternative!</a:t>
+              <a:t> components ware out while software is consistent</a:t>
             </a:r>
             <a:endParaRPr lang="en-US" dirty="0" smtClean="0"/>
           </a:p>
@@ -4827,7 +4823,7 @@
           <a:p>
             <a:fld id="{DED1A555-0307-4A79-A556-98A44DB0B6FF}" type="datetime1">
               <a:rPr lang="en-US" smtClean="0"/>
-              <a:t>5/1/2016</a:t>
+              <a:t>6/11/2016</a:t>
             </a:fld>
             <a:endParaRPr lang="en-US"/>
           </a:p>
@@ -4992,7 +4988,7 @@
           <a:p>
             <a:fld id="{52D83D95-7A82-4F21-8A65-062EC056839B}" type="datetime1">
               <a:rPr lang="en-US" smtClean="0"/>
-              <a:t>5/1/2016</a:t>
+              <a:t>6/11/2016</a:t>
             </a:fld>
             <a:endParaRPr lang="en-US"/>
           </a:p>
@@ -5167,7 +5163,7 @@
           <a:p>
             <a:fld id="{BB0EDF4D-ED1D-4336-A8A7-6B82EB5D2413}" type="datetime1">
               <a:rPr lang="en-US" smtClean="0"/>
-              <a:t>5/1/2016</a:t>
+              <a:t>6/11/2016</a:t>
             </a:fld>
             <a:endParaRPr lang="en-US"/>
           </a:p>
@@ -5332,7 +5328,7 @@
           <a:p>
             <a:fld id="{71352417-BB1A-494E-A4DA-135265FCC881}" type="datetime1">
               <a:rPr lang="en-US" smtClean="0"/>
-              <a:t>5/1/2016</a:t>
+              <a:t>6/11/2016</a:t>
             </a:fld>
             <a:endParaRPr lang="en-US"/>
           </a:p>
@@ -5573,7 +5569,7 @@
           <a:p>
             <a:fld id="{6F117249-023D-4B77-8123-C8FFD9D02F0B}" type="datetime1">
               <a:rPr lang="en-US" smtClean="0"/>
-              <a:t>5/1/2016</a:t>
+              <a:t>6/11/2016</a:t>
             </a:fld>
             <a:endParaRPr lang="en-US"/>
           </a:p>
@@ -5856,7 +5852,7 @@
           <a:p>
             <a:fld id="{45642988-BB84-4807-9E77-175CE5CECDE0}" type="datetime1">
               <a:rPr lang="en-US" smtClean="0"/>
-              <a:t>5/1/2016</a:t>
+              <a:t>6/11/2016</a:t>
             </a:fld>
             <a:endParaRPr lang="en-US"/>
           </a:p>
@@ -6285,7 +6281,7 @@
           <a:p>
             <a:fld id="{6D96F54B-A69F-4859-ADA4-B2253D584FB6}" type="datetime1">
               <a:rPr lang="en-US" smtClean="0"/>
-              <a:t>5/1/2016</a:t>
+              <a:t>6/11/2016</a:t>
             </a:fld>
             <a:endParaRPr lang="en-US"/>
           </a:p>
@@ -6398,7 +6394,7 @@
           <a:p>
             <a:fld id="{B70C02B0-0B73-49BF-B56F-7F628100337A}" type="datetime1">
               <a:rPr lang="en-US" smtClean="0"/>
-              <a:t>5/1/2016</a:t>
+              <a:t>6/11/2016</a:t>
             </a:fld>
             <a:endParaRPr lang="en-US"/>
           </a:p>
@@ -6488,7 +6484,7 @@
           <a:p>
             <a:fld id="{61AC1934-F2BC-46DA-BF21-8FEDF0D97A28}" type="datetime1">
               <a:rPr lang="en-US" smtClean="0"/>
-              <a:t>5/1/2016</a:t>
+              <a:t>6/11/2016</a:t>
             </a:fld>
             <a:endParaRPr lang="en-US"/>
           </a:p>
@@ -6677,7 +6673,7 @@
           <a:p>
             <a:fld id="{059CEC1F-F11C-4127-80E5-4FA9DF92B5D8}" type="datetime1">
               <a:rPr lang="en-US" smtClean="0"/>
-              <a:t>5/1/2016</a:t>
+              <a:t>6/11/2016</a:t>
             </a:fld>
             <a:endParaRPr lang="en-US"/>
           </a:p>
@@ -6995,7 +6991,7 @@
           <a:p>
             <a:fld id="{265B60AB-6060-4DC1-97F7-58A23AAF3FD2}" type="datetime1">
               <a:rPr lang="en-US" smtClean="0"/>
-              <a:t>5/1/2016</a:t>
+              <a:t>6/11/2016</a:t>
             </a:fld>
             <a:endParaRPr lang="en-US"/>
           </a:p>
@@ -7374,7 +7370,7 @@
           <a:p>
             <a:fld id="{B236E3DE-3988-44CB-9697-C84D864E0643}" type="datetime1">
               <a:rPr lang="en-US" smtClean="0"/>
-              <a:t>5/1/2016</a:t>
+              <a:t>6/11/2016</a:t>
             </a:fld>
             <a:endParaRPr lang="en-US"/>
           </a:p>

</xml_diff>